<commit_message>
Modifications on the interface
Add possibility to choose between the the two algorithms
Add possibility to choose the graph representation
Set in Bold the title of the presentation
</commit_message>
<xml_diff>
--- a/Presentation/Présentation du projet (ARS).pptx
+++ b/Presentation/Présentation du projet (ARS).pptx
@@ -2981,17 +2981,17 @@
           <a:lstStyle/>
           <a:p>
             <a:r>
-              <a:rPr lang="en-US" dirty="0"/>
+              <a:rPr lang="en-US" b="1" dirty="0"/>
               <a:t>PRESENTATION DE PROJET</a:t>
             </a:r>
             <a:br>
-              <a:rPr lang="en-US" dirty="0"/>
+              <a:rPr lang="en-US" b="1" dirty="0"/>
             </a:br>
             <a:r>
-              <a:rPr lang="en-US" dirty="0"/>
+              <a:rPr lang="en-US" b="1" dirty="0"/>
               <a:t>Recuit simulé</a:t>
             </a:r>
-            <a:endParaRPr lang="fr-FR" dirty="0"/>
+            <a:endParaRPr lang="fr-FR" b="1" dirty="0"/>
           </a:p>
         </p:txBody>
       </p:sp>
@@ -3024,6 +3024,13 @@
   <p:clrMapOvr>
     <a:masterClrMapping/>
   </p:clrMapOvr>
+  <p:timing>
+    <p:tnLst>
+      <p:par>
+        <p:cTn id="1" dur="indefinite" restart="never" nodeType="tmRoot"/>
+      </p:par>
+    </p:tnLst>
+  </p:timing>
 </p:sld>
 </file>
 
@@ -3143,6 +3150,13 @@
   <p:clrMapOvr>
     <a:masterClrMapping/>
   </p:clrMapOvr>
+  <p:timing>
+    <p:tnLst>
+      <p:par>
+        <p:cTn id="1" dur="indefinite" restart="never" nodeType="tmRoot"/>
+      </p:par>
+    </p:tnLst>
+  </p:timing>
 </p:sld>
 </file>
 

</xml_diff>

<commit_message>
On stocke les variables energy et temperature sur un pas de 10
</commit_message>
<xml_diff>
--- a/Presentation/Présentation du projet (ARS).pptx
+++ b/Presentation/Présentation du projet (ARS).pptx
@@ -11,8 +11,9 @@
     <p:sldId id="259" r:id="rId5"/>
     <p:sldId id="260" r:id="rId6"/>
     <p:sldId id="261" r:id="rId7"/>
-    <p:sldId id="262" r:id="rId8"/>
-    <p:sldId id="263" r:id="rId9"/>
+    <p:sldId id="264" r:id="rId8"/>
+    <p:sldId id="262" r:id="rId9"/>
+    <p:sldId id="263" r:id="rId10"/>
   </p:sldIdLst>
   <p:sldSz cx="12192000" cy="6858000"/>
   <p:notesSz cx="6858000" cy="9144000"/>
@@ -248,7 +249,7 @@
           <a:p>
             <a:fld id="{76503C9B-6886-4A39-8451-452F3277C639}" type="datetimeFigureOut">
               <a:rPr lang="fr-FR" smtClean="0"/>
-              <a:t>03/11/2016</a:t>
+              <a:t>08/11/2016</a:t>
             </a:fld>
             <a:endParaRPr lang="fr-FR"/>
           </a:p>
@@ -416,7 +417,7 @@
           <a:p>
             <a:fld id="{76503C9B-6886-4A39-8451-452F3277C639}" type="datetimeFigureOut">
               <a:rPr lang="fr-FR" smtClean="0"/>
-              <a:t>03/11/2016</a:t>
+              <a:t>08/11/2016</a:t>
             </a:fld>
             <a:endParaRPr lang="fr-FR"/>
           </a:p>
@@ -594,7 +595,7 @@
           <a:p>
             <a:fld id="{76503C9B-6886-4A39-8451-452F3277C639}" type="datetimeFigureOut">
               <a:rPr lang="fr-FR" smtClean="0"/>
-              <a:t>03/11/2016</a:t>
+              <a:t>08/11/2016</a:t>
             </a:fld>
             <a:endParaRPr lang="fr-FR"/>
           </a:p>
@@ -762,7 +763,7 @@
           <a:p>
             <a:fld id="{76503C9B-6886-4A39-8451-452F3277C639}" type="datetimeFigureOut">
               <a:rPr lang="fr-FR" smtClean="0"/>
-              <a:t>03/11/2016</a:t>
+              <a:t>08/11/2016</a:t>
             </a:fld>
             <a:endParaRPr lang="fr-FR"/>
           </a:p>
@@ -1007,7 +1008,7 @@
           <a:p>
             <a:fld id="{76503C9B-6886-4A39-8451-452F3277C639}" type="datetimeFigureOut">
               <a:rPr lang="fr-FR" smtClean="0"/>
-              <a:t>03/11/2016</a:t>
+              <a:t>08/11/2016</a:t>
             </a:fld>
             <a:endParaRPr lang="fr-FR"/>
           </a:p>
@@ -1236,7 +1237,7 @@
           <a:p>
             <a:fld id="{76503C9B-6886-4A39-8451-452F3277C639}" type="datetimeFigureOut">
               <a:rPr lang="fr-FR" smtClean="0"/>
-              <a:t>03/11/2016</a:t>
+              <a:t>08/11/2016</a:t>
             </a:fld>
             <a:endParaRPr lang="fr-FR"/>
           </a:p>
@@ -1600,7 +1601,7 @@
           <a:p>
             <a:fld id="{76503C9B-6886-4A39-8451-452F3277C639}" type="datetimeFigureOut">
               <a:rPr lang="fr-FR" smtClean="0"/>
-              <a:t>03/11/2016</a:t>
+              <a:t>08/11/2016</a:t>
             </a:fld>
             <a:endParaRPr lang="fr-FR"/>
           </a:p>
@@ -1717,7 +1718,7 @@
           <a:p>
             <a:fld id="{76503C9B-6886-4A39-8451-452F3277C639}" type="datetimeFigureOut">
               <a:rPr lang="fr-FR" smtClean="0"/>
-              <a:t>03/11/2016</a:t>
+              <a:t>08/11/2016</a:t>
             </a:fld>
             <a:endParaRPr lang="fr-FR"/>
           </a:p>
@@ -1812,7 +1813,7 @@
           <a:p>
             <a:fld id="{76503C9B-6886-4A39-8451-452F3277C639}" type="datetimeFigureOut">
               <a:rPr lang="fr-FR" smtClean="0"/>
-              <a:t>03/11/2016</a:t>
+              <a:t>08/11/2016</a:t>
             </a:fld>
             <a:endParaRPr lang="fr-FR"/>
           </a:p>
@@ -2087,7 +2088,7 @@
           <a:p>
             <a:fld id="{76503C9B-6886-4A39-8451-452F3277C639}" type="datetimeFigureOut">
               <a:rPr lang="fr-FR" smtClean="0"/>
-              <a:t>03/11/2016</a:t>
+              <a:t>08/11/2016</a:t>
             </a:fld>
             <a:endParaRPr lang="fr-FR"/>
           </a:p>
@@ -2339,7 +2340,7 @@
           <a:p>
             <a:fld id="{76503C9B-6886-4A39-8451-452F3277C639}" type="datetimeFigureOut">
               <a:rPr lang="fr-FR" smtClean="0"/>
-              <a:t>03/11/2016</a:t>
+              <a:t>08/11/2016</a:t>
             </a:fld>
             <a:endParaRPr lang="fr-FR"/>
           </a:p>
@@ -2560,7 +2561,7 @@
           <a:p>
             <a:fld id="{76503C9B-6886-4A39-8451-452F3277C639}" type="datetimeFigureOut">
               <a:rPr lang="fr-FR" smtClean="0"/>
-              <a:t>03/11/2016</a:t>
+              <a:t>08/11/2016</a:t>
             </a:fld>
             <a:endParaRPr lang="fr-FR"/>
           </a:p>
@@ -3024,13 +3025,6 @@
   <p:clrMapOvr>
     <a:masterClrMapping/>
   </p:clrMapOvr>
-  <p:timing>
-    <p:tnLst>
-      <p:par>
-        <p:cTn id="1" dur="indefinite" restart="never" nodeType="tmRoot"/>
-      </p:par>
-    </p:tnLst>
-  </p:timing>
 </p:sld>
 </file>
 
@@ -3150,13 +3144,6 @@
   <p:clrMapOvr>
     <a:masterClrMapping/>
   </p:clrMapOvr>
-  <p:timing>
-    <p:tnLst>
-      <p:par>
-        <p:cTn id="1" dur="indefinite" restart="never" nodeType="tmRoot"/>
-      </p:par>
-    </p:tnLst>
-  </p:timing>
 </p:sld>
 </file>
 
@@ -3437,13 +3424,58 @@
             </a:r>
             <a:r>
               <a:rPr lang="en-US" dirty="0"/>
-              <a:t> un temps record</a:t>
-            </a:r>
+              <a:t> un temps </a:t>
+            </a:r>
+            <a:r>
+              <a:rPr lang="en-US" dirty="0" err="1"/>
+              <a:t>limité</a:t>
+            </a:r>
+            <a:endParaRPr lang="en-US" dirty="0"/>
           </a:p>
           <a:p>
             <a:r>
               <a:rPr lang="en-US" dirty="0" err="1"/>
               <a:t>Inconvénients</a:t>
+            </a:r>
+            <a:endParaRPr lang="en-US" dirty="0"/>
+          </a:p>
+          <a:p>
+            <a:pPr lvl="1"/>
+            <a:r>
+              <a:rPr lang="en-US" dirty="0" err="1"/>
+              <a:t>Trouver</a:t>
+            </a:r>
+            <a:r>
+              <a:rPr lang="en-US" dirty="0"/>
+              <a:t> un </a:t>
+            </a:r>
+            <a:r>
+              <a:rPr lang="en-US" dirty="0" err="1"/>
+              <a:t>équilibre</a:t>
+            </a:r>
+            <a:r>
+              <a:rPr lang="en-US" dirty="0"/>
+              <a:t> entre le temps de </a:t>
+            </a:r>
+            <a:r>
+              <a:rPr lang="en-US" dirty="0" err="1"/>
+              <a:t>calcul</a:t>
+            </a:r>
+            <a:r>
+              <a:rPr lang="en-US" dirty="0"/>
+              <a:t> et le </a:t>
+            </a:r>
+            <a:r>
+              <a:rPr lang="en-US" dirty="0" err="1"/>
+              <a:t>résultat</a:t>
+            </a:r>
+            <a:r>
+              <a:rPr lang="en-US" dirty="0"/>
+              <a:t> de </a:t>
+            </a:r>
+            <a:r>
+              <a:rPr lang="en-US" dirty="0" err="1"/>
+              <a:t>l’algorithme</a:t>
             </a:r>
             <a:endParaRPr lang="fr-FR" dirty="0"/>
           </a:p>
@@ -3517,7 +3549,120 @@
           <a:bodyPr/>
           <a:lstStyle/>
           <a:p>
-            <a:endParaRPr lang="fr-FR"/>
+            <a:pPr marL="0" indent="0">
+              <a:buNone/>
+            </a:pPr>
+            <a:endParaRPr lang="fr-FR" dirty="0"/>
+          </a:p>
+          <a:p>
+            <a:r>
+              <a:rPr lang="en-US" dirty="0" err="1"/>
+              <a:t>Fonctionnement</a:t>
+            </a:r>
+            <a:r>
+              <a:rPr lang="en-US" dirty="0"/>
+              <a:t> de </a:t>
+            </a:r>
+            <a:r>
+              <a:rPr lang="en-US" dirty="0" err="1"/>
+              <a:t>l’algorithme</a:t>
+            </a:r>
+            <a:r>
+              <a:rPr lang="en-US" dirty="0"/>
+              <a:t>  -&gt; schema</a:t>
+            </a:r>
+          </a:p>
+          <a:p>
+            <a:r>
+              <a:rPr lang="en-US" dirty="0" err="1"/>
+              <a:t>Avantages</a:t>
+            </a:r>
+            <a:endParaRPr lang="en-US" dirty="0"/>
+          </a:p>
+          <a:p>
+            <a:pPr lvl="1"/>
+            <a:r>
+              <a:rPr lang="en-US" dirty="0" err="1"/>
+              <a:t>Trouver</a:t>
+            </a:r>
+            <a:r>
+              <a:rPr lang="en-US" dirty="0"/>
+              <a:t> </a:t>
+            </a:r>
+            <a:r>
+              <a:rPr lang="en-US" dirty="0" err="1"/>
+              <a:t>une</a:t>
+            </a:r>
+            <a:r>
+              <a:rPr lang="en-US" dirty="0"/>
+              <a:t> approximation de la bonne </a:t>
+            </a:r>
+            <a:r>
+              <a:rPr lang="en-US" dirty="0" err="1"/>
+              <a:t>réponse</a:t>
+            </a:r>
+            <a:r>
+              <a:rPr lang="en-US" dirty="0"/>
+              <a:t> </a:t>
+            </a:r>
+            <a:r>
+              <a:rPr lang="en-US" dirty="0" err="1"/>
+              <a:t>en</a:t>
+            </a:r>
+            <a:r>
+              <a:rPr lang="en-US" dirty="0"/>
+              <a:t> un temps </a:t>
+            </a:r>
+            <a:r>
+              <a:rPr lang="en-US" dirty="0" err="1"/>
+              <a:t>limité</a:t>
+            </a:r>
+            <a:endParaRPr lang="en-US" dirty="0"/>
+          </a:p>
+          <a:p>
+            <a:r>
+              <a:rPr lang="en-US" dirty="0" err="1"/>
+              <a:t>Inconvénients</a:t>
+            </a:r>
+            <a:endParaRPr lang="en-US" dirty="0"/>
+          </a:p>
+          <a:p>
+            <a:pPr lvl="1"/>
+            <a:r>
+              <a:rPr lang="en-US" dirty="0" err="1"/>
+              <a:t>Trouver</a:t>
+            </a:r>
+            <a:r>
+              <a:rPr lang="en-US" dirty="0"/>
+              <a:t> un </a:t>
+            </a:r>
+            <a:r>
+              <a:rPr lang="en-US" dirty="0" err="1"/>
+              <a:t>équilibre</a:t>
+            </a:r>
+            <a:r>
+              <a:rPr lang="en-US" dirty="0"/>
+              <a:t> entre et le </a:t>
+            </a:r>
+            <a:r>
+              <a:rPr lang="en-US" dirty="0" err="1"/>
+              <a:t>résultat</a:t>
+            </a:r>
+            <a:r>
+              <a:rPr lang="en-US" dirty="0"/>
+              <a:t> de </a:t>
+            </a:r>
+            <a:r>
+              <a:rPr lang="en-US" dirty="0" err="1"/>
+              <a:t>l’algorithme</a:t>
+            </a:r>
+            <a:endParaRPr lang="fr-FR" dirty="0"/>
+          </a:p>
+          <a:p>
+            <a:pPr marL="0" indent="0">
+              <a:buNone/>
+            </a:pPr>
+            <a:endParaRPr lang="fr-FR" dirty="0"/>
           </a:p>
         </p:txBody>
       </p:sp>
@@ -3614,51 +3759,6 @@
             <a:endParaRPr lang="en-US" dirty="0"/>
           </a:p>
           <a:p>
-            <a:pPr lvl="1"/>
-            <a:r>
-              <a:rPr lang="en-US" dirty="0"/>
-              <a:t>Image de la </a:t>
-            </a:r>
-            <a:r>
-              <a:rPr lang="en-US" dirty="0" err="1"/>
-              <a:t>fenêtre</a:t>
-            </a:r>
-            <a:r>
-              <a:rPr lang="en-US" dirty="0"/>
-              <a:t> de </a:t>
-            </a:r>
-            <a:r>
-              <a:rPr lang="en-US" dirty="0" err="1"/>
-              <a:t>l’application</a:t>
-            </a:r>
-            <a:endParaRPr lang="en-US" dirty="0"/>
-          </a:p>
-          <a:p>
-            <a:r>
-              <a:rPr lang="en-US" dirty="0"/>
-              <a:t>Interface</a:t>
-            </a:r>
-          </a:p>
-          <a:p>
-            <a:pPr lvl="1"/>
-            <a:r>
-              <a:rPr lang="en-US" dirty="0" err="1"/>
-              <a:t>Affichage</a:t>
-            </a:r>
-            <a:r>
-              <a:rPr lang="en-US" dirty="0"/>
-              <a:t> du </a:t>
-            </a:r>
-            <a:r>
-              <a:rPr lang="en-US" dirty="0" err="1"/>
-              <a:t>graphe</a:t>
-            </a:r>
-            <a:r>
-              <a:rPr lang="en-US" dirty="0"/>
-              <a:t> (JSON)</a:t>
-            </a:r>
-          </a:p>
-          <a:p>
             <a:endParaRPr lang="fr-FR" dirty="0"/>
           </a:p>
         </p:txBody>
@@ -3710,6 +3810,177 @@
           <a:p>
             <a:r>
               <a:rPr lang="en-US" dirty="0"/>
+              <a:t>STRUCTURE DU PROGRAMME ET INTERFACE</a:t>
+            </a:r>
+          </a:p>
+        </p:txBody>
+      </p:sp>
+      <p:sp>
+        <p:nvSpPr>
+          <p:cNvPr id="3" name="Espace réservé du contenu 2"/>
+          <p:cNvSpPr>
+            <a:spLocks noGrp="1"/>
+          </p:cNvSpPr>
+          <p:nvPr>
+            <p:ph idx="1"/>
+          </p:nvPr>
+        </p:nvSpPr>
+        <p:spPr/>
+        <p:txBody>
+          <a:bodyPr/>
+          <a:lstStyle/>
+          <a:p>
+            <a:r>
+              <a:rPr lang="en-US" dirty="0"/>
+              <a:t>Interface</a:t>
+            </a:r>
+          </a:p>
+          <a:p>
+            <a:pPr lvl="1"/>
+            <a:r>
+              <a:rPr lang="en-US" dirty="0"/>
+              <a:t>Image de la </a:t>
+            </a:r>
+            <a:r>
+              <a:rPr lang="en-US" dirty="0" err="1"/>
+              <a:t>fenêtre</a:t>
+            </a:r>
+            <a:r>
+              <a:rPr lang="en-US" dirty="0"/>
+              <a:t> de </a:t>
+            </a:r>
+            <a:r>
+              <a:rPr lang="en-US" dirty="0" err="1"/>
+              <a:t>l’application</a:t>
+            </a:r>
+            <a:endParaRPr lang="en-US" dirty="0"/>
+          </a:p>
+          <a:p>
+            <a:pPr lvl="1"/>
+            <a:r>
+              <a:rPr lang="en-US" dirty="0" err="1"/>
+              <a:t>Affichage</a:t>
+            </a:r>
+            <a:r>
+              <a:rPr lang="en-US" dirty="0"/>
+              <a:t> du </a:t>
+            </a:r>
+            <a:r>
+              <a:rPr lang="en-US" dirty="0" err="1"/>
+              <a:t>graphe</a:t>
+            </a:r>
+            <a:r>
+              <a:rPr lang="en-US" dirty="0"/>
+              <a:t> (JSON)</a:t>
+            </a:r>
+          </a:p>
+          <a:p>
+            <a:pPr lvl="1"/>
+            <a:r>
+              <a:rPr lang="en-US" dirty="0"/>
+              <a:t>Site </a:t>
+            </a:r>
+          </a:p>
+          <a:p>
+            <a:endParaRPr lang="fr-FR" dirty="0"/>
+          </a:p>
+        </p:txBody>
+      </p:sp>
+      <p:pic>
+        <p:nvPicPr>
+          <p:cNvPr id="4" name="Image 3"/>
+          <p:cNvPicPr>
+            <a:picLocks noChangeAspect="1"/>
+          </p:cNvPicPr>
+          <p:nvPr/>
+        </p:nvPicPr>
+        <p:blipFill>
+          <a:blip r:embed="rId2"/>
+          <a:stretch>
+            <a:fillRect/>
+          </a:stretch>
+        </p:blipFill>
+        <p:spPr>
+          <a:xfrm>
+            <a:off x="6134157" y="1825625"/>
+            <a:ext cx="5219643" cy="3021549"/>
+          </a:xfrm>
+          <a:prstGeom prst="rect">
+            <a:avLst/>
+          </a:prstGeom>
+        </p:spPr>
+      </p:pic>
+      <p:pic>
+        <p:nvPicPr>
+          <p:cNvPr id="5" name="Image 4"/>
+          <p:cNvPicPr>
+            <a:picLocks noChangeAspect="1"/>
+          </p:cNvPicPr>
+          <p:nvPr/>
+        </p:nvPicPr>
+        <p:blipFill>
+          <a:blip r:embed="rId3"/>
+          <a:stretch>
+            <a:fillRect/>
+          </a:stretch>
+        </p:blipFill>
+        <p:spPr>
+          <a:xfrm>
+            <a:off x="1647440" y="3600244"/>
+            <a:ext cx="3731800" cy="2576719"/>
+          </a:xfrm>
+          <a:prstGeom prst="rect">
+            <a:avLst/>
+          </a:prstGeom>
+        </p:spPr>
+      </p:pic>
+    </p:spTree>
+    <p:extLst>
+      <p:ext uri="{BB962C8B-B14F-4D97-AF65-F5344CB8AC3E}">
+        <p14:creationId xmlns:p14="http://schemas.microsoft.com/office/powerpoint/2010/main" val="3829665674"/>
+      </p:ext>
+    </p:extLst>
+  </p:cSld>
+  <p:clrMapOvr>
+    <a:masterClrMapping/>
+  </p:clrMapOvr>
+</p:sld>
+</file>
+
+<file path=ppt/slides/slide8.xml><?xml version="1.0" encoding="utf-8"?>
+<p:sld xmlns:a="http://purl.oclc.org/ooxml/drawingml/main" xmlns:r="http://purl.oclc.org/ooxml/officeDocument/relationships" xmlns:p="http://purl.oclc.org/ooxml/presentationml/main">
+  <p:cSld>
+    <p:spTree>
+      <p:nvGrpSpPr>
+        <p:cNvPr id="1" name=""/>
+        <p:cNvGrpSpPr/>
+        <p:nvPr/>
+      </p:nvGrpSpPr>
+      <p:grpSpPr>
+        <a:xfrm>
+          <a:off x="0" y="0"/>
+          <a:ext cx="0" cy="0"/>
+          <a:chOff x="0" y="0"/>
+          <a:chExt cx="0" cy="0"/>
+        </a:xfrm>
+      </p:grpSpPr>
+      <p:sp>
+        <p:nvSpPr>
+          <p:cNvPr id="2" name="Titre 1"/>
+          <p:cNvSpPr>
+            <a:spLocks noGrp="1"/>
+          </p:cNvSpPr>
+          <p:nvPr>
+            <p:ph type="title"/>
+          </p:nvPr>
+        </p:nvSpPr>
+        <p:spPr/>
+        <p:txBody>
+          <a:bodyPr/>
+          <a:lstStyle/>
+          <a:p>
+            <a:r>
+              <a:rPr lang="en-US" dirty="0"/>
               <a:t>DEMONSTRATION</a:t>
             </a:r>
             <a:endParaRPr lang="fr-FR" dirty="0"/>
@@ -3751,7 +4022,7 @@
 </p:sld>
 </file>
 
-<file path=ppt/slides/slide8.xml><?xml version="1.0" encoding="utf-8"?>
+<file path=ppt/slides/slide9.xml><?xml version="1.0" encoding="utf-8"?>
 <p:sld xmlns:a="http://purl.oclc.org/ooxml/drawingml/main" xmlns:r="http://purl.oclc.org/ooxml/officeDocument/relationships" xmlns:p="http://purl.oclc.org/ooxml/presentationml/main">
   <p:cSld>
     <p:spTree>

</xml_diff>

<commit_message>
Modification du fichier main pour générer des statistiques sur les paramètres de l'ARS
</commit_message>
<xml_diff>
--- a/Presentation/Présentation du projet (ARS).pptx
+++ b/Presentation/Présentation du projet (ARS).pptx
@@ -213,7 +213,7 @@
           <a:p>
             <a:fld id="{DF94A7AC-E918-401E-A86D-EF9AFC74FAE8}" type="datetimeFigureOut">
               <a:rPr lang="fr-FR" smtClean="0"/>
-              <a:t>22/11/2016</a:t>
+              <a:t>06/12/2016</a:t>
             </a:fld>
             <a:endParaRPr lang="fr-FR"/>
           </a:p>
@@ -609,7 +609,7 @@
           <a:p>
             <a:fld id="{FDCAAEB2-A84F-4FB6-A41A-D1011A56829B}" type="datetime1">
               <a:rPr lang="fr-FR" smtClean="0"/>
-              <a:t>22/11/2016</a:t>
+              <a:t>06/12/2016</a:t>
             </a:fld>
             <a:endParaRPr lang="fr-FR"/>
           </a:p>
@@ -777,7 +777,7 @@
           <a:p>
             <a:fld id="{1AB9C4C4-7DB8-4B14-8BF2-6E42D3210997}" type="datetime1">
               <a:rPr lang="fr-FR" smtClean="0"/>
-              <a:t>22/11/2016</a:t>
+              <a:t>06/12/2016</a:t>
             </a:fld>
             <a:endParaRPr lang="fr-FR"/>
           </a:p>
@@ -955,7 +955,7 @@
           <a:p>
             <a:fld id="{16C572BD-612E-4BDC-8B5D-63C373EFC80F}" type="datetime1">
               <a:rPr lang="fr-FR" smtClean="0"/>
-              <a:t>22/11/2016</a:t>
+              <a:t>06/12/2016</a:t>
             </a:fld>
             <a:endParaRPr lang="fr-FR"/>
           </a:p>
@@ -1123,7 +1123,7 @@
           <a:p>
             <a:fld id="{5B35BB5B-ECE8-4A17-B0DD-9076F54E5BC7}" type="datetime1">
               <a:rPr lang="fr-FR" smtClean="0"/>
-              <a:t>22/11/2016</a:t>
+              <a:t>06/12/2016</a:t>
             </a:fld>
             <a:endParaRPr lang="fr-FR"/>
           </a:p>
@@ -1369,7 +1369,7 @@
           <a:p>
             <a:fld id="{07D736DE-8EAC-4233-BDD8-0A71E9306E4D}" type="datetime1">
               <a:rPr lang="fr-FR" smtClean="0"/>
-              <a:t>22/11/2016</a:t>
+              <a:t>06/12/2016</a:t>
             </a:fld>
             <a:endParaRPr lang="fr-FR"/>
           </a:p>
@@ -1598,7 +1598,7 @@
           <a:p>
             <a:fld id="{3F3EF361-BC71-40AD-851C-5917910CEE72}" type="datetime1">
               <a:rPr lang="fr-FR" smtClean="0"/>
-              <a:t>22/11/2016</a:t>
+              <a:t>06/12/2016</a:t>
             </a:fld>
             <a:endParaRPr lang="fr-FR"/>
           </a:p>
@@ -1962,7 +1962,7 @@
           <a:p>
             <a:fld id="{D40F95D9-4B6C-4F24-BA14-02A8E17C1586}" type="datetime1">
               <a:rPr lang="fr-FR" smtClean="0"/>
-              <a:t>22/11/2016</a:t>
+              <a:t>06/12/2016</a:t>
             </a:fld>
             <a:endParaRPr lang="fr-FR"/>
           </a:p>
@@ -2079,7 +2079,7 @@
           <a:p>
             <a:fld id="{99433A4D-FE3A-43E7-AE9A-985C59E6B99E}" type="datetime1">
               <a:rPr lang="fr-FR" smtClean="0"/>
-              <a:t>22/11/2016</a:t>
+              <a:t>06/12/2016</a:t>
             </a:fld>
             <a:endParaRPr lang="fr-FR"/>
           </a:p>
@@ -2174,7 +2174,7 @@
           <a:p>
             <a:fld id="{5A5EA5D9-98B8-48E3-97F1-67802972E83C}" type="datetime1">
               <a:rPr lang="fr-FR" smtClean="0"/>
-              <a:t>22/11/2016</a:t>
+              <a:t>06/12/2016</a:t>
             </a:fld>
             <a:endParaRPr lang="fr-FR"/>
           </a:p>
@@ -2449,7 +2449,7 @@
           <a:p>
             <a:fld id="{6BAC490B-EB41-47E8-939B-A86C55A99B29}" type="datetime1">
               <a:rPr lang="fr-FR" smtClean="0"/>
-              <a:t>22/11/2016</a:t>
+              <a:t>06/12/2016</a:t>
             </a:fld>
             <a:endParaRPr lang="fr-FR"/>
           </a:p>
@@ -2701,7 +2701,7 @@
           <a:p>
             <a:fld id="{F058E539-1B34-4709-A613-129214E18BB6}" type="datetime1">
               <a:rPr lang="fr-FR" smtClean="0"/>
-              <a:t>22/11/2016</a:t>
+              <a:t>06/12/2016</a:t>
             </a:fld>
             <a:endParaRPr lang="fr-FR"/>
           </a:p>
@@ -2769,12 +2769,12 @@
       <p:bgPr>
         <a:blipFill dpi="0" rotWithShape="1">
           <a:blip r:embed="rId13">
-            <a:alphaModFix amt="20%"/>
+            <a:alphaModFix amt="9%"/>
             <a:lum/>
           </a:blip>
           <a:srcRect/>
           <a:stretch>
-            <a:fillRect t="-26%" b="-26%"/>
+            <a:fillRect l="-2%" r="-2%"/>
           </a:stretch>
         </a:blipFill>
         <a:effectLst/>
@@ -2922,7 +2922,7 @@
           <a:p>
             <a:fld id="{DB82AD0F-B180-4841-8D16-49122DBA59AC}" type="datetime1">
               <a:rPr lang="fr-FR" smtClean="0"/>
-              <a:t>22/11/2016</a:t>
+              <a:t>06/12/2016</a:t>
             </a:fld>
             <a:endParaRPr lang="fr-FR"/>
           </a:p>
@@ -3395,7 +3395,6 @@
               <a:rPr lang="fr-FR" dirty="0"/>
               <a:t>Thomas Raynaud</a:t>
             </a:r>
-            <a:endParaRPr lang="fr-FR" dirty="0"/>
           </a:p>
           <a:p>
             <a:r>

</xml_diff>

<commit_message>
Modif de la présentation
</commit_message>
<xml_diff>
--- a/Presentation/Présentation du projet (ARS).pptx
+++ b/Presentation/Présentation du projet (ARS).pptx
@@ -5,7 +5,7 @@
     <p:sldMasterId id="2147483648" r:id="rId1"/>
   </p:sldMasterIdLst>
   <p:notesMasterIdLst>
-    <p:notesMasterId r:id="rId19"/>
+    <p:notesMasterId r:id="rId20"/>
   </p:notesMasterIdLst>
   <p:sldIdLst>
     <p:sldId id="256" r:id="rId2"/>
@@ -17,14 +17,15 @@
     <p:sldId id="268" r:id="rId8"/>
     <p:sldId id="269" r:id="rId9"/>
     <p:sldId id="272" r:id="rId10"/>
-    <p:sldId id="260" r:id="rId11"/>
-    <p:sldId id="273" r:id="rId12"/>
-    <p:sldId id="261" r:id="rId13"/>
-    <p:sldId id="264" r:id="rId14"/>
-    <p:sldId id="262" r:id="rId15"/>
-    <p:sldId id="263" r:id="rId16"/>
-    <p:sldId id="275" r:id="rId17"/>
-    <p:sldId id="274" r:id="rId18"/>
+    <p:sldId id="277" r:id="rId11"/>
+    <p:sldId id="260" r:id="rId12"/>
+    <p:sldId id="273" r:id="rId13"/>
+    <p:sldId id="261" r:id="rId14"/>
+    <p:sldId id="264" r:id="rId15"/>
+    <p:sldId id="262" r:id="rId16"/>
+    <p:sldId id="263" r:id="rId17"/>
+    <p:sldId id="275" r:id="rId18"/>
+    <p:sldId id="274" r:id="rId19"/>
   </p:sldIdLst>
   <p:sldSz cx="12192000" cy="6858000"/>
   <p:notesSz cx="6858000" cy="9144000"/>
@@ -213,7 +214,7 @@
           <a:p>
             <a:fld id="{DF94A7AC-E918-401E-A86D-EF9AFC74FAE8}" type="datetimeFigureOut">
               <a:rPr lang="fr-FR" smtClean="0"/>
-              <a:t>11/12/2016</a:t>
+              <a:t>12/12/2016</a:t>
             </a:fld>
             <a:endParaRPr lang="fr-FR"/>
           </a:p>
@@ -609,7 +610,7 @@
           <a:p>
             <a:fld id="{FDCAAEB2-A84F-4FB6-A41A-D1011A56829B}" type="datetime1">
               <a:rPr lang="fr-FR" smtClean="0"/>
-              <a:t>11/12/2016</a:t>
+              <a:t>12/12/2016</a:t>
             </a:fld>
             <a:endParaRPr lang="fr-FR"/>
           </a:p>
@@ -777,7 +778,7 @@
           <a:p>
             <a:fld id="{1AB9C4C4-7DB8-4B14-8BF2-6E42D3210997}" type="datetime1">
               <a:rPr lang="fr-FR" smtClean="0"/>
-              <a:t>11/12/2016</a:t>
+              <a:t>12/12/2016</a:t>
             </a:fld>
             <a:endParaRPr lang="fr-FR"/>
           </a:p>
@@ -955,7 +956,7 @@
           <a:p>
             <a:fld id="{16C572BD-612E-4BDC-8B5D-63C373EFC80F}" type="datetime1">
               <a:rPr lang="fr-FR" smtClean="0"/>
-              <a:t>11/12/2016</a:t>
+              <a:t>12/12/2016</a:t>
             </a:fld>
             <a:endParaRPr lang="fr-FR"/>
           </a:p>
@@ -1123,7 +1124,7 @@
           <a:p>
             <a:fld id="{5B35BB5B-ECE8-4A17-B0DD-9076F54E5BC7}" type="datetime1">
               <a:rPr lang="fr-FR" smtClean="0"/>
-              <a:t>11/12/2016</a:t>
+              <a:t>12/12/2016</a:t>
             </a:fld>
             <a:endParaRPr lang="fr-FR"/>
           </a:p>
@@ -1369,7 +1370,7 @@
           <a:p>
             <a:fld id="{07D736DE-8EAC-4233-BDD8-0A71E9306E4D}" type="datetime1">
               <a:rPr lang="fr-FR" smtClean="0"/>
-              <a:t>11/12/2016</a:t>
+              <a:t>12/12/2016</a:t>
             </a:fld>
             <a:endParaRPr lang="fr-FR"/>
           </a:p>
@@ -1598,7 +1599,7 @@
           <a:p>
             <a:fld id="{3F3EF361-BC71-40AD-851C-5917910CEE72}" type="datetime1">
               <a:rPr lang="fr-FR" smtClean="0"/>
-              <a:t>11/12/2016</a:t>
+              <a:t>12/12/2016</a:t>
             </a:fld>
             <a:endParaRPr lang="fr-FR"/>
           </a:p>
@@ -1962,7 +1963,7 @@
           <a:p>
             <a:fld id="{D40F95D9-4B6C-4F24-BA14-02A8E17C1586}" type="datetime1">
               <a:rPr lang="fr-FR" smtClean="0"/>
-              <a:t>11/12/2016</a:t>
+              <a:t>12/12/2016</a:t>
             </a:fld>
             <a:endParaRPr lang="fr-FR"/>
           </a:p>
@@ -2079,7 +2080,7 @@
           <a:p>
             <a:fld id="{99433A4D-FE3A-43E7-AE9A-985C59E6B99E}" type="datetime1">
               <a:rPr lang="fr-FR" smtClean="0"/>
-              <a:t>11/12/2016</a:t>
+              <a:t>12/12/2016</a:t>
             </a:fld>
             <a:endParaRPr lang="fr-FR"/>
           </a:p>
@@ -2174,7 +2175,7 @@
           <a:p>
             <a:fld id="{5A5EA5D9-98B8-48E3-97F1-67802972E83C}" type="datetime1">
               <a:rPr lang="fr-FR" smtClean="0"/>
-              <a:t>11/12/2016</a:t>
+              <a:t>12/12/2016</a:t>
             </a:fld>
             <a:endParaRPr lang="fr-FR"/>
           </a:p>
@@ -2449,7 +2450,7 @@
           <a:p>
             <a:fld id="{6BAC490B-EB41-47E8-939B-A86C55A99B29}" type="datetime1">
               <a:rPr lang="fr-FR" smtClean="0"/>
-              <a:t>11/12/2016</a:t>
+              <a:t>12/12/2016</a:t>
             </a:fld>
             <a:endParaRPr lang="fr-FR"/>
           </a:p>
@@ -2701,7 +2702,7 @@
           <a:p>
             <a:fld id="{F058E539-1B34-4709-A613-129214E18BB6}" type="datetime1">
               <a:rPr lang="fr-FR" smtClean="0"/>
-              <a:t>11/12/2016</a:t>
+              <a:t>12/12/2016</a:t>
             </a:fld>
             <a:endParaRPr lang="fr-FR"/>
           </a:p>
@@ -2922,7 +2923,7 @@
           <a:p>
             <a:fld id="{DB82AD0F-B180-4841-8D16-49122DBA59AC}" type="datetime1">
               <a:rPr lang="fr-FR" smtClean="0"/>
-              <a:t>11/12/2016</a:t>
+              <a:t>12/12/2016</a:t>
             </a:fld>
             <a:endParaRPr lang="fr-FR"/>
           </a:p>
@@ -3507,121 +3508,60 @@
             <a:pPr marL="0" indent="0">
               <a:buNone/>
             </a:pPr>
-            <a:endParaRPr lang="fr-FR" dirty="0"/>
-          </a:p>
-          <a:p>
-            <a:r>
-              <a:rPr lang="en-US" dirty="0" err="1"/>
-              <a:t>Fonctionnement</a:t>
-            </a:r>
-            <a:r>
-              <a:rPr lang="en-US" dirty="0"/>
-              <a:t> de </a:t>
-            </a:r>
-            <a:r>
-              <a:rPr lang="en-US" dirty="0" err="1"/>
-              <a:t>l’algorithme</a:t>
-            </a:r>
-            <a:r>
-              <a:rPr lang="en-US" dirty="0"/>
-              <a:t>  -&gt; </a:t>
-            </a:r>
-            <a:r>
-              <a:rPr lang="en-US" dirty="0" err="1"/>
-              <a:t>schéma</a:t>
-            </a:r>
-            <a:endParaRPr lang="en-US" dirty="0"/>
-          </a:p>
-          <a:p>
-            <a:r>
-              <a:rPr lang="en-US" dirty="0" err="1"/>
-              <a:t>Avantages</a:t>
-            </a:r>
-            <a:endParaRPr lang="en-US" dirty="0"/>
-          </a:p>
-          <a:p>
-            <a:pPr lvl="1"/>
-            <a:r>
-              <a:rPr lang="en-US" dirty="0" err="1"/>
-              <a:t>Trouver</a:t>
-            </a:r>
-            <a:r>
-              <a:rPr lang="en-US" dirty="0"/>
-              <a:t> </a:t>
-            </a:r>
-            <a:r>
-              <a:rPr lang="en-US" dirty="0" err="1"/>
-              <a:t>une</a:t>
-            </a:r>
-            <a:r>
-              <a:rPr lang="en-US" dirty="0"/>
-              <a:t> approximation de la bonne </a:t>
-            </a:r>
-            <a:r>
-              <a:rPr lang="en-US" dirty="0" err="1"/>
-              <a:t>réponse</a:t>
-            </a:r>
-            <a:r>
-              <a:rPr lang="en-US" dirty="0"/>
-              <a:t> </a:t>
-            </a:r>
-            <a:r>
-              <a:rPr lang="en-US" dirty="0" err="1"/>
-              <a:t>en</a:t>
-            </a:r>
-            <a:r>
-              <a:rPr lang="en-US" dirty="0"/>
-              <a:t> un temps </a:t>
-            </a:r>
-            <a:r>
-              <a:rPr lang="en-US" dirty="0" err="1"/>
-              <a:t>limité</a:t>
-            </a:r>
-            <a:endParaRPr lang="en-US" dirty="0"/>
-          </a:p>
-          <a:p>
-            <a:r>
-              <a:rPr lang="en-US" dirty="0" err="1"/>
-              <a:t>Inconvénients</a:t>
-            </a:r>
-            <a:endParaRPr lang="en-US" dirty="0"/>
-          </a:p>
-          <a:p>
-            <a:pPr lvl="1"/>
-            <a:r>
-              <a:rPr lang="en-US" dirty="0" err="1"/>
-              <a:t>Trouver</a:t>
-            </a:r>
-            <a:r>
-              <a:rPr lang="en-US" dirty="0"/>
-              <a:t> un </a:t>
-            </a:r>
-            <a:r>
-              <a:rPr lang="en-US" dirty="0" err="1"/>
-              <a:t>équilibre</a:t>
-            </a:r>
-            <a:r>
-              <a:rPr lang="en-US" dirty="0"/>
-              <a:t> entre et le </a:t>
-            </a:r>
-            <a:r>
-              <a:rPr lang="en-US" dirty="0" err="1"/>
-              <a:t>résultat</a:t>
-            </a:r>
-            <a:r>
-              <a:rPr lang="en-US" dirty="0"/>
-              <a:t> de </a:t>
-            </a:r>
-            <a:r>
-              <a:rPr lang="en-US" dirty="0" err="1"/>
-              <a:t>l’algorithme</a:t>
-            </a:r>
-            <a:endParaRPr lang="fr-FR" dirty="0"/>
-          </a:p>
-          <a:p>
-            <a:pPr marL="0" indent="0">
-              <a:buNone/>
+            <a:r>
+              <a:rPr lang="fr-FR" dirty="0" smtClean="0"/>
+              <a:t>Fonctionnement de l’algorithme:</a:t>
+            </a:r>
+          </a:p>
+          <a:p>
+            <a:pPr marL="971550" lvl="1" indent="-514350">
+              <a:buFont typeface="+mj-lt"/>
+              <a:buAutoNum type="arabicPeriod"/>
             </a:pPr>
+            <a:r>
+              <a:rPr lang="fr-FR" dirty="0" smtClean="0"/>
+              <a:t>Calcul du rang</a:t>
+            </a:r>
+          </a:p>
+          <a:p>
+            <a:pPr marL="971550" lvl="1" indent="-514350">
+              <a:buFont typeface="+mj-lt"/>
+              <a:buAutoNum type="arabicPeriod"/>
+            </a:pPr>
+            <a:r>
+              <a:rPr lang="fr-FR" dirty="0" smtClean="0"/>
+              <a:t>Mise en ordre des sommets</a:t>
+            </a:r>
+          </a:p>
+          <a:p>
+            <a:pPr marL="971550" lvl="1" indent="-514350">
+              <a:buFont typeface="+mj-lt"/>
+              <a:buAutoNum type="arabicPeriod"/>
+            </a:pPr>
+            <a:r>
+              <a:rPr lang="fr-FR" dirty="0" smtClean="0"/>
+              <a:t>Affectation des couleurs</a:t>
+            </a:r>
+          </a:p>
+          <a:p>
+            <a:pPr marL="1428750" lvl="2" indent="-514350">
+              <a:buFont typeface="+mj-lt"/>
+              <a:buAutoNum type="arabicPeriod"/>
+            </a:pPr>
+            <a:r>
+              <a:rPr lang="fr-FR" dirty="0" smtClean="0"/>
+              <a:t>Sommet avec le rang le plus élevé</a:t>
+            </a:r>
+          </a:p>
+          <a:p>
+            <a:pPr marL="1428750" lvl="2" indent="-514350">
+              <a:buFont typeface="+mj-lt"/>
+              <a:buAutoNum type="arabicPeriod"/>
+            </a:pPr>
+            <a:r>
+              <a:rPr lang="fr-FR" dirty="0" smtClean="0"/>
+              <a:t>Autres sommets valides</a:t>
+            </a:r>
             <a:endParaRPr lang="fr-FR" dirty="0"/>
           </a:p>
         </p:txBody>
@@ -3650,16 +3590,1801 @@
           </a:p>
         </p:txBody>
       </p:sp>
+      <p:sp>
+        <p:nvSpPr>
+          <p:cNvPr id="5" name="Ellipse 4"/>
+          <p:cNvSpPr/>
+          <p:nvPr/>
+        </p:nvSpPr>
+        <p:spPr>
+          <a:xfrm>
+            <a:off x="8612672" y="3088645"/>
+            <a:ext cx="489879" cy="460618"/>
+          </a:xfrm>
+          <a:prstGeom prst="ellipse">
+            <a:avLst/>
+          </a:prstGeom>
+          <a:solidFill>
+            <a:schemeClr val="bg1"/>
+          </a:solidFill>
+        </p:spPr>
+        <p:style>
+          <a:lnRef idx="2">
+            <a:schemeClr val="accent1">
+              <a:shade val="50%"/>
+            </a:schemeClr>
+          </a:lnRef>
+          <a:fillRef idx="1">
+            <a:schemeClr val="accent1"/>
+          </a:fillRef>
+          <a:effectRef idx="0">
+            <a:schemeClr val="accent1"/>
+          </a:effectRef>
+          <a:fontRef idx="minor">
+            <a:schemeClr val="lt1"/>
+          </a:fontRef>
+        </p:style>
+        <p:txBody>
+          <a:bodyPr rtlCol="0" anchor="ctr"/>
+          <a:lstStyle/>
+          <a:p>
+            <a:pPr algn="ctr"/>
+            <a:endParaRPr lang="fr-FR"/>
+          </a:p>
+        </p:txBody>
+      </p:sp>
+      <p:sp>
+        <p:nvSpPr>
+          <p:cNvPr id="6" name="Ellipse 5"/>
+          <p:cNvSpPr/>
+          <p:nvPr/>
+        </p:nvSpPr>
+        <p:spPr>
+          <a:xfrm>
+            <a:off x="6871667" y="3684993"/>
+            <a:ext cx="489879" cy="460618"/>
+          </a:xfrm>
+          <a:prstGeom prst="ellipse">
+            <a:avLst/>
+          </a:prstGeom>
+          <a:solidFill>
+            <a:schemeClr val="bg1"/>
+          </a:solidFill>
+        </p:spPr>
+        <p:style>
+          <a:lnRef idx="2">
+            <a:schemeClr val="accent1">
+              <a:shade val="50%"/>
+            </a:schemeClr>
+          </a:lnRef>
+          <a:fillRef idx="1">
+            <a:schemeClr val="accent1"/>
+          </a:fillRef>
+          <a:effectRef idx="0">
+            <a:schemeClr val="accent1"/>
+          </a:effectRef>
+          <a:fontRef idx="minor">
+            <a:schemeClr val="lt1"/>
+          </a:fontRef>
+        </p:style>
+        <p:txBody>
+          <a:bodyPr rtlCol="0" anchor="ctr"/>
+          <a:lstStyle/>
+          <a:p>
+            <a:pPr algn="ctr"/>
+            <a:endParaRPr lang="fr-FR"/>
+          </a:p>
+        </p:txBody>
+      </p:sp>
+      <p:sp>
+        <p:nvSpPr>
+          <p:cNvPr id="7" name="Ellipse 6"/>
+          <p:cNvSpPr/>
+          <p:nvPr/>
+        </p:nvSpPr>
+        <p:spPr>
+          <a:xfrm>
+            <a:off x="6878295" y="4997683"/>
+            <a:ext cx="489879" cy="460618"/>
+          </a:xfrm>
+          <a:prstGeom prst="ellipse">
+            <a:avLst/>
+          </a:prstGeom>
+          <a:solidFill>
+            <a:schemeClr val="bg1"/>
+          </a:solidFill>
+        </p:spPr>
+        <p:style>
+          <a:lnRef idx="2">
+            <a:schemeClr val="accent1">
+              <a:shade val="50%"/>
+            </a:schemeClr>
+          </a:lnRef>
+          <a:fillRef idx="1">
+            <a:schemeClr val="accent1"/>
+          </a:fillRef>
+          <a:effectRef idx="0">
+            <a:schemeClr val="accent1"/>
+          </a:effectRef>
+          <a:fontRef idx="minor">
+            <a:schemeClr val="lt1"/>
+          </a:fontRef>
+        </p:style>
+        <p:txBody>
+          <a:bodyPr rtlCol="0" anchor="ctr"/>
+          <a:lstStyle/>
+          <a:p>
+            <a:pPr algn="ctr"/>
+            <a:endParaRPr lang="fr-FR"/>
+          </a:p>
+        </p:txBody>
+      </p:sp>
+      <p:sp>
+        <p:nvSpPr>
+          <p:cNvPr id="8" name="Ellipse 7"/>
+          <p:cNvSpPr/>
+          <p:nvPr/>
+        </p:nvSpPr>
+        <p:spPr>
+          <a:xfrm>
+            <a:off x="9421054" y="4167835"/>
+            <a:ext cx="489879" cy="460618"/>
+          </a:xfrm>
+          <a:prstGeom prst="ellipse">
+            <a:avLst/>
+          </a:prstGeom>
+          <a:solidFill>
+            <a:schemeClr val="bg1"/>
+          </a:solidFill>
+        </p:spPr>
+        <p:style>
+          <a:lnRef idx="2">
+            <a:schemeClr val="accent1">
+              <a:shade val="50%"/>
+            </a:schemeClr>
+          </a:lnRef>
+          <a:fillRef idx="1">
+            <a:schemeClr val="accent1"/>
+          </a:fillRef>
+          <a:effectRef idx="0">
+            <a:schemeClr val="accent1"/>
+          </a:effectRef>
+          <a:fontRef idx="minor">
+            <a:schemeClr val="lt1"/>
+          </a:fontRef>
+        </p:style>
+        <p:txBody>
+          <a:bodyPr rtlCol="0" anchor="ctr"/>
+          <a:lstStyle/>
+          <a:p>
+            <a:pPr algn="ctr"/>
+            <a:endParaRPr lang="fr-FR"/>
+          </a:p>
+        </p:txBody>
+      </p:sp>
+      <p:sp>
+        <p:nvSpPr>
+          <p:cNvPr id="9" name="Ellipse 8"/>
+          <p:cNvSpPr/>
+          <p:nvPr/>
+        </p:nvSpPr>
+        <p:spPr>
+          <a:xfrm>
+            <a:off x="9739106" y="5057318"/>
+            <a:ext cx="489879" cy="460618"/>
+          </a:xfrm>
+          <a:prstGeom prst="ellipse">
+            <a:avLst/>
+          </a:prstGeom>
+          <a:solidFill>
+            <a:schemeClr val="bg1"/>
+          </a:solidFill>
+        </p:spPr>
+        <p:style>
+          <a:lnRef idx="2">
+            <a:schemeClr val="accent1">
+              <a:shade val="50%"/>
+            </a:schemeClr>
+          </a:lnRef>
+          <a:fillRef idx="1">
+            <a:schemeClr val="accent1"/>
+          </a:fillRef>
+          <a:effectRef idx="0">
+            <a:schemeClr val="accent1"/>
+          </a:effectRef>
+          <a:fontRef idx="minor">
+            <a:schemeClr val="lt1"/>
+          </a:fontRef>
+        </p:style>
+        <p:txBody>
+          <a:bodyPr rtlCol="0" anchor="ctr"/>
+          <a:lstStyle/>
+          <a:p>
+            <a:pPr algn="ctr"/>
+            <a:endParaRPr lang="fr-FR"/>
+          </a:p>
+        </p:txBody>
+      </p:sp>
+      <p:cxnSp>
+        <p:nvCxnSpPr>
+          <p:cNvPr id="10" name="Connecteur droit 9"/>
+          <p:cNvCxnSpPr>
+            <a:stCxn id="6" idx="6"/>
+            <a:endCxn id="8" idx="2"/>
+          </p:cNvCxnSpPr>
+          <p:nvPr/>
+        </p:nvCxnSpPr>
+        <p:spPr>
+          <a:xfrm>
+            <a:off x="7361546" y="3915302"/>
+            <a:ext cx="2059508" cy="482842"/>
+          </a:xfrm>
+          <a:prstGeom prst="line">
+            <a:avLst/>
+          </a:prstGeom>
+          <a:ln w="38100">
+            <a:solidFill>
+              <a:schemeClr val="tx1"/>
+            </a:solidFill>
+          </a:ln>
+        </p:spPr>
+        <p:style>
+          <a:lnRef idx="1">
+            <a:schemeClr val="accent1"/>
+          </a:lnRef>
+          <a:fillRef idx="0">
+            <a:schemeClr val="accent1"/>
+          </a:fillRef>
+          <a:effectRef idx="0">
+            <a:schemeClr val="accent1"/>
+          </a:effectRef>
+          <a:fontRef idx="minor">
+            <a:schemeClr val="tx1"/>
+          </a:fontRef>
+        </p:style>
+      </p:cxnSp>
+      <p:cxnSp>
+        <p:nvCxnSpPr>
+          <p:cNvPr id="11" name="Connecteur droit 10"/>
+          <p:cNvCxnSpPr>
+            <a:stCxn id="8" idx="5"/>
+            <a:endCxn id="9" idx="0"/>
+          </p:cNvCxnSpPr>
+          <p:nvPr/>
+        </p:nvCxnSpPr>
+        <p:spPr>
+          <a:xfrm>
+            <a:off x="9839192" y="4560997"/>
+            <a:ext cx="144854" cy="496321"/>
+          </a:xfrm>
+          <a:prstGeom prst="line">
+            <a:avLst/>
+          </a:prstGeom>
+          <a:ln w="38100">
+            <a:solidFill>
+              <a:schemeClr val="tx1"/>
+            </a:solidFill>
+          </a:ln>
+        </p:spPr>
+        <p:style>
+          <a:lnRef idx="1">
+            <a:schemeClr val="accent1"/>
+          </a:lnRef>
+          <a:fillRef idx="0">
+            <a:schemeClr val="accent1"/>
+          </a:fillRef>
+          <a:effectRef idx="0">
+            <a:schemeClr val="accent1"/>
+          </a:effectRef>
+          <a:fontRef idx="minor">
+            <a:schemeClr val="tx1"/>
+          </a:fontRef>
+        </p:style>
+      </p:cxnSp>
+      <p:cxnSp>
+        <p:nvCxnSpPr>
+          <p:cNvPr id="12" name="Connecteur droit 11"/>
+          <p:cNvCxnSpPr>
+            <a:stCxn id="5" idx="2"/>
+            <a:endCxn id="6" idx="7"/>
+          </p:cNvCxnSpPr>
+          <p:nvPr/>
+        </p:nvCxnSpPr>
+        <p:spPr>
+          <a:xfrm flipH="1">
+            <a:off x="7289805" y="3318954"/>
+            <a:ext cx="1322867" cy="433495"/>
+          </a:xfrm>
+          <a:prstGeom prst="line">
+            <a:avLst/>
+          </a:prstGeom>
+          <a:ln w="38100">
+            <a:solidFill>
+              <a:schemeClr val="tx1"/>
+            </a:solidFill>
+          </a:ln>
+        </p:spPr>
+        <p:style>
+          <a:lnRef idx="1">
+            <a:schemeClr val="accent1"/>
+          </a:lnRef>
+          <a:fillRef idx="0">
+            <a:schemeClr val="accent1"/>
+          </a:fillRef>
+          <a:effectRef idx="0">
+            <a:schemeClr val="accent1"/>
+          </a:effectRef>
+          <a:fontRef idx="minor">
+            <a:schemeClr val="tx1"/>
+          </a:fontRef>
+        </p:style>
+      </p:cxnSp>
+      <p:cxnSp>
+        <p:nvCxnSpPr>
+          <p:cNvPr id="13" name="Connecteur droit 12"/>
+          <p:cNvCxnSpPr>
+            <a:stCxn id="6" idx="4"/>
+            <a:endCxn id="7" idx="0"/>
+          </p:cNvCxnSpPr>
+          <p:nvPr/>
+        </p:nvCxnSpPr>
+        <p:spPr>
+          <a:xfrm>
+            <a:off x="7116607" y="4145611"/>
+            <a:ext cx="6628" cy="852072"/>
+          </a:xfrm>
+          <a:prstGeom prst="line">
+            <a:avLst/>
+          </a:prstGeom>
+          <a:ln w="38100">
+            <a:solidFill>
+              <a:schemeClr val="tx1"/>
+            </a:solidFill>
+          </a:ln>
+        </p:spPr>
+        <p:style>
+          <a:lnRef idx="1">
+            <a:schemeClr val="accent1"/>
+          </a:lnRef>
+          <a:fillRef idx="0">
+            <a:schemeClr val="accent1"/>
+          </a:fillRef>
+          <a:effectRef idx="0">
+            <a:schemeClr val="accent1"/>
+          </a:effectRef>
+          <a:fontRef idx="minor">
+            <a:schemeClr val="tx1"/>
+          </a:fontRef>
+        </p:style>
+      </p:cxnSp>
+      <p:cxnSp>
+        <p:nvCxnSpPr>
+          <p:cNvPr id="14" name="Connecteur droit 13"/>
+          <p:cNvCxnSpPr>
+            <a:stCxn id="8" idx="3"/>
+            <a:endCxn id="7" idx="7"/>
+          </p:cNvCxnSpPr>
+          <p:nvPr/>
+        </p:nvCxnSpPr>
+        <p:spPr>
+          <a:xfrm flipH="1">
+            <a:off x="7296433" y="4560997"/>
+            <a:ext cx="2196362" cy="504142"/>
+          </a:xfrm>
+          <a:prstGeom prst="line">
+            <a:avLst/>
+          </a:prstGeom>
+          <a:ln w="38100">
+            <a:solidFill>
+              <a:schemeClr val="tx1"/>
+            </a:solidFill>
+          </a:ln>
+        </p:spPr>
+        <p:style>
+          <a:lnRef idx="1">
+            <a:schemeClr val="accent1"/>
+          </a:lnRef>
+          <a:fillRef idx="0">
+            <a:schemeClr val="accent1"/>
+          </a:fillRef>
+          <a:effectRef idx="0">
+            <a:schemeClr val="accent1"/>
+          </a:effectRef>
+          <a:fontRef idx="minor">
+            <a:schemeClr val="tx1"/>
+          </a:fontRef>
+        </p:style>
+      </p:cxnSp>
+      <p:cxnSp>
+        <p:nvCxnSpPr>
+          <p:cNvPr id="15" name="Connecteur droit 14"/>
+          <p:cNvCxnSpPr>
+            <a:stCxn id="7" idx="6"/>
+            <a:endCxn id="9" idx="2"/>
+          </p:cNvCxnSpPr>
+          <p:nvPr/>
+        </p:nvCxnSpPr>
+        <p:spPr>
+          <a:xfrm>
+            <a:off x="7368174" y="5227992"/>
+            <a:ext cx="2370932" cy="59635"/>
+          </a:xfrm>
+          <a:prstGeom prst="line">
+            <a:avLst/>
+          </a:prstGeom>
+          <a:ln w="38100">
+            <a:solidFill>
+              <a:schemeClr val="tx1"/>
+            </a:solidFill>
+          </a:ln>
+        </p:spPr>
+        <p:style>
+          <a:lnRef idx="1">
+            <a:schemeClr val="accent1"/>
+          </a:lnRef>
+          <a:fillRef idx="0">
+            <a:schemeClr val="accent1"/>
+          </a:fillRef>
+          <a:effectRef idx="0">
+            <a:schemeClr val="accent1"/>
+          </a:effectRef>
+          <a:fontRef idx="minor">
+            <a:schemeClr val="tx1"/>
+          </a:fontRef>
+        </p:style>
+      </p:cxnSp>
+      <p:sp>
+        <p:nvSpPr>
+          <p:cNvPr id="21" name="ZoneTexte 20"/>
+          <p:cNvSpPr txBox="1"/>
+          <p:nvPr/>
+        </p:nvSpPr>
+        <p:spPr>
+          <a:xfrm>
+            <a:off x="8728523" y="2677298"/>
+            <a:ext cx="311440" cy="369332"/>
+          </a:xfrm>
+          <a:prstGeom prst="rect">
+            <a:avLst/>
+          </a:prstGeom>
+          <a:noFill/>
+        </p:spPr>
+        <p:txBody>
+          <a:bodyPr wrap="square" rtlCol="0">
+            <a:spAutoFit/>
+          </a:bodyPr>
+          <a:lstStyle/>
+          <a:p>
+            <a:r>
+              <a:rPr lang="fr-FR" dirty="0" smtClean="0"/>
+              <a:t>1</a:t>
+            </a:r>
+            <a:endParaRPr lang="fr-FR" dirty="0"/>
+          </a:p>
+        </p:txBody>
+      </p:sp>
+      <p:sp>
+        <p:nvSpPr>
+          <p:cNvPr id="22" name="ZoneTexte 21"/>
+          <p:cNvSpPr txBox="1"/>
+          <p:nvPr/>
+        </p:nvSpPr>
+        <p:spPr>
+          <a:xfrm>
+            <a:off x="7010214" y="3266096"/>
+            <a:ext cx="311440" cy="369332"/>
+          </a:xfrm>
+          <a:prstGeom prst="rect">
+            <a:avLst/>
+          </a:prstGeom>
+          <a:noFill/>
+        </p:spPr>
+        <p:txBody>
+          <a:bodyPr wrap="square" rtlCol="0">
+            <a:spAutoFit/>
+          </a:bodyPr>
+          <a:lstStyle/>
+          <a:p>
+            <a:r>
+              <a:rPr lang="fr-FR" dirty="0"/>
+              <a:t>3</a:t>
+            </a:r>
+          </a:p>
+        </p:txBody>
+      </p:sp>
+      <p:sp>
+        <p:nvSpPr>
+          <p:cNvPr id="23" name="ZoneTexte 22"/>
+          <p:cNvSpPr txBox="1"/>
+          <p:nvPr/>
+        </p:nvSpPr>
+        <p:spPr>
+          <a:xfrm>
+            <a:off x="9581221" y="3749989"/>
+            <a:ext cx="311440" cy="369332"/>
+          </a:xfrm>
+          <a:prstGeom prst="rect">
+            <a:avLst/>
+          </a:prstGeom>
+          <a:noFill/>
+        </p:spPr>
+        <p:txBody>
+          <a:bodyPr wrap="square" rtlCol="0">
+            <a:spAutoFit/>
+          </a:bodyPr>
+          <a:lstStyle/>
+          <a:p>
+            <a:r>
+              <a:rPr lang="fr-FR" dirty="0"/>
+              <a:t>3</a:t>
+            </a:r>
+          </a:p>
+        </p:txBody>
+      </p:sp>
+      <p:sp>
+        <p:nvSpPr>
+          <p:cNvPr id="24" name="ZoneTexte 23"/>
+          <p:cNvSpPr txBox="1"/>
+          <p:nvPr/>
+        </p:nvSpPr>
+        <p:spPr>
+          <a:xfrm>
+            <a:off x="9854957" y="5616809"/>
+            <a:ext cx="311440" cy="369332"/>
+          </a:xfrm>
+          <a:prstGeom prst="rect">
+            <a:avLst/>
+          </a:prstGeom>
+          <a:noFill/>
+        </p:spPr>
+        <p:txBody>
+          <a:bodyPr wrap="square" rtlCol="0">
+            <a:spAutoFit/>
+          </a:bodyPr>
+          <a:lstStyle/>
+          <a:p>
+            <a:r>
+              <a:rPr lang="fr-FR" dirty="0"/>
+              <a:t>2</a:t>
+            </a:r>
+          </a:p>
+        </p:txBody>
+      </p:sp>
+      <p:sp>
+        <p:nvSpPr>
+          <p:cNvPr id="25" name="ZoneTexte 24"/>
+          <p:cNvSpPr txBox="1"/>
+          <p:nvPr/>
+        </p:nvSpPr>
+        <p:spPr>
+          <a:xfrm>
+            <a:off x="6987518" y="5533949"/>
+            <a:ext cx="311440" cy="369332"/>
+          </a:xfrm>
+          <a:prstGeom prst="rect">
+            <a:avLst/>
+          </a:prstGeom>
+          <a:noFill/>
+        </p:spPr>
+        <p:txBody>
+          <a:bodyPr wrap="square" rtlCol="0">
+            <a:spAutoFit/>
+          </a:bodyPr>
+          <a:lstStyle/>
+          <a:p>
+            <a:r>
+              <a:rPr lang="fr-FR" dirty="0" smtClean="0"/>
+              <a:t>3</a:t>
+            </a:r>
+          </a:p>
+        </p:txBody>
+      </p:sp>
+      <p:sp>
+        <p:nvSpPr>
+          <p:cNvPr id="26" name="ZoneTexte 25"/>
+          <p:cNvSpPr txBox="1"/>
+          <p:nvPr/>
+        </p:nvSpPr>
+        <p:spPr>
+          <a:xfrm>
+            <a:off x="7016842" y="3762867"/>
+            <a:ext cx="311440" cy="369332"/>
+          </a:xfrm>
+          <a:prstGeom prst="rect">
+            <a:avLst/>
+          </a:prstGeom>
+          <a:noFill/>
+        </p:spPr>
+        <p:txBody>
+          <a:bodyPr wrap="square" rtlCol="0">
+            <a:spAutoFit/>
+          </a:bodyPr>
+          <a:lstStyle/>
+          <a:p>
+            <a:r>
+              <a:rPr lang="fr-FR" dirty="0" smtClean="0"/>
+              <a:t>1</a:t>
+            </a:r>
+            <a:endParaRPr lang="fr-FR" dirty="0"/>
+          </a:p>
+        </p:txBody>
+      </p:sp>
+      <p:sp>
+        <p:nvSpPr>
+          <p:cNvPr id="27" name="ZoneTexte 26"/>
+          <p:cNvSpPr txBox="1"/>
+          <p:nvPr/>
+        </p:nvSpPr>
+        <p:spPr>
+          <a:xfrm>
+            <a:off x="9584256" y="4238907"/>
+            <a:ext cx="311440" cy="369332"/>
+          </a:xfrm>
+          <a:prstGeom prst="rect">
+            <a:avLst/>
+          </a:prstGeom>
+          <a:noFill/>
+        </p:spPr>
+        <p:txBody>
+          <a:bodyPr wrap="square" rtlCol="0">
+            <a:spAutoFit/>
+          </a:bodyPr>
+          <a:lstStyle/>
+          <a:p>
+            <a:r>
+              <a:rPr lang="fr-FR" dirty="0"/>
+              <a:t>2</a:t>
+            </a:r>
+          </a:p>
+        </p:txBody>
+      </p:sp>
+      <p:sp>
+        <p:nvSpPr>
+          <p:cNvPr id="28" name="ZoneTexte 27"/>
+          <p:cNvSpPr txBox="1"/>
+          <p:nvPr/>
+        </p:nvSpPr>
+        <p:spPr>
+          <a:xfrm>
+            <a:off x="7016842" y="5056893"/>
+            <a:ext cx="311440" cy="369332"/>
+          </a:xfrm>
+          <a:prstGeom prst="rect">
+            <a:avLst/>
+          </a:prstGeom>
+          <a:noFill/>
+        </p:spPr>
+        <p:txBody>
+          <a:bodyPr wrap="square" rtlCol="0">
+            <a:spAutoFit/>
+          </a:bodyPr>
+          <a:lstStyle/>
+          <a:p>
+            <a:r>
+              <a:rPr lang="fr-FR" dirty="0" smtClean="0"/>
+              <a:t>3</a:t>
+            </a:r>
+          </a:p>
+        </p:txBody>
+      </p:sp>
+      <p:sp>
+        <p:nvSpPr>
+          <p:cNvPr id="29" name="ZoneTexte 28"/>
+          <p:cNvSpPr txBox="1"/>
+          <p:nvPr/>
+        </p:nvSpPr>
+        <p:spPr>
+          <a:xfrm>
+            <a:off x="9939046" y="5128911"/>
+            <a:ext cx="311440" cy="369332"/>
+          </a:xfrm>
+          <a:prstGeom prst="rect">
+            <a:avLst/>
+          </a:prstGeom>
+          <a:noFill/>
+        </p:spPr>
+        <p:txBody>
+          <a:bodyPr wrap="square" rtlCol="0">
+            <a:spAutoFit/>
+          </a:bodyPr>
+          <a:lstStyle/>
+          <a:p>
+            <a:r>
+              <a:rPr lang="fr-FR" dirty="0"/>
+              <a:t>4</a:t>
+            </a:r>
+          </a:p>
+        </p:txBody>
+      </p:sp>
+      <p:sp>
+        <p:nvSpPr>
+          <p:cNvPr id="30" name="ZoneTexte 29"/>
+          <p:cNvSpPr txBox="1"/>
+          <p:nvPr/>
+        </p:nvSpPr>
+        <p:spPr>
+          <a:xfrm>
+            <a:off x="8798570" y="3126148"/>
+            <a:ext cx="311440" cy="369332"/>
+          </a:xfrm>
+          <a:prstGeom prst="rect">
+            <a:avLst/>
+          </a:prstGeom>
+          <a:noFill/>
+        </p:spPr>
+        <p:txBody>
+          <a:bodyPr wrap="square" rtlCol="0">
+            <a:spAutoFit/>
+          </a:bodyPr>
+          <a:lstStyle/>
+          <a:p>
+            <a:r>
+              <a:rPr lang="fr-FR" dirty="0"/>
+              <a:t>5</a:t>
+            </a:r>
+          </a:p>
+        </p:txBody>
+      </p:sp>
+      <p:sp>
+        <p:nvSpPr>
+          <p:cNvPr id="32" name="Ellipse 31"/>
+          <p:cNvSpPr/>
+          <p:nvPr/>
+        </p:nvSpPr>
+        <p:spPr>
+          <a:xfrm>
+            <a:off x="6873739" y="3684961"/>
+            <a:ext cx="489879" cy="460618"/>
+          </a:xfrm>
+          <a:prstGeom prst="ellipse">
+            <a:avLst/>
+          </a:prstGeom>
+          <a:solidFill>
+            <a:schemeClr val="accent2"/>
+          </a:solidFill>
+        </p:spPr>
+        <p:style>
+          <a:lnRef idx="2">
+            <a:schemeClr val="accent1">
+              <a:shade val="50%"/>
+            </a:schemeClr>
+          </a:lnRef>
+          <a:fillRef idx="1">
+            <a:schemeClr val="accent1"/>
+          </a:fillRef>
+          <a:effectRef idx="0">
+            <a:schemeClr val="accent1"/>
+          </a:effectRef>
+          <a:fontRef idx="minor">
+            <a:schemeClr val="lt1"/>
+          </a:fontRef>
+        </p:style>
+        <p:txBody>
+          <a:bodyPr rtlCol="0" anchor="ctr"/>
+          <a:lstStyle/>
+          <a:p>
+            <a:pPr algn="ctr"/>
+            <a:endParaRPr lang="fr-FR"/>
+          </a:p>
+        </p:txBody>
+      </p:sp>
+      <p:sp>
+        <p:nvSpPr>
+          <p:cNvPr id="33" name="Ellipse 32"/>
+          <p:cNvSpPr/>
+          <p:nvPr/>
+        </p:nvSpPr>
+        <p:spPr>
+          <a:xfrm>
+            <a:off x="9738749" y="5068975"/>
+            <a:ext cx="489879" cy="460618"/>
+          </a:xfrm>
+          <a:prstGeom prst="ellipse">
+            <a:avLst/>
+          </a:prstGeom>
+          <a:solidFill>
+            <a:schemeClr val="accent2"/>
+          </a:solidFill>
+        </p:spPr>
+        <p:style>
+          <a:lnRef idx="2">
+            <a:schemeClr val="accent1">
+              <a:shade val="50%"/>
+            </a:schemeClr>
+          </a:lnRef>
+          <a:fillRef idx="1">
+            <a:schemeClr val="accent1"/>
+          </a:fillRef>
+          <a:effectRef idx="0">
+            <a:schemeClr val="accent1"/>
+          </a:effectRef>
+          <a:fontRef idx="minor">
+            <a:schemeClr val="lt1"/>
+          </a:fontRef>
+        </p:style>
+        <p:txBody>
+          <a:bodyPr rtlCol="0" anchor="ctr"/>
+          <a:lstStyle/>
+          <a:p>
+            <a:pPr algn="ctr"/>
+            <a:endParaRPr lang="fr-FR"/>
+          </a:p>
+        </p:txBody>
+      </p:sp>
+      <p:sp>
+        <p:nvSpPr>
+          <p:cNvPr id="34" name="Ellipse 33"/>
+          <p:cNvSpPr/>
+          <p:nvPr/>
+        </p:nvSpPr>
+        <p:spPr>
+          <a:xfrm>
+            <a:off x="9421054" y="4162796"/>
+            <a:ext cx="489879" cy="460618"/>
+          </a:xfrm>
+          <a:prstGeom prst="ellipse">
+            <a:avLst/>
+          </a:prstGeom>
+          <a:solidFill>
+            <a:schemeClr val="accent1"/>
+          </a:solidFill>
+        </p:spPr>
+        <p:style>
+          <a:lnRef idx="2">
+            <a:schemeClr val="accent1">
+              <a:shade val="50%"/>
+            </a:schemeClr>
+          </a:lnRef>
+          <a:fillRef idx="1">
+            <a:schemeClr val="accent1"/>
+          </a:fillRef>
+          <a:effectRef idx="0">
+            <a:schemeClr val="accent1"/>
+          </a:effectRef>
+          <a:fontRef idx="minor">
+            <a:schemeClr val="lt1"/>
+          </a:fontRef>
+        </p:style>
+        <p:txBody>
+          <a:bodyPr rtlCol="0" anchor="ctr"/>
+          <a:lstStyle/>
+          <a:p>
+            <a:pPr algn="ctr"/>
+            <a:endParaRPr lang="fr-FR"/>
+          </a:p>
+        </p:txBody>
+      </p:sp>
+      <p:sp>
+        <p:nvSpPr>
+          <p:cNvPr id="35" name="Ellipse 34"/>
+          <p:cNvSpPr/>
+          <p:nvPr/>
+        </p:nvSpPr>
+        <p:spPr>
+          <a:xfrm>
+            <a:off x="8610600" y="3088645"/>
+            <a:ext cx="489879" cy="460618"/>
+          </a:xfrm>
+          <a:prstGeom prst="ellipse">
+            <a:avLst/>
+          </a:prstGeom>
+          <a:solidFill>
+            <a:schemeClr val="accent1"/>
+          </a:solidFill>
+        </p:spPr>
+        <p:style>
+          <a:lnRef idx="2">
+            <a:schemeClr val="accent1">
+              <a:shade val="50%"/>
+            </a:schemeClr>
+          </a:lnRef>
+          <a:fillRef idx="1">
+            <a:schemeClr val="accent1"/>
+          </a:fillRef>
+          <a:effectRef idx="0">
+            <a:schemeClr val="accent1"/>
+          </a:effectRef>
+          <a:fontRef idx="minor">
+            <a:schemeClr val="lt1"/>
+          </a:fontRef>
+        </p:style>
+        <p:txBody>
+          <a:bodyPr rtlCol="0" anchor="ctr"/>
+          <a:lstStyle/>
+          <a:p>
+            <a:pPr algn="ctr"/>
+            <a:endParaRPr lang="fr-FR"/>
+          </a:p>
+        </p:txBody>
+      </p:sp>
+      <p:sp>
+        <p:nvSpPr>
+          <p:cNvPr id="36" name="Ellipse 35"/>
+          <p:cNvSpPr/>
+          <p:nvPr/>
+        </p:nvSpPr>
+        <p:spPr>
+          <a:xfrm>
+            <a:off x="6871667" y="4997949"/>
+            <a:ext cx="489879" cy="460618"/>
+          </a:xfrm>
+          <a:prstGeom prst="ellipse">
+            <a:avLst/>
+          </a:prstGeom>
+          <a:solidFill>
+            <a:schemeClr val="accent6"/>
+          </a:solidFill>
+        </p:spPr>
+        <p:style>
+          <a:lnRef idx="2">
+            <a:schemeClr val="accent1">
+              <a:shade val="50%"/>
+            </a:schemeClr>
+          </a:lnRef>
+          <a:fillRef idx="1">
+            <a:schemeClr val="accent1"/>
+          </a:fillRef>
+          <a:effectRef idx="0">
+            <a:schemeClr val="accent1"/>
+          </a:effectRef>
+          <a:fontRef idx="minor">
+            <a:schemeClr val="lt1"/>
+          </a:fontRef>
+        </p:style>
+        <p:txBody>
+          <a:bodyPr rtlCol="0" anchor="ctr"/>
+          <a:lstStyle/>
+          <a:p>
+            <a:pPr algn="ctr"/>
+            <a:endParaRPr lang="fr-FR"/>
+          </a:p>
+        </p:txBody>
+      </p:sp>
     </p:spTree>
     <p:extLst>
       <p:ext uri="{BB962C8B-B14F-4D97-AF65-F5344CB8AC3E}">
-        <p14:creationId xmlns:p14="http://schemas.microsoft.com/office/powerpoint/2010/main" val="2311396477"/>
+        <p14:creationId xmlns:p14="http://schemas.microsoft.com/office/powerpoint/2010/main" val="3113962469"/>
       </p:ext>
     </p:extLst>
   </p:cSld>
   <p:clrMapOvr>
     <a:masterClrMapping/>
   </p:clrMapOvr>
+  <mc:AlternateContent xmlns:mc="http://schemas.openxmlformats.org/markup-compatibility/2006">
+    <mc:Choice xmlns:p14="http://schemas.microsoft.com/office/powerpoint/2010/main" Requires="p14">
+      <p:transition spd="med" p14:dur="700">
+        <p:fade/>
+      </p:transition>
+    </mc:Choice>
+    <mc:Fallback>
+      <p:transition spd="med">
+        <p:fade/>
+      </p:transition>
+    </mc:Fallback>
+  </mc:AlternateContent>
+  <p:timing>
+    <p:tnLst>
+      <p:par>
+        <p:cTn id="1" dur="indefinite" restart="never" nodeType="tmRoot">
+          <p:childTnLst>
+            <p:seq concurrent="1" nextAc="seek">
+              <p:cTn id="2" dur="indefinite" nodeType="mainSeq">
+                <p:childTnLst>
+                  <p:par>
+                    <p:cTn id="3" fill="hold">
+                      <p:stCondLst>
+                        <p:cond delay="indefinite"/>
+                      </p:stCondLst>
+                      <p:childTnLst>
+                        <p:par>
+                          <p:cTn id="4" fill="hold">
+                            <p:stCondLst>
+                              <p:cond delay="0"/>
+                            </p:stCondLst>
+                            <p:childTnLst>
+                              <p:par>
+                                <p:cTn id="5" presetID="1" presetClass="entr" presetSubtype="0" fill="hold" nodeType="clickEffect">
+                                  <p:stCondLst>
+                                    <p:cond delay="0"/>
+                                  </p:stCondLst>
+                                  <p:childTnLst>
+                                    <p:set>
+                                      <p:cBhvr>
+                                        <p:cTn id="6" dur="1" fill="hold">
+                                          <p:stCondLst>
+                                            <p:cond delay="0"/>
+                                          </p:stCondLst>
+                                        </p:cTn>
+                                        <p:tgtEl>
+                                          <p:spTgt spid="3">
+                                            <p:txEl>
+                                              <p:pRg st="1" end="1"/>
+                                            </p:txEl>
+                                          </p:spTgt>
+                                        </p:tgtEl>
+                                        <p:attrNameLst>
+                                          <p:attrName>style.visibility</p:attrName>
+                                        </p:attrNameLst>
+                                      </p:cBhvr>
+                                      <p:to>
+                                        <p:strVal val="visible"/>
+                                      </p:to>
+                                    </p:set>
+                                  </p:childTnLst>
+                                </p:cTn>
+                              </p:par>
+                            </p:childTnLst>
+                          </p:cTn>
+                        </p:par>
+                      </p:childTnLst>
+                    </p:cTn>
+                  </p:par>
+                  <p:par>
+                    <p:cTn id="7" fill="hold">
+                      <p:stCondLst>
+                        <p:cond delay="indefinite"/>
+                      </p:stCondLst>
+                      <p:childTnLst>
+                        <p:par>
+                          <p:cTn id="8" fill="hold">
+                            <p:stCondLst>
+                              <p:cond delay="0"/>
+                            </p:stCondLst>
+                            <p:childTnLst>
+                              <p:par>
+                                <p:cTn id="9" presetID="1" presetClass="entr" presetSubtype="0" fill="hold" grpId="0" nodeType="clickEffect">
+                                  <p:stCondLst>
+                                    <p:cond delay="0"/>
+                                  </p:stCondLst>
+                                  <p:childTnLst>
+                                    <p:set>
+                                      <p:cBhvr>
+                                        <p:cTn id="10" dur="1" fill="hold">
+                                          <p:stCondLst>
+                                            <p:cond delay="0"/>
+                                          </p:stCondLst>
+                                        </p:cTn>
+                                        <p:tgtEl>
+                                          <p:spTgt spid="21"/>
+                                        </p:tgtEl>
+                                        <p:attrNameLst>
+                                          <p:attrName>style.visibility</p:attrName>
+                                        </p:attrNameLst>
+                                      </p:cBhvr>
+                                      <p:to>
+                                        <p:strVal val="visible"/>
+                                      </p:to>
+                                    </p:set>
+                                  </p:childTnLst>
+                                </p:cTn>
+                              </p:par>
+                              <p:par>
+                                <p:cTn id="11" presetID="1" presetClass="entr" presetSubtype="0" fill="hold" grpId="0" nodeType="withEffect">
+                                  <p:stCondLst>
+                                    <p:cond delay="0"/>
+                                  </p:stCondLst>
+                                  <p:childTnLst>
+                                    <p:set>
+                                      <p:cBhvr>
+                                        <p:cTn id="12" dur="1" fill="hold">
+                                          <p:stCondLst>
+                                            <p:cond delay="0"/>
+                                          </p:stCondLst>
+                                        </p:cTn>
+                                        <p:tgtEl>
+                                          <p:spTgt spid="22"/>
+                                        </p:tgtEl>
+                                        <p:attrNameLst>
+                                          <p:attrName>style.visibility</p:attrName>
+                                        </p:attrNameLst>
+                                      </p:cBhvr>
+                                      <p:to>
+                                        <p:strVal val="visible"/>
+                                      </p:to>
+                                    </p:set>
+                                  </p:childTnLst>
+                                </p:cTn>
+                              </p:par>
+                              <p:par>
+                                <p:cTn id="13" presetID="1" presetClass="entr" presetSubtype="0" fill="hold" grpId="0" nodeType="withEffect">
+                                  <p:stCondLst>
+                                    <p:cond delay="0"/>
+                                  </p:stCondLst>
+                                  <p:childTnLst>
+                                    <p:set>
+                                      <p:cBhvr>
+                                        <p:cTn id="14" dur="1" fill="hold">
+                                          <p:stCondLst>
+                                            <p:cond delay="0"/>
+                                          </p:stCondLst>
+                                        </p:cTn>
+                                        <p:tgtEl>
+                                          <p:spTgt spid="25"/>
+                                        </p:tgtEl>
+                                        <p:attrNameLst>
+                                          <p:attrName>style.visibility</p:attrName>
+                                        </p:attrNameLst>
+                                      </p:cBhvr>
+                                      <p:to>
+                                        <p:strVal val="visible"/>
+                                      </p:to>
+                                    </p:set>
+                                  </p:childTnLst>
+                                </p:cTn>
+                              </p:par>
+                              <p:par>
+                                <p:cTn id="15" presetID="1" presetClass="entr" presetSubtype="0" fill="hold" grpId="0" nodeType="withEffect">
+                                  <p:stCondLst>
+                                    <p:cond delay="0"/>
+                                  </p:stCondLst>
+                                  <p:childTnLst>
+                                    <p:set>
+                                      <p:cBhvr>
+                                        <p:cTn id="16" dur="1" fill="hold">
+                                          <p:stCondLst>
+                                            <p:cond delay="0"/>
+                                          </p:stCondLst>
+                                        </p:cTn>
+                                        <p:tgtEl>
+                                          <p:spTgt spid="24"/>
+                                        </p:tgtEl>
+                                        <p:attrNameLst>
+                                          <p:attrName>style.visibility</p:attrName>
+                                        </p:attrNameLst>
+                                      </p:cBhvr>
+                                      <p:to>
+                                        <p:strVal val="visible"/>
+                                      </p:to>
+                                    </p:set>
+                                  </p:childTnLst>
+                                </p:cTn>
+                              </p:par>
+                              <p:par>
+                                <p:cTn id="17" presetID="1" presetClass="entr" presetSubtype="0" fill="hold" grpId="0" nodeType="withEffect">
+                                  <p:stCondLst>
+                                    <p:cond delay="0"/>
+                                  </p:stCondLst>
+                                  <p:childTnLst>
+                                    <p:set>
+                                      <p:cBhvr>
+                                        <p:cTn id="18" dur="1" fill="hold">
+                                          <p:stCondLst>
+                                            <p:cond delay="0"/>
+                                          </p:stCondLst>
+                                        </p:cTn>
+                                        <p:tgtEl>
+                                          <p:spTgt spid="23"/>
+                                        </p:tgtEl>
+                                        <p:attrNameLst>
+                                          <p:attrName>style.visibility</p:attrName>
+                                        </p:attrNameLst>
+                                      </p:cBhvr>
+                                      <p:to>
+                                        <p:strVal val="visible"/>
+                                      </p:to>
+                                    </p:set>
+                                  </p:childTnLst>
+                                </p:cTn>
+                              </p:par>
+                            </p:childTnLst>
+                          </p:cTn>
+                        </p:par>
+                      </p:childTnLst>
+                    </p:cTn>
+                  </p:par>
+                  <p:par>
+                    <p:cTn id="19" fill="hold">
+                      <p:stCondLst>
+                        <p:cond delay="indefinite"/>
+                      </p:stCondLst>
+                      <p:childTnLst>
+                        <p:par>
+                          <p:cTn id="20" fill="hold">
+                            <p:stCondLst>
+                              <p:cond delay="0"/>
+                            </p:stCondLst>
+                            <p:childTnLst>
+                              <p:par>
+                                <p:cTn id="21" presetID="1" presetClass="entr" presetSubtype="0" fill="hold" nodeType="clickEffect">
+                                  <p:stCondLst>
+                                    <p:cond delay="0"/>
+                                  </p:stCondLst>
+                                  <p:childTnLst>
+                                    <p:set>
+                                      <p:cBhvr>
+                                        <p:cTn id="22" dur="1" fill="hold">
+                                          <p:stCondLst>
+                                            <p:cond delay="0"/>
+                                          </p:stCondLst>
+                                        </p:cTn>
+                                        <p:tgtEl>
+                                          <p:spTgt spid="3">
+                                            <p:txEl>
+                                              <p:pRg st="2" end="2"/>
+                                            </p:txEl>
+                                          </p:spTgt>
+                                        </p:tgtEl>
+                                        <p:attrNameLst>
+                                          <p:attrName>style.visibility</p:attrName>
+                                        </p:attrNameLst>
+                                      </p:cBhvr>
+                                      <p:to>
+                                        <p:strVal val="visible"/>
+                                      </p:to>
+                                    </p:set>
+                                  </p:childTnLst>
+                                </p:cTn>
+                              </p:par>
+                            </p:childTnLst>
+                          </p:cTn>
+                        </p:par>
+                      </p:childTnLst>
+                    </p:cTn>
+                  </p:par>
+                  <p:par>
+                    <p:cTn id="23" fill="hold">
+                      <p:stCondLst>
+                        <p:cond delay="indefinite"/>
+                      </p:stCondLst>
+                      <p:childTnLst>
+                        <p:par>
+                          <p:cTn id="24" fill="hold">
+                            <p:stCondLst>
+                              <p:cond delay="0"/>
+                            </p:stCondLst>
+                            <p:childTnLst>
+                              <p:par>
+                                <p:cTn id="25" presetID="1" presetClass="entr" presetSubtype="0" fill="hold" grpId="0" nodeType="clickEffect">
+                                  <p:stCondLst>
+                                    <p:cond delay="0"/>
+                                  </p:stCondLst>
+                                  <p:childTnLst>
+                                    <p:set>
+                                      <p:cBhvr>
+                                        <p:cTn id="26" dur="1" fill="hold">
+                                          <p:stCondLst>
+                                            <p:cond delay="0"/>
+                                          </p:stCondLst>
+                                        </p:cTn>
+                                        <p:tgtEl>
+                                          <p:spTgt spid="26"/>
+                                        </p:tgtEl>
+                                        <p:attrNameLst>
+                                          <p:attrName>style.visibility</p:attrName>
+                                        </p:attrNameLst>
+                                      </p:cBhvr>
+                                      <p:to>
+                                        <p:strVal val="visible"/>
+                                      </p:to>
+                                    </p:set>
+                                  </p:childTnLst>
+                                </p:cTn>
+                              </p:par>
+                              <p:par>
+                                <p:cTn id="27" presetID="1" presetClass="entr" presetSubtype="0" fill="hold" grpId="0" nodeType="withEffect">
+                                  <p:stCondLst>
+                                    <p:cond delay="0"/>
+                                  </p:stCondLst>
+                                  <p:childTnLst>
+                                    <p:set>
+                                      <p:cBhvr>
+                                        <p:cTn id="28" dur="1" fill="hold">
+                                          <p:stCondLst>
+                                            <p:cond delay="0"/>
+                                          </p:stCondLst>
+                                        </p:cTn>
+                                        <p:tgtEl>
+                                          <p:spTgt spid="30"/>
+                                        </p:tgtEl>
+                                        <p:attrNameLst>
+                                          <p:attrName>style.visibility</p:attrName>
+                                        </p:attrNameLst>
+                                      </p:cBhvr>
+                                      <p:to>
+                                        <p:strVal val="visible"/>
+                                      </p:to>
+                                    </p:set>
+                                  </p:childTnLst>
+                                </p:cTn>
+                              </p:par>
+                              <p:par>
+                                <p:cTn id="29" presetID="1" presetClass="entr" presetSubtype="0" fill="hold" grpId="0" nodeType="withEffect">
+                                  <p:stCondLst>
+                                    <p:cond delay="0"/>
+                                  </p:stCondLst>
+                                  <p:childTnLst>
+                                    <p:set>
+                                      <p:cBhvr>
+                                        <p:cTn id="30" dur="1" fill="hold">
+                                          <p:stCondLst>
+                                            <p:cond delay="0"/>
+                                          </p:stCondLst>
+                                        </p:cTn>
+                                        <p:tgtEl>
+                                          <p:spTgt spid="28"/>
+                                        </p:tgtEl>
+                                        <p:attrNameLst>
+                                          <p:attrName>style.visibility</p:attrName>
+                                        </p:attrNameLst>
+                                      </p:cBhvr>
+                                      <p:to>
+                                        <p:strVal val="visible"/>
+                                      </p:to>
+                                    </p:set>
+                                  </p:childTnLst>
+                                </p:cTn>
+                              </p:par>
+                              <p:par>
+                                <p:cTn id="31" presetID="1" presetClass="entr" presetSubtype="0" fill="hold" grpId="0" nodeType="withEffect">
+                                  <p:stCondLst>
+                                    <p:cond delay="0"/>
+                                  </p:stCondLst>
+                                  <p:childTnLst>
+                                    <p:set>
+                                      <p:cBhvr>
+                                        <p:cTn id="32" dur="1" fill="hold">
+                                          <p:stCondLst>
+                                            <p:cond delay="0"/>
+                                          </p:stCondLst>
+                                        </p:cTn>
+                                        <p:tgtEl>
+                                          <p:spTgt spid="27"/>
+                                        </p:tgtEl>
+                                        <p:attrNameLst>
+                                          <p:attrName>style.visibility</p:attrName>
+                                        </p:attrNameLst>
+                                      </p:cBhvr>
+                                      <p:to>
+                                        <p:strVal val="visible"/>
+                                      </p:to>
+                                    </p:set>
+                                  </p:childTnLst>
+                                </p:cTn>
+                              </p:par>
+                              <p:par>
+                                <p:cTn id="33" presetID="1" presetClass="entr" presetSubtype="0" fill="hold" grpId="0" nodeType="withEffect">
+                                  <p:stCondLst>
+                                    <p:cond delay="0"/>
+                                  </p:stCondLst>
+                                  <p:childTnLst>
+                                    <p:set>
+                                      <p:cBhvr>
+                                        <p:cTn id="34" dur="1" fill="hold">
+                                          <p:stCondLst>
+                                            <p:cond delay="0"/>
+                                          </p:stCondLst>
+                                        </p:cTn>
+                                        <p:tgtEl>
+                                          <p:spTgt spid="29"/>
+                                        </p:tgtEl>
+                                        <p:attrNameLst>
+                                          <p:attrName>style.visibility</p:attrName>
+                                        </p:attrNameLst>
+                                      </p:cBhvr>
+                                      <p:to>
+                                        <p:strVal val="visible"/>
+                                      </p:to>
+                                    </p:set>
+                                  </p:childTnLst>
+                                </p:cTn>
+                              </p:par>
+                            </p:childTnLst>
+                          </p:cTn>
+                        </p:par>
+                      </p:childTnLst>
+                    </p:cTn>
+                  </p:par>
+                  <p:par>
+                    <p:cTn id="35" fill="hold">
+                      <p:stCondLst>
+                        <p:cond delay="indefinite"/>
+                      </p:stCondLst>
+                      <p:childTnLst>
+                        <p:par>
+                          <p:cTn id="36" fill="hold">
+                            <p:stCondLst>
+                              <p:cond delay="0"/>
+                            </p:stCondLst>
+                            <p:childTnLst>
+                              <p:par>
+                                <p:cTn id="37" presetID="1" presetClass="entr" presetSubtype="0" fill="hold" nodeType="clickEffect">
+                                  <p:stCondLst>
+                                    <p:cond delay="0"/>
+                                  </p:stCondLst>
+                                  <p:childTnLst>
+                                    <p:set>
+                                      <p:cBhvr>
+                                        <p:cTn id="38" dur="1" fill="hold">
+                                          <p:stCondLst>
+                                            <p:cond delay="0"/>
+                                          </p:stCondLst>
+                                        </p:cTn>
+                                        <p:tgtEl>
+                                          <p:spTgt spid="3">
+                                            <p:txEl>
+                                              <p:pRg st="3" end="3"/>
+                                            </p:txEl>
+                                          </p:spTgt>
+                                        </p:tgtEl>
+                                        <p:attrNameLst>
+                                          <p:attrName>style.visibility</p:attrName>
+                                        </p:attrNameLst>
+                                      </p:cBhvr>
+                                      <p:to>
+                                        <p:strVal val="visible"/>
+                                      </p:to>
+                                    </p:set>
+                                  </p:childTnLst>
+                                </p:cTn>
+                              </p:par>
+                            </p:childTnLst>
+                          </p:cTn>
+                        </p:par>
+                      </p:childTnLst>
+                    </p:cTn>
+                  </p:par>
+                  <p:par>
+                    <p:cTn id="39" fill="hold">
+                      <p:stCondLst>
+                        <p:cond delay="indefinite"/>
+                      </p:stCondLst>
+                      <p:childTnLst>
+                        <p:par>
+                          <p:cTn id="40" fill="hold">
+                            <p:stCondLst>
+                              <p:cond delay="0"/>
+                            </p:stCondLst>
+                            <p:childTnLst>
+                              <p:par>
+                                <p:cTn id="41" presetID="1" presetClass="entr" presetSubtype="0" fill="hold" nodeType="clickEffect">
+                                  <p:stCondLst>
+                                    <p:cond delay="0"/>
+                                  </p:stCondLst>
+                                  <p:childTnLst>
+                                    <p:set>
+                                      <p:cBhvr>
+                                        <p:cTn id="42" dur="1" fill="hold">
+                                          <p:stCondLst>
+                                            <p:cond delay="0"/>
+                                          </p:stCondLst>
+                                        </p:cTn>
+                                        <p:tgtEl>
+                                          <p:spTgt spid="3">
+                                            <p:txEl>
+                                              <p:pRg st="4" end="4"/>
+                                            </p:txEl>
+                                          </p:spTgt>
+                                        </p:tgtEl>
+                                        <p:attrNameLst>
+                                          <p:attrName>style.visibility</p:attrName>
+                                        </p:attrNameLst>
+                                      </p:cBhvr>
+                                      <p:to>
+                                        <p:strVal val="visible"/>
+                                      </p:to>
+                                    </p:set>
+                                  </p:childTnLst>
+                                </p:cTn>
+                              </p:par>
+                            </p:childTnLst>
+                          </p:cTn>
+                        </p:par>
+                      </p:childTnLst>
+                    </p:cTn>
+                  </p:par>
+                  <p:par>
+                    <p:cTn id="43" fill="hold">
+                      <p:stCondLst>
+                        <p:cond delay="indefinite"/>
+                      </p:stCondLst>
+                      <p:childTnLst>
+                        <p:par>
+                          <p:cTn id="44" fill="hold">
+                            <p:stCondLst>
+                              <p:cond delay="0"/>
+                            </p:stCondLst>
+                            <p:childTnLst>
+                              <p:par>
+                                <p:cTn id="45" presetID="1" presetClass="entr" presetSubtype="0" fill="hold" grpId="0" nodeType="clickEffect">
+                                  <p:stCondLst>
+                                    <p:cond delay="0"/>
+                                  </p:stCondLst>
+                                  <p:childTnLst>
+                                    <p:set>
+                                      <p:cBhvr>
+                                        <p:cTn id="46" dur="1" fill="hold">
+                                          <p:stCondLst>
+                                            <p:cond delay="0"/>
+                                          </p:stCondLst>
+                                        </p:cTn>
+                                        <p:tgtEl>
+                                          <p:spTgt spid="32"/>
+                                        </p:tgtEl>
+                                        <p:attrNameLst>
+                                          <p:attrName>style.visibility</p:attrName>
+                                        </p:attrNameLst>
+                                      </p:cBhvr>
+                                      <p:to>
+                                        <p:strVal val="visible"/>
+                                      </p:to>
+                                    </p:set>
+                                  </p:childTnLst>
+                                </p:cTn>
+                              </p:par>
+                            </p:childTnLst>
+                          </p:cTn>
+                        </p:par>
+                      </p:childTnLst>
+                    </p:cTn>
+                  </p:par>
+                  <p:par>
+                    <p:cTn id="47" fill="hold">
+                      <p:stCondLst>
+                        <p:cond delay="indefinite"/>
+                      </p:stCondLst>
+                      <p:childTnLst>
+                        <p:par>
+                          <p:cTn id="48" fill="hold">
+                            <p:stCondLst>
+                              <p:cond delay="0"/>
+                            </p:stCondLst>
+                            <p:childTnLst>
+                              <p:par>
+                                <p:cTn id="49" presetID="1" presetClass="entr" presetSubtype="0" fill="hold" nodeType="clickEffect">
+                                  <p:stCondLst>
+                                    <p:cond delay="0"/>
+                                  </p:stCondLst>
+                                  <p:childTnLst>
+                                    <p:set>
+                                      <p:cBhvr>
+                                        <p:cTn id="50" dur="1" fill="hold">
+                                          <p:stCondLst>
+                                            <p:cond delay="0"/>
+                                          </p:stCondLst>
+                                        </p:cTn>
+                                        <p:tgtEl>
+                                          <p:spTgt spid="3">
+                                            <p:txEl>
+                                              <p:pRg st="5" end="5"/>
+                                            </p:txEl>
+                                          </p:spTgt>
+                                        </p:tgtEl>
+                                        <p:attrNameLst>
+                                          <p:attrName>style.visibility</p:attrName>
+                                        </p:attrNameLst>
+                                      </p:cBhvr>
+                                      <p:to>
+                                        <p:strVal val="visible"/>
+                                      </p:to>
+                                    </p:set>
+                                  </p:childTnLst>
+                                </p:cTn>
+                              </p:par>
+                            </p:childTnLst>
+                          </p:cTn>
+                        </p:par>
+                      </p:childTnLst>
+                    </p:cTn>
+                  </p:par>
+                  <p:par>
+                    <p:cTn id="51" fill="hold">
+                      <p:stCondLst>
+                        <p:cond delay="indefinite"/>
+                      </p:stCondLst>
+                      <p:childTnLst>
+                        <p:par>
+                          <p:cTn id="52" fill="hold">
+                            <p:stCondLst>
+                              <p:cond delay="0"/>
+                            </p:stCondLst>
+                            <p:childTnLst>
+                              <p:par>
+                                <p:cTn id="53" presetID="1" presetClass="entr" presetSubtype="0" fill="hold" grpId="0" nodeType="clickEffect">
+                                  <p:stCondLst>
+                                    <p:cond delay="0"/>
+                                  </p:stCondLst>
+                                  <p:childTnLst>
+                                    <p:set>
+                                      <p:cBhvr>
+                                        <p:cTn id="54" dur="1" fill="hold">
+                                          <p:stCondLst>
+                                            <p:cond delay="0"/>
+                                          </p:stCondLst>
+                                        </p:cTn>
+                                        <p:tgtEl>
+                                          <p:spTgt spid="33"/>
+                                        </p:tgtEl>
+                                        <p:attrNameLst>
+                                          <p:attrName>style.visibility</p:attrName>
+                                        </p:attrNameLst>
+                                      </p:cBhvr>
+                                      <p:to>
+                                        <p:strVal val="visible"/>
+                                      </p:to>
+                                    </p:set>
+                                  </p:childTnLst>
+                                </p:cTn>
+                              </p:par>
+                            </p:childTnLst>
+                          </p:cTn>
+                        </p:par>
+                      </p:childTnLst>
+                    </p:cTn>
+                  </p:par>
+                  <p:par>
+                    <p:cTn id="55" fill="hold">
+                      <p:stCondLst>
+                        <p:cond delay="indefinite"/>
+                      </p:stCondLst>
+                      <p:childTnLst>
+                        <p:par>
+                          <p:cTn id="56" fill="hold">
+                            <p:stCondLst>
+                              <p:cond delay="0"/>
+                            </p:stCondLst>
+                            <p:childTnLst>
+                              <p:par>
+                                <p:cTn id="57" presetID="1" presetClass="entr" presetSubtype="0" fill="hold" grpId="0" nodeType="clickEffect">
+                                  <p:stCondLst>
+                                    <p:cond delay="0"/>
+                                  </p:stCondLst>
+                                  <p:childTnLst>
+                                    <p:set>
+                                      <p:cBhvr>
+                                        <p:cTn id="58" dur="1" fill="hold">
+                                          <p:stCondLst>
+                                            <p:cond delay="0"/>
+                                          </p:stCondLst>
+                                        </p:cTn>
+                                        <p:tgtEl>
+                                          <p:spTgt spid="34"/>
+                                        </p:tgtEl>
+                                        <p:attrNameLst>
+                                          <p:attrName>style.visibility</p:attrName>
+                                        </p:attrNameLst>
+                                      </p:cBhvr>
+                                      <p:to>
+                                        <p:strVal val="visible"/>
+                                      </p:to>
+                                    </p:set>
+                                  </p:childTnLst>
+                                </p:cTn>
+                              </p:par>
+                            </p:childTnLst>
+                          </p:cTn>
+                        </p:par>
+                      </p:childTnLst>
+                    </p:cTn>
+                  </p:par>
+                  <p:par>
+                    <p:cTn id="59" fill="hold">
+                      <p:stCondLst>
+                        <p:cond delay="indefinite"/>
+                      </p:stCondLst>
+                      <p:childTnLst>
+                        <p:par>
+                          <p:cTn id="60" fill="hold">
+                            <p:stCondLst>
+                              <p:cond delay="0"/>
+                            </p:stCondLst>
+                            <p:childTnLst>
+                              <p:par>
+                                <p:cTn id="61" presetID="1" presetClass="entr" presetSubtype="0" fill="hold" grpId="0" nodeType="clickEffect">
+                                  <p:stCondLst>
+                                    <p:cond delay="0"/>
+                                  </p:stCondLst>
+                                  <p:childTnLst>
+                                    <p:set>
+                                      <p:cBhvr>
+                                        <p:cTn id="62" dur="1" fill="hold">
+                                          <p:stCondLst>
+                                            <p:cond delay="0"/>
+                                          </p:stCondLst>
+                                        </p:cTn>
+                                        <p:tgtEl>
+                                          <p:spTgt spid="35"/>
+                                        </p:tgtEl>
+                                        <p:attrNameLst>
+                                          <p:attrName>style.visibility</p:attrName>
+                                        </p:attrNameLst>
+                                      </p:cBhvr>
+                                      <p:to>
+                                        <p:strVal val="visible"/>
+                                      </p:to>
+                                    </p:set>
+                                  </p:childTnLst>
+                                </p:cTn>
+                              </p:par>
+                            </p:childTnLst>
+                          </p:cTn>
+                        </p:par>
+                      </p:childTnLst>
+                    </p:cTn>
+                  </p:par>
+                  <p:par>
+                    <p:cTn id="63" fill="hold">
+                      <p:stCondLst>
+                        <p:cond delay="indefinite"/>
+                      </p:stCondLst>
+                      <p:childTnLst>
+                        <p:par>
+                          <p:cTn id="64" fill="hold">
+                            <p:stCondLst>
+                              <p:cond delay="0"/>
+                            </p:stCondLst>
+                            <p:childTnLst>
+                              <p:par>
+                                <p:cTn id="65" presetID="1" presetClass="entr" presetSubtype="0" fill="hold" grpId="0" nodeType="clickEffect">
+                                  <p:stCondLst>
+                                    <p:cond delay="0"/>
+                                  </p:stCondLst>
+                                  <p:childTnLst>
+                                    <p:set>
+                                      <p:cBhvr>
+                                        <p:cTn id="66" dur="1" fill="hold">
+                                          <p:stCondLst>
+                                            <p:cond delay="0"/>
+                                          </p:stCondLst>
+                                        </p:cTn>
+                                        <p:tgtEl>
+                                          <p:spTgt spid="36"/>
+                                        </p:tgtEl>
+                                        <p:attrNameLst>
+                                          <p:attrName>style.visibility</p:attrName>
+                                        </p:attrNameLst>
+                                      </p:cBhvr>
+                                      <p:to>
+                                        <p:strVal val="visible"/>
+                                      </p:to>
+                                    </p:set>
+                                  </p:childTnLst>
+                                </p:cTn>
+                              </p:par>
+                            </p:childTnLst>
+                          </p:cTn>
+                        </p:par>
+                      </p:childTnLst>
+                    </p:cTn>
+                  </p:par>
+                </p:childTnLst>
+              </p:cTn>
+              <p:prevCondLst>
+                <p:cond evt="onPrev" delay="0">
+                  <p:tgtEl>
+                    <p:sldTgt/>
+                  </p:tgtEl>
+                </p:cond>
+              </p:prevCondLst>
+              <p:nextCondLst>
+                <p:cond evt="onNext" delay="0">
+                  <p:tgtEl>
+                    <p:sldTgt/>
+                  </p:tgtEl>
+                </p:cond>
+              </p:nextCondLst>
+            </p:seq>
+          </p:childTnLst>
+        </p:cTn>
+      </p:par>
+    </p:tnLst>
+    <p:bldLst>
+      <p:bldP spid="21" grpId="0"/>
+      <p:bldP spid="22" grpId="0"/>
+      <p:bldP spid="23" grpId="0"/>
+      <p:bldP spid="24" grpId="0"/>
+      <p:bldP spid="25" grpId="0"/>
+      <p:bldP spid="26" grpId="0"/>
+      <p:bldP spid="27" grpId="0"/>
+      <p:bldP spid="28" grpId="0"/>
+      <p:bldP spid="29" grpId="0"/>
+      <p:bldP spid="30" grpId="0"/>
+      <p:bldP spid="32" grpId="0" animBg="1"/>
+      <p:bldP spid="33" grpId="0" animBg="1"/>
+      <p:bldP spid="34" grpId="0" animBg="1"/>
+      <p:bldP spid="35" grpId="0" animBg="1"/>
+      <p:bldP spid="36" grpId="0" animBg="1"/>
+    </p:bldLst>
+  </p:timing>
 </p:sld>
 </file>
 
@@ -3697,7 +5422,7 @@
           <a:p>
             <a:r>
               <a:rPr lang="en-US" dirty="0"/>
-              <a:t>COMPARAISON DES DEUX ALGORITHMES</a:t>
+              <a:t>WELSH &amp; POWELL</a:t>
             </a:r>
             <a:endParaRPr lang="fr-FR" dirty="0"/>
           </a:p>
@@ -3718,31 +5443,15 @@
           <a:bodyPr/>
           <a:lstStyle/>
           <a:p>
-            <a:r>
-              <a:rPr lang="en-US" dirty="0"/>
-              <a:t>Welsh &amp; Powell</a:t>
-            </a:r>
-          </a:p>
-          <a:p>
-            <a:pPr lvl="1"/>
-            <a:r>
-              <a:rPr lang="en-US" dirty="0"/>
-              <a:t>Temps de </a:t>
-            </a:r>
+            <a:pPr marL="0" indent="0">
+              <a:buNone/>
+            </a:pPr>
+            <a:endParaRPr lang="fr-FR" dirty="0"/>
+          </a:p>
+          <a:p>
             <a:r>
               <a:rPr lang="en-US" dirty="0" err="1"/>
-              <a:t>calcul</a:t>
-            </a:r>
-            <a:r>
-              <a:rPr lang="en-US" dirty="0"/>
-              <a:t> court</a:t>
-            </a:r>
-          </a:p>
-          <a:p>
-            <a:pPr lvl="1"/>
-            <a:r>
-              <a:rPr lang="en-US" dirty="0" err="1"/>
-              <a:t>Nombre</a:t>
+              <a:t>Fonctionnement</a:t>
             </a:r>
             <a:r>
               <a:rPr lang="en-US" dirty="0"/>
@@ -3750,7 +5459,30 @@
             </a:r>
             <a:r>
               <a:rPr lang="en-US" dirty="0" err="1"/>
-              <a:t>couleurs</a:t>
+              <a:t>l’algorithme</a:t>
+            </a:r>
+            <a:r>
+              <a:rPr lang="en-US" dirty="0"/>
+              <a:t>  -&gt; </a:t>
+            </a:r>
+            <a:r>
+              <a:rPr lang="en-US" dirty="0" err="1"/>
+              <a:t>schéma</a:t>
+            </a:r>
+            <a:endParaRPr lang="en-US" dirty="0"/>
+          </a:p>
+          <a:p>
+            <a:r>
+              <a:rPr lang="en-US" dirty="0" err="1"/>
+              <a:t>Avantages</a:t>
+            </a:r>
+            <a:endParaRPr lang="en-US" dirty="0"/>
+          </a:p>
+          <a:p>
+            <a:pPr lvl="1"/>
+            <a:r>
+              <a:rPr lang="en-US" dirty="0" err="1"/>
+              <a:t>Trouver</a:t>
             </a:r>
             <a:r>
               <a:rPr lang="en-US" dirty="0"/>
@@ -3758,15 +5490,15 @@
             </a:r>
             <a:r>
               <a:rPr lang="en-US" dirty="0" err="1"/>
-              <a:t>proche</a:t>
+              <a:t>une</a:t>
             </a:r>
             <a:r>
               <a:rPr lang="en-US" dirty="0"/>
-              <a:t> du </a:t>
+              <a:t> approximation de la bonne </a:t>
             </a:r>
             <a:r>
               <a:rPr lang="en-US" dirty="0" err="1"/>
-              <a:t>nombre</a:t>
+              <a:t>réponse</a:t>
             </a:r>
             <a:r>
               <a:rPr lang="en-US" dirty="0"/>
@@ -3774,45 +5506,46 @@
             </a:r>
             <a:r>
               <a:rPr lang="en-US" dirty="0" err="1"/>
-              <a:t>chromatique</a:t>
+              <a:t>en</a:t>
+            </a:r>
+            <a:r>
+              <a:rPr lang="en-US" dirty="0"/>
+              <a:t> un temps </a:t>
+            </a:r>
+            <a:r>
+              <a:rPr lang="en-US" dirty="0" err="1"/>
+              <a:t>limité</a:t>
             </a:r>
             <a:endParaRPr lang="en-US" dirty="0"/>
           </a:p>
           <a:p>
             <a:r>
               <a:rPr lang="en-US" dirty="0" err="1"/>
-              <a:t>Recuit</a:t>
+              <a:t>Inconvénients</a:t>
+            </a:r>
+            <a:endParaRPr lang="en-US" dirty="0"/>
+          </a:p>
+          <a:p>
+            <a:pPr lvl="1"/>
+            <a:r>
+              <a:rPr lang="en-US" dirty="0" err="1"/>
+              <a:t>Trouver</a:t>
             </a:r>
             <a:r>
               <a:rPr lang="en-US" dirty="0"/>
-              <a:t> </a:t>
+              <a:t> un </a:t>
             </a:r>
             <a:r>
               <a:rPr lang="en-US" dirty="0" err="1"/>
-              <a:t>simulé</a:t>
-            </a:r>
-            <a:endParaRPr lang="en-US" dirty="0"/>
-          </a:p>
-          <a:p>
-            <a:pPr lvl="1"/>
+              <a:t>équilibre</a:t>
+            </a:r>
             <a:r>
               <a:rPr lang="en-US" dirty="0"/>
-              <a:t>Temps de </a:t>
+              <a:t> entre et le </a:t>
             </a:r>
             <a:r>
               <a:rPr lang="en-US" dirty="0" err="1"/>
-              <a:t>calcul</a:t>
-            </a:r>
-            <a:r>
-              <a:rPr lang="en-US" dirty="0"/>
-              <a:t> variable</a:t>
-            </a:r>
-          </a:p>
-          <a:p>
-            <a:pPr lvl="1"/>
-            <a:r>
-              <a:rPr lang="en-US" dirty="0" err="1"/>
-              <a:t>Nombre</a:t>
+              <a:t>résultat</a:t>
             </a:r>
             <a:r>
               <a:rPr lang="en-US" dirty="0"/>
@@ -3820,48 +5553,15 @@
             </a:r>
             <a:r>
               <a:rPr lang="en-US" dirty="0" err="1"/>
-              <a:t>couleurs</a:t>
-            </a:r>
-            <a:r>
-              <a:rPr lang="en-US" dirty="0"/>
-              <a:t> </a:t>
-            </a:r>
-            <a:r>
-              <a:rPr lang="en-US" dirty="0" err="1"/>
-              <a:t>parfois</a:t>
-            </a:r>
-            <a:r>
-              <a:rPr lang="en-US" dirty="0"/>
-              <a:t> </a:t>
-            </a:r>
-            <a:r>
-              <a:rPr lang="en-US" dirty="0" err="1"/>
-              <a:t>éloigné</a:t>
-            </a:r>
-            <a:r>
-              <a:rPr lang="en-US" dirty="0"/>
-              <a:t> du </a:t>
-            </a:r>
-            <a:r>
-              <a:rPr lang="en-US" dirty="0" err="1"/>
-              <a:t>nombre</a:t>
-            </a:r>
-            <a:r>
-              <a:rPr lang="en-US" dirty="0"/>
-              <a:t> </a:t>
-            </a:r>
-            <a:r>
-              <a:rPr lang="en-US" dirty="0" err="1"/>
-              <a:t>chromatique</a:t>
-            </a:r>
-            <a:endParaRPr lang="en-US" dirty="0"/>
-          </a:p>
-          <a:p>
-            <a:pPr lvl="1"/>
-            <a:r>
-              <a:rPr lang="fr-FR" dirty="0"/>
-              <a:t>Beaucoup de paramètres à régler</a:t>
-            </a:r>
+              <a:t>l’algorithme</a:t>
+            </a:r>
+            <a:endParaRPr lang="fr-FR" dirty="0"/>
+          </a:p>
+          <a:p>
+            <a:pPr marL="0" indent="0">
+              <a:buNone/>
+            </a:pPr>
+            <a:endParaRPr lang="fr-FR" dirty="0"/>
           </a:p>
         </p:txBody>
       </p:sp>
@@ -3884,6 +5584,252 @@
               <a:rPr lang="fr-FR" smtClean="0"/>
               <a:pPr/>
               <a:t>11</a:t>
+            </a:fld>
+            <a:endParaRPr lang="fr-FR" dirty="0"/>
+          </a:p>
+        </p:txBody>
+      </p:sp>
+    </p:spTree>
+    <p:extLst>
+      <p:ext uri="{BB962C8B-B14F-4D97-AF65-F5344CB8AC3E}">
+        <p14:creationId xmlns:p14="http://schemas.microsoft.com/office/powerpoint/2010/main" val="2311396477"/>
+      </p:ext>
+    </p:extLst>
+  </p:cSld>
+  <p:clrMapOvr>
+    <a:masterClrMapping/>
+  </p:clrMapOvr>
+  <p:timing>
+    <p:tnLst>
+      <p:par>
+        <p:cTn id="1" dur="indefinite" restart="never" nodeType="tmRoot"/>
+      </p:par>
+    </p:tnLst>
+  </p:timing>
+</p:sld>
+</file>
+
+<file path=ppt/slides/slide12.xml><?xml version="1.0" encoding="utf-8"?>
+<p:sld xmlns:a="http://purl.oclc.org/ooxml/drawingml/main" xmlns:r="http://purl.oclc.org/ooxml/officeDocument/relationships" xmlns:p="http://purl.oclc.org/ooxml/presentationml/main">
+  <p:cSld>
+    <p:spTree>
+      <p:nvGrpSpPr>
+        <p:cNvPr id="1" name=""/>
+        <p:cNvGrpSpPr/>
+        <p:nvPr/>
+      </p:nvGrpSpPr>
+      <p:grpSpPr>
+        <a:xfrm>
+          <a:off x="0" y="0"/>
+          <a:ext cx="0" cy="0"/>
+          <a:chOff x="0" y="0"/>
+          <a:chExt cx="0" cy="0"/>
+        </a:xfrm>
+      </p:grpSpPr>
+      <p:sp>
+        <p:nvSpPr>
+          <p:cNvPr id="2" name="Titre 1"/>
+          <p:cNvSpPr>
+            <a:spLocks noGrp="1"/>
+          </p:cNvSpPr>
+          <p:nvPr>
+            <p:ph type="title"/>
+          </p:nvPr>
+        </p:nvSpPr>
+        <p:spPr/>
+        <p:txBody>
+          <a:bodyPr/>
+          <a:lstStyle/>
+          <a:p>
+            <a:r>
+              <a:rPr lang="en-US" dirty="0"/>
+              <a:t>COMPARAISON DES DEUX ALGORITHMES</a:t>
+            </a:r>
+            <a:endParaRPr lang="fr-FR" dirty="0"/>
+          </a:p>
+        </p:txBody>
+      </p:sp>
+      <p:sp>
+        <p:nvSpPr>
+          <p:cNvPr id="3" name="Espace réservé du contenu 2"/>
+          <p:cNvSpPr>
+            <a:spLocks noGrp="1"/>
+          </p:cNvSpPr>
+          <p:nvPr>
+            <p:ph idx="1"/>
+          </p:nvPr>
+        </p:nvSpPr>
+        <p:spPr/>
+        <p:txBody>
+          <a:bodyPr/>
+          <a:lstStyle/>
+          <a:p>
+            <a:r>
+              <a:rPr lang="en-US" dirty="0"/>
+              <a:t>Welsh &amp; Powell</a:t>
+            </a:r>
+          </a:p>
+          <a:p>
+            <a:pPr lvl="1"/>
+            <a:r>
+              <a:rPr lang="en-US" dirty="0"/>
+              <a:t>Temps de </a:t>
+            </a:r>
+            <a:r>
+              <a:rPr lang="en-US" dirty="0" err="1"/>
+              <a:t>calcul</a:t>
+            </a:r>
+            <a:r>
+              <a:rPr lang="en-US" dirty="0"/>
+              <a:t> court</a:t>
+            </a:r>
+          </a:p>
+          <a:p>
+            <a:pPr lvl="1"/>
+            <a:r>
+              <a:rPr lang="en-US" dirty="0" err="1"/>
+              <a:t>Nombre</a:t>
+            </a:r>
+            <a:r>
+              <a:rPr lang="en-US" dirty="0"/>
+              <a:t> de </a:t>
+            </a:r>
+            <a:r>
+              <a:rPr lang="en-US" dirty="0" err="1"/>
+              <a:t>couleurs</a:t>
+            </a:r>
+            <a:r>
+              <a:rPr lang="en-US" dirty="0"/>
+              <a:t> </a:t>
+            </a:r>
+            <a:r>
+              <a:rPr lang="en-US" dirty="0" err="1"/>
+              <a:t>proche</a:t>
+            </a:r>
+            <a:r>
+              <a:rPr lang="en-US" dirty="0"/>
+              <a:t> du </a:t>
+            </a:r>
+            <a:r>
+              <a:rPr lang="en-US" dirty="0" err="1"/>
+              <a:t>nombre</a:t>
+            </a:r>
+            <a:r>
+              <a:rPr lang="en-US" dirty="0"/>
+              <a:t> </a:t>
+            </a:r>
+            <a:r>
+              <a:rPr lang="en-US" dirty="0" err="1"/>
+              <a:t>chromatique</a:t>
+            </a:r>
+            <a:endParaRPr lang="en-US" dirty="0"/>
+          </a:p>
+          <a:p>
+            <a:r>
+              <a:rPr lang="en-US" dirty="0" err="1"/>
+              <a:t>Recuit</a:t>
+            </a:r>
+            <a:r>
+              <a:rPr lang="en-US" dirty="0"/>
+              <a:t> </a:t>
+            </a:r>
+            <a:r>
+              <a:rPr lang="en-US" dirty="0" err="1"/>
+              <a:t>simulé</a:t>
+            </a:r>
+            <a:endParaRPr lang="en-US" dirty="0"/>
+          </a:p>
+          <a:p>
+            <a:pPr lvl="1"/>
+            <a:r>
+              <a:rPr lang="en-US" dirty="0"/>
+              <a:t>Temps de </a:t>
+            </a:r>
+            <a:r>
+              <a:rPr lang="en-US" dirty="0" err="1"/>
+              <a:t>calcul</a:t>
+            </a:r>
+            <a:r>
+              <a:rPr lang="en-US" dirty="0"/>
+              <a:t> variable</a:t>
+            </a:r>
+          </a:p>
+          <a:p>
+            <a:pPr lvl="1"/>
+            <a:r>
+              <a:rPr lang="en-US" dirty="0" err="1"/>
+              <a:t>Nombre</a:t>
+            </a:r>
+            <a:r>
+              <a:rPr lang="en-US" dirty="0"/>
+              <a:t> de </a:t>
+            </a:r>
+            <a:r>
+              <a:rPr lang="en-US" dirty="0" err="1"/>
+              <a:t>couleurs</a:t>
+            </a:r>
+            <a:r>
+              <a:rPr lang="en-US" dirty="0"/>
+              <a:t> </a:t>
+            </a:r>
+            <a:r>
+              <a:rPr lang="en-US" dirty="0" err="1"/>
+              <a:t>parfois</a:t>
+            </a:r>
+            <a:r>
+              <a:rPr lang="en-US" dirty="0"/>
+              <a:t> </a:t>
+            </a:r>
+            <a:r>
+              <a:rPr lang="en-US" dirty="0" err="1"/>
+              <a:t>éloigné</a:t>
+            </a:r>
+            <a:r>
+              <a:rPr lang="en-US" dirty="0"/>
+              <a:t> du </a:t>
+            </a:r>
+            <a:r>
+              <a:rPr lang="en-US" dirty="0" err="1"/>
+              <a:t>nombre</a:t>
+            </a:r>
+            <a:r>
+              <a:rPr lang="en-US" dirty="0"/>
+              <a:t> </a:t>
+            </a:r>
+            <a:r>
+              <a:rPr lang="en-US" dirty="0" err="1"/>
+              <a:t>chromatique</a:t>
+            </a:r>
+            <a:endParaRPr lang="en-US" dirty="0"/>
+          </a:p>
+          <a:p>
+            <a:pPr lvl="1"/>
+            <a:r>
+              <a:rPr lang="fr-FR" dirty="0"/>
+              <a:t>Beaucoup de paramètres à régler</a:t>
+            </a:r>
+          </a:p>
+        </p:txBody>
+      </p:sp>
+      <p:sp>
+        <p:nvSpPr>
+          <p:cNvPr id="4" name="Espace réservé du numéro de diapositive 3"/>
+          <p:cNvSpPr>
+            <a:spLocks noGrp="1"/>
+          </p:cNvSpPr>
+          <p:nvPr>
+            <p:ph type="sldNum" sz="quarter" idx="12"/>
+          </p:nvPr>
+        </p:nvSpPr>
+        <p:spPr/>
+        <p:txBody>
+          <a:bodyPr/>
+          <a:lstStyle/>
+          <a:p>
+            <a:fld id="{8F3E9BA4-B10B-4221-834F-1BD1265045F1}" type="slidenum">
+              <a:rPr lang="fr-FR" smtClean="0"/>
+              <a:pPr/>
+              <a:t>12</a:t>
             </a:fld>
             <a:endParaRPr lang="fr-FR" dirty="0"/>
           </a:p>
@@ -3899,10 +5845,17 @@
   <p:clrMapOvr>
     <a:masterClrMapping/>
   </p:clrMapOvr>
+  <p:timing>
+    <p:tnLst>
+      <p:par>
+        <p:cTn id="1" dur="indefinite" restart="never" nodeType="tmRoot"/>
+      </p:par>
+    </p:tnLst>
+  </p:timing>
 </p:sld>
 </file>
 
-<file path=ppt/slides/slide12.xml><?xml version="1.0" encoding="utf-8"?>
+<file path=ppt/slides/slide13.xml><?xml version="1.0" encoding="utf-8"?>
 <p:sld xmlns:a="http://purl.oclc.org/ooxml/drawingml/main" xmlns:r="http://purl.oclc.org/ooxml/officeDocument/relationships" xmlns:p="http://purl.oclc.org/ooxml/presentationml/main">
   <p:cSld>
     <p:spTree>
@@ -3988,7 +5941,7 @@
             <a:fld id="{8F3E9BA4-B10B-4221-834F-1BD1265045F1}" type="slidenum">
               <a:rPr lang="fr-FR" smtClean="0"/>
               <a:pPr/>
-              <a:t>12</a:t>
+              <a:t>13</a:t>
             </a:fld>
             <a:endParaRPr lang="fr-FR" dirty="0"/>
           </a:p>
@@ -4033,10 +5986,17 @@
   <p:clrMapOvr>
     <a:masterClrMapping/>
   </p:clrMapOvr>
+  <p:timing>
+    <p:tnLst>
+      <p:par>
+        <p:cTn id="1" dur="indefinite" restart="never" nodeType="tmRoot"/>
+      </p:par>
+    </p:tnLst>
+  </p:timing>
 </p:sld>
 </file>
 
-<file path=ppt/slides/slide13.xml><?xml version="1.0" encoding="utf-8"?>
+<file path=ppt/slides/slide14.xml><?xml version="1.0" encoding="utf-8"?>
 <p:sld xmlns:a="http://purl.oclc.org/ooxml/drawingml/main" xmlns:r="http://purl.oclc.org/ooxml/officeDocument/relationships" xmlns:p="http://purl.oclc.org/ooxml/presentationml/main">
   <p:cSld>
     <p:spTree>
@@ -4188,7 +6148,7 @@
             <a:fld id="{8F3E9BA4-B10B-4221-834F-1BD1265045F1}" type="slidenum">
               <a:rPr lang="fr-FR" smtClean="0"/>
               <a:pPr/>
-              <a:t>13</a:t>
+              <a:t>14</a:t>
             </a:fld>
             <a:endParaRPr lang="fr-FR" dirty="0"/>
           </a:p>
@@ -4234,105 +6194,13 @@
   <p:clrMapOvr>
     <a:masterClrMapping/>
   </p:clrMapOvr>
-</p:sld>
-</file>
-
-<file path=ppt/slides/slide14.xml><?xml version="1.0" encoding="utf-8"?>
-<p:sld xmlns:a="http://purl.oclc.org/ooxml/drawingml/main" xmlns:r="http://purl.oclc.org/ooxml/officeDocument/relationships" xmlns:p="http://purl.oclc.org/ooxml/presentationml/main">
-  <p:cSld>
-    <p:spTree>
-      <p:nvGrpSpPr>
-        <p:cNvPr id="1" name=""/>
-        <p:cNvGrpSpPr/>
-        <p:nvPr/>
-      </p:nvGrpSpPr>
-      <p:grpSpPr>
-        <a:xfrm>
-          <a:off x="0" y="0"/>
-          <a:ext cx="0" cy="0"/>
-          <a:chOff x="0" y="0"/>
-          <a:chExt cx="0" cy="0"/>
-        </a:xfrm>
-      </p:grpSpPr>
-      <p:sp>
-        <p:nvSpPr>
-          <p:cNvPr id="2" name="Titre 1"/>
-          <p:cNvSpPr>
-            <a:spLocks noGrp="1"/>
-          </p:cNvSpPr>
-          <p:nvPr>
-            <p:ph type="title"/>
-          </p:nvPr>
-        </p:nvSpPr>
-        <p:spPr/>
-        <p:txBody>
-          <a:bodyPr/>
-          <a:lstStyle/>
-          <a:p>
-            <a:r>
-              <a:rPr lang="en-US" dirty="0"/>
-              <a:t>DEMONSTRATION</a:t>
-            </a:r>
-            <a:endParaRPr lang="fr-FR" dirty="0"/>
-          </a:p>
-        </p:txBody>
-      </p:sp>
-      <p:sp>
-        <p:nvSpPr>
-          <p:cNvPr id="3" name="Espace réservé du contenu 2"/>
-          <p:cNvSpPr>
-            <a:spLocks noGrp="1"/>
-          </p:cNvSpPr>
-          <p:nvPr>
-            <p:ph idx="1"/>
-          </p:nvPr>
-        </p:nvSpPr>
-        <p:spPr/>
-        <p:txBody>
-          <a:bodyPr/>
-          <a:lstStyle/>
-          <a:p>
-            <a:pPr marL="0" indent="0">
-              <a:buNone/>
-            </a:pPr>
-            <a:endParaRPr lang="fr-FR" dirty="0"/>
-          </a:p>
-        </p:txBody>
-      </p:sp>
-      <p:sp>
-        <p:nvSpPr>
-          <p:cNvPr id="4" name="Espace réservé du numéro de diapositive 3"/>
-          <p:cNvSpPr>
-            <a:spLocks noGrp="1"/>
-          </p:cNvSpPr>
-          <p:nvPr>
-            <p:ph type="sldNum" sz="quarter" idx="12"/>
-          </p:nvPr>
-        </p:nvSpPr>
-        <p:spPr/>
-        <p:txBody>
-          <a:bodyPr/>
-          <a:lstStyle/>
-          <a:p>
-            <a:fld id="{8F3E9BA4-B10B-4221-834F-1BD1265045F1}" type="slidenum">
-              <a:rPr lang="fr-FR" smtClean="0"/>
-              <a:pPr/>
-              <a:t>14</a:t>
-            </a:fld>
-            <a:endParaRPr lang="fr-FR" dirty="0"/>
-          </a:p>
-        </p:txBody>
-      </p:sp>
-    </p:spTree>
-    <p:extLst>
-      <p:ext uri="{BB962C8B-B14F-4D97-AF65-F5344CB8AC3E}">
-        <p14:creationId xmlns:p14="http://schemas.microsoft.com/office/powerpoint/2010/main" val="466114696"/>
-      </p:ext>
-    </p:extLst>
-  </p:cSld>
-  <p:clrMapOvr>
-    <a:masterClrMapping/>
-  </p:clrMapOvr>
+  <p:timing>
+    <p:tnLst>
+      <p:par>
+        <p:cTn id="1" dur="indefinite" restart="never" nodeType="tmRoot"/>
+      </p:par>
+    </p:tnLst>
+  </p:timing>
 </p:sld>
 </file>
 
@@ -4370,7 +6238,7 @@
           <a:p>
             <a:r>
               <a:rPr lang="en-US" dirty="0"/>
-              <a:t>CONCLUSION</a:t>
+              <a:t>DEMONSTRATION</a:t>
             </a:r>
             <a:endParaRPr lang="fr-FR" dirty="0"/>
           </a:p>
@@ -4391,41 +6259,10 @@
           <a:bodyPr/>
           <a:lstStyle/>
           <a:p>
-            <a:r>
-              <a:rPr lang="fr-FR" dirty="0"/>
-              <a:t>Aboutissement des objectifs ?</a:t>
-            </a:r>
-          </a:p>
-          <a:p>
-            <a:r>
-              <a:rPr lang="fr-FR" dirty="0"/>
-              <a:t>Développement personnel</a:t>
-            </a:r>
-          </a:p>
-          <a:p>
-            <a:r>
-              <a:rPr lang="fr-FR" dirty="0"/>
-              <a:t>Poursuite du projet</a:t>
-            </a:r>
-          </a:p>
-          <a:p>
-            <a:pPr lvl="1"/>
-            <a:r>
-              <a:rPr lang="fr-FR" dirty="0"/>
-              <a:t>Amélioration du temps </a:t>
-            </a:r>
-            <a:r>
-              <a:rPr lang="fr-FR"/>
-              <a:t>de calcul de l’ARS</a:t>
-            </a:r>
+            <a:pPr marL="0" indent="0">
+              <a:buNone/>
+            </a:pPr>
             <a:endParaRPr lang="fr-FR" dirty="0"/>
-          </a:p>
-          <a:p>
-            <a:pPr lvl="1"/>
-            <a:r>
-              <a:rPr lang="fr-FR" dirty="0"/>
-              <a:t>Utiliser l’ARS dans d’autres domaines</a:t>
-            </a:r>
           </a:p>
         </p:txBody>
       </p:sp>
@@ -4456,13 +6293,20 @@
     </p:spTree>
     <p:extLst>
       <p:ext uri="{BB962C8B-B14F-4D97-AF65-F5344CB8AC3E}">
-        <p14:creationId xmlns:p14="http://schemas.microsoft.com/office/powerpoint/2010/main" val="4107734090"/>
+        <p14:creationId xmlns:p14="http://schemas.microsoft.com/office/powerpoint/2010/main" val="466114696"/>
       </p:ext>
     </p:extLst>
   </p:cSld>
   <p:clrMapOvr>
     <a:masterClrMapping/>
   </p:clrMapOvr>
+  <p:timing>
+    <p:tnLst>
+      <p:par>
+        <p:cTn id="1" dur="indefinite" restart="never" nodeType="tmRoot"/>
+      </p:par>
+    </p:tnLst>
+  </p:timing>
 </p:sld>
 </file>
 
@@ -4499,9 +6343,10 @@
           <a:lstStyle/>
           <a:p>
             <a:r>
-              <a:rPr lang="fr-FR" dirty="0"/>
-              <a:t>Bibliographie</a:t>
-            </a:r>
+              <a:rPr lang="en-US" dirty="0"/>
+              <a:t>CONCLUSION</a:t>
+            </a:r>
+            <a:endParaRPr lang="fr-FR" dirty="0"/>
           </a:p>
         </p:txBody>
       </p:sp>
@@ -4522,66 +6367,39 @@
           <a:p>
             <a:r>
               <a:rPr lang="fr-FR" dirty="0"/>
-              <a:t>Informations sur l’ARS :</a:t>
-            </a:r>
-            <a:endParaRPr lang="fr-FR" dirty="0">
-              <a:hlinkClick r:id="rId2"/>
-            </a:endParaRPr>
+              <a:t>Aboutissement des objectifs ?</a:t>
+            </a:r>
+          </a:p>
+          <a:p>
+            <a:r>
+              <a:rPr lang="fr-FR" dirty="0"/>
+              <a:t>Développement personnel</a:t>
+            </a:r>
+          </a:p>
+          <a:p>
+            <a:r>
+              <a:rPr lang="fr-FR" dirty="0"/>
+              <a:t>Poursuite du projet</a:t>
+            </a:r>
           </a:p>
           <a:p>
             <a:pPr lvl="1"/>
             <a:r>
-              <a:rPr lang="fr-FR" dirty="0">
-                <a:hlinkClick r:id="rId2"/>
-              </a:rPr>
-              <a:t>http://slideplayer.fr/slide/1427850/</a:t>
+              <a:rPr lang="fr-FR" dirty="0"/>
+              <a:t>Amélioration du temps </a:t>
+            </a:r>
+            <a:r>
+              <a:rPr lang="fr-FR"/>
+              <a:t>de calcul de l’ARS</a:t>
             </a:r>
             <a:endParaRPr lang="fr-FR" dirty="0"/>
           </a:p>
           <a:p>
             <a:pPr lvl="1"/>
             <a:r>
-              <a:rPr lang="fr-FR" dirty="0">
-                <a:hlinkClick r:id="rId3"/>
-              </a:rPr>
-              <a:t>https://en.wikipedia.org/wiki/Simulated_annealing</a:t>
-            </a:r>
-            <a:endParaRPr lang="fr-FR" dirty="0"/>
-          </a:p>
-          <a:p>
-            <a:r>
               <a:rPr lang="fr-FR" dirty="0"/>
-              <a:t>Informations sur L’algorithme de WP :</a:t>
-            </a:r>
-          </a:p>
-          <a:p>
-            <a:pPr lvl="1"/>
-            <a:r>
-              <a:rPr lang="fr-FR" dirty="0">
-                <a:hlinkClick r:id="rId4"/>
-              </a:rPr>
-              <a:t>http://graphstream-project.org/doc/Algorithms/Welsh-Powell/</a:t>
-            </a:r>
-            <a:r>
-              <a:rPr lang="fr-FR" dirty="0"/>
-              <a:t> </a:t>
-            </a:r>
-          </a:p>
-          <a:p>
-            <a:r>
-              <a:rPr lang="fr-FR" dirty="0"/>
-              <a:t>Affichage de graphes :</a:t>
-            </a:r>
-          </a:p>
-          <a:p>
-            <a:pPr lvl="1"/>
-            <a:r>
-              <a:rPr lang="fr-FR" dirty="0">
-                <a:hlinkClick r:id="rId5"/>
-              </a:rPr>
-              <a:t>http://bl.ocks.org/</a:t>
-            </a:r>
-            <a:endParaRPr lang="fr-FR" dirty="0"/>
+              <a:t>Utiliser l’ARS dans d’autres domaines</a:t>
+            </a:r>
           </a:p>
         </p:txBody>
       </p:sp>
@@ -4612,7 +6430,7 @@
     </p:spTree>
     <p:extLst>
       <p:ext uri="{BB962C8B-B14F-4D97-AF65-F5344CB8AC3E}">
-        <p14:creationId xmlns:p14="http://schemas.microsoft.com/office/powerpoint/2010/main" val="2810921595"/>
+        <p14:creationId xmlns:p14="http://schemas.microsoft.com/office/powerpoint/2010/main" val="4107734090"/>
       </p:ext>
     </p:extLst>
   </p:cSld>
@@ -4654,7 +6472,10 @@
           <a:bodyPr/>
           <a:lstStyle/>
           <a:p>
-            <a:endParaRPr lang="fr-FR" dirty="0"/>
+            <a:r>
+              <a:rPr lang="fr-FR" dirty="0"/>
+              <a:t>Bibliographie</a:t>
+            </a:r>
           </a:p>
         </p:txBody>
       </p:sp>
@@ -4668,44 +6489,72 @@
             <p:ph idx="1"/>
           </p:nvPr>
         </p:nvSpPr>
-        <p:spPr>
-          <a:xfrm>
-            <a:off x="838200" y="1027906"/>
-            <a:ext cx="10515600" cy="4351338"/>
-          </a:xfrm>
-        </p:spPr>
+        <p:spPr/>
         <p:txBody>
           <a:bodyPr/>
           <a:lstStyle/>
           <a:p>
-            <a:pPr algn="ctr"/>
+            <a:r>
+              <a:rPr lang="fr-FR" dirty="0"/>
+              <a:t>Informations sur l’ARS :</a:t>
+            </a:r>
+            <a:endParaRPr lang="fr-FR" dirty="0">
+              <a:hlinkClick r:id="rId2"/>
+            </a:endParaRPr>
+          </a:p>
+          <a:p>
+            <a:pPr lvl="1"/>
+            <a:r>
+              <a:rPr lang="fr-FR" dirty="0">
+                <a:hlinkClick r:id="rId2"/>
+              </a:rPr>
+              <a:t>http://slideplayer.fr/slide/1427850/</a:t>
+            </a:r>
             <a:endParaRPr lang="fr-FR" dirty="0"/>
           </a:p>
           <a:p>
-            <a:pPr algn="ctr"/>
+            <a:pPr lvl="1"/>
+            <a:r>
+              <a:rPr lang="fr-FR" dirty="0">
+                <a:hlinkClick r:id="rId3"/>
+              </a:rPr>
+              <a:t>https://en.wikipedia.org/wiki/Simulated_annealing</a:t>
+            </a:r>
             <a:endParaRPr lang="fr-FR" dirty="0"/>
           </a:p>
           <a:p>
-            <a:pPr algn="ctr"/>
-            <a:endParaRPr lang="fr-FR" dirty="0"/>
-          </a:p>
-          <a:p>
-            <a:pPr algn="ctr"/>
-            <a:endParaRPr lang="fr-FR" dirty="0"/>
-          </a:p>
-          <a:p>
-            <a:pPr marL="0" indent="0" algn="ctr">
-              <a:buNone/>
-            </a:pPr>
-            <a:r>
-              <a:rPr lang="fr-FR" sz="4400" dirty="0"/>
-              <a:t>Merci pour votre attention</a:t>
-            </a:r>
-          </a:p>
-          <a:p>
-            <a:pPr marL="0" indent="0">
-              <a:buNone/>
-            </a:pPr>
+            <a:r>
+              <a:rPr lang="fr-FR" dirty="0"/>
+              <a:t>Informations sur L’algorithme de WP :</a:t>
+            </a:r>
+          </a:p>
+          <a:p>
+            <a:pPr lvl="1"/>
+            <a:r>
+              <a:rPr lang="fr-FR" dirty="0">
+                <a:hlinkClick r:id="rId4"/>
+              </a:rPr>
+              <a:t>http://graphstream-project.org/doc/Algorithms/Welsh-Powell/</a:t>
+            </a:r>
+            <a:r>
+              <a:rPr lang="fr-FR" dirty="0"/>
+              <a:t> </a:t>
+            </a:r>
+          </a:p>
+          <a:p>
+            <a:r>
+              <a:rPr lang="fr-FR" dirty="0"/>
+              <a:t>Affichage de graphes :</a:t>
+            </a:r>
+          </a:p>
+          <a:p>
+            <a:pPr lvl="1"/>
+            <a:r>
+              <a:rPr lang="fr-FR" dirty="0">
+                <a:hlinkClick r:id="rId5"/>
+              </a:rPr>
+              <a:t>http://bl.ocks.org/</a:t>
+            </a:r>
             <a:endParaRPr lang="fr-FR" dirty="0"/>
           </a:p>
         </p:txBody>
@@ -4729,6 +6578,138 @@
               <a:rPr lang="fr-FR" smtClean="0"/>
               <a:pPr/>
               <a:t>17</a:t>
+            </a:fld>
+            <a:endParaRPr lang="fr-FR" dirty="0"/>
+          </a:p>
+        </p:txBody>
+      </p:sp>
+    </p:spTree>
+    <p:extLst>
+      <p:ext uri="{BB962C8B-B14F-4D97-AF65-F5344CB8AC3E}">
+        <p14:creationId xmlns:p14="http://schemas.microsoft.com/office/powerpoint/2010/main" val="2810921595"/>
+      </p:ext>
+    </p:extLst>
+  </p:cSld>
+  <p:clrMapOvr>
+    <a:masterClrMapping/>
+  </p:clrMapOvr>
+  <p:timing>
+    <p:tnLst>
+      <p:par>
+        <p:cTn id="1" dur="indefinite" restart="never" nodeType="tmRoot"/>
+      </p:par>
+    </p:tnLst>
+  </p:timing>
+</p:sld>
+</file>
+
+<file path=ppt/slides/slide18.xml><?xml version="1.0" encoding="utf-8"?>
+<p:sld xmlns:a="http://purl.oclc.org/ooxml/drawingml/main" xmlns:r="http://purl.oclc.org/ooxml/officeDocument/relationships" xmlns:p="http://purl.oclc.org/ooxml/presentationml/main">
+  <p:cSld>
+    <p:spTree>
+      <p:nvGrpSpPr>
+        <p:cNvPr id="1" name=""/>
+        <p:cNvGrpSpPr/>
+        <p:nvPr/>
+      </p:nvGrpSpPr>
+      <p:grpSpPr>
+        <a:xfrm>
+          <a:off x="0" y="0"/>
+          <a:ext cx="0" cy="0"/>
+          <a:chOff x="0" y="0"/>
+          <a:chExt cx="0" cy="0"/>
+        </a:xfrm>
+      </p:grpSpPr>
+      <p:sp>
+        <p:nvSpPr>
+          <p:cNvPr id="2" name="Titre 1"/>
+          <p:cNvSpPr>
+            <a:spLocks noGrp="1"/>
+          </p:cNvSpPr>
+          <p:nvPr>
+            <p:ph type="title"/>
+          </p:nvPr>
+        </p:nvSpPr>
+        <p:spPr/>
+        <p:txBody>
+          <a:bodyPr/>
+          <a:lstStyle/>
+          <a:p>
+            <a:endParaRPr lang="fr-FR" dirty="0"/>
+          </a:p>
+        </p:txBody>
+      </p:sp>
+      <p:sp>
+        <p:nvSpPr>
+          <p:cNvPr id="3" name="Espace réservé du contenu 2"/>
+          <p:cNvSpPr>
+            <a:spLocks noGrp="1"/>
+          </p:cNvSpPr>
+          <p:nvPr>
+            <p:ph idx="1"/>
+          </p:nvPr>
+        </p:nvSpPr>
+        <p:spPr>
+          <a:xfrm>
+            <a:off x="838200" y="1027906"/>
+            <a:ext cx="10515600" cy="4351338"/>
+          </a:xfrm>
+        </p:spPr>
+        <p:txBody>
+          <a:bodyPr/>
+          <a:lstStyle/>
+          <a:p>
+            <a:pPr algn="ctr"/>
+            <a:endParaRPr lang="fr-FR" dirty="0"/>
+          </a:p>
+          <a:p>
+            <a:pPr algn="ctr"/>
+            <a:endParaRPr lang="fr-FR" dirty="0"/>
+          </a:p>
+          <a:p>
+            <a:pPr algn="ctr"/>
+            <a:endParaRPr lang="fr-FR" dirty="0"/>
+          </a:p>
+          <a:p>
+            <a:pPr algn="ctr"/>
+            <a:endParaRPr lang="fr-FR" dirty="0"/>
+          </a:p>
+          <a:p>
+            <a:pPr marL="0" indent="0" algn="ctr">
+              <a:buNone/>
+            </a:pPr>
+            <a:r>
+              <a:rPr lang="fr-FR" sz="4400" dirty="0"/>
+              <a:t>Merci pour votre attention</a:t>
+            </a:r>
+          </a:p>
+          <a:p>
+            <a:pPr marL="0" indent="0">
+              <a:buNone/>
+            </a:pPr>
+            <a:endParaRPr lang="fr-FR" dirty="0"/>
+          </a:p>
+        </p:txBody>
+      </p:sp>
+      <p:sp>
+        <p:nvSpPr>
+          <p:cNvPr id="4" name="Espace réservé du numéro de diapositive 3"/>
+          <p:cNvSpPr>
+            <a:spLocks noGrp="1"/>
+          </p:cNvSpPr>
+          <p:nvPr>
+            <p:ph type="sldNum" sz="quarter" idx="12"/>
+          </p:nvPr>
+        </p:nvSpPr>
+        <p:spPr/>
+        <p:txBody>
+          <a:bodyPr/>
+          <a:lstStyle/>
+          <a:p>
+            <a:fld id="{8F3E9BA4-B10B-4221-834F-1BD1265045F1}" type="slidenum">
+              <a:rPr lang="fr-FR" smtClean="0"/>
+              <a:pPr/>
+              <a:t>18</a:t>
             </a:fld>
             <a:endParaRPr lang="fr-FR" dirty="0"/>
           </a:p>
@@ -5101,7 +7082,7 @@
           <p:nvPr/>
         </p:nvPicPr>
         <p:blipFill>
-          <a:blip r:embed="rId2">
+          <a:blip r:embed="rId2" cstate="print">
             <a:extLst>
               <a:ext uri="{28A0092B-C50C-407E-A947-70E740481C1C}">
                 <a14:useLocalDpi xmlns:a14="http://schemas.microsoft.com/office/drawing/2010/main" val="0"/>
@@ -5131,7 +7112,7 @@
           <p:nvPr/>
         </p:nvPicPr>
         <p:blipFill>
-          <a:blip r:embed="rId3">
+          <a:blip r:embed="rId3" cstate="print">
             <a:extLst>
               <a:ext uri="{28A0092B-C50C-407E-A947-70E740481C1C}">
                 <a14:useLocalDpi xmlns:a14="http://schemas.microsoft.com/office/drawing/2010/main" val="0"/>
@@ -9400,7 +11381,7 @@
     <mc:Choice Requires="p14">
       <p:transition p14:dur="10"/>
     </mc:Choice>
-    <mc:Fallback xmlns="" xmlns:a="http://schemas.openxmlformats.org/drawingml/2006/main" xmlns:r="http://schemas.openxmlformats.org/officeDocument/2006/relationships" xmlns:p="http://schemas.openxmlformats.org/presentationml/2006/main">
+    <mc:Fallback xmlns:p="http://schemas.openxmlformats.org/presentationml/2006/main" xmlns:r="http://schemas.openxmlformats.org/officeDocument/2006/relationships" xmlns:a="http://schemas.openxmlformats.org/drawingml/2006/main" xmlns="">
       <p:transition/>
     </mc:Fallback>
   </mc:AlternateContent>

</xml_diff>

<commit_message>
Version finale de la présentation
</commit_message>
<xml_diff>
--- a/Presentation/Présentation du projet (ARS).pptx
+++ b/Presentation/Présentation du projet (ARS).pptx
@@ -17,11 +17,11 @@
     <p:sldId id="268" r:id="rId8"/>
     <p:sldId id="269" r:id="rId9"/>
     <p:sldId id="272" r:id="rId10"/>
-    <p:sldId id="260" r:id="rId11"/>
-    <p:sldId id="273" r:id="rId12"/>
-    <p:sldId id="261" r:id="rId13"/>
-    <p:sldId id="264" r:id="rId14"/>
-    <p:sldId id="262" r:id="rId15"/>
+    <p:sldId id="277" r:id="rId11"/>
+    <p:sldId id="279" r:id="rId12"/>
+    <p:sldId id="273" r:id="rId13"/>
+    <p:sldId id="261" r:id="rId14"/>
+    <p:sldId id="278" r:id="rId15"/>
     <p:sldId id="263" r:id="rId16"/>
     <p:sldId id="275" r:id="rId17"/>
     <p:sldId id="274" r:id="rId18"/>
@@ -213,7 +213,7 @@
           <a:p>
             <a:fld id="{DF94A7AC-E918-401E-A86D-EF9AFC74FAE8}" type="datetimeFigureOut">
               <a:rPr lang="fr-FR" smtClean="0"/>
-              <a:t>11/12/2016</a:t>
+              <a:t>13/12/2016</a:t>
             </a:fld>
             <a:endParaRPr lang="fr-FR"/>
           </a:p>
@@ -609,7 +609,7 @@
           <a:p>
             <a:fld id="{FDCAAEB2-A84F-4FB6-A41A-D1011A56829B}" type="datetime1">
               <a:rPr lang="fr-FR" smtClean="0"/>
-              <a:t>11/12/2016</a:t>
+              <a:t>13/12/2016</a:t>
             </a:fld>
             <a:endParaRPr lang="fr-FR"/>
           </a:p>
@@ -777,7 +777,7 @@
           <a:p>
             <a:fld id="{1AB9C4C4-7DB8-4B14-8BF2-6E42D3210997}" type="datetime1">
               <a:rPr lang="fr-FR" smtClean="0"/>
-              <a:t>11/12/2016</a:t>
+              <a:t>13/12/2016</a:t>
             </a:fld>
             <a:endParaRPr lang="fr-FR"/>
           </a:p>
@@ -955,7 +955,7 @@
           <a:p>
             <a:fld id="{16C572BD-612E-4BDC-8B5D-63C373EFC80F}" type="datetime1">
               <a:rPr lang="fr-FR" smtClean="0"/>
-              <a:t>11/12/2016</a:t>
+              <a:t>13/12/2016</a:t>
             </a:fld>
             <a:endParaRPr lang="fr-FR"/>
           </a:p>
@@ -1123,7 +1123,7 @@
           <a:p>
             <a:fld id="{5B35BB5B-ECE8-4A17-B0DD-9076F54E5BC7}" type="datetime1">
               <a:rPr lang="fr-FR" smtClean="0"/>
-              <a:t>11/12/2016</a:t>
+              <a:t>13/12/2016</a:t>
             </a:fld>
             <a:endParaRPr lang="fr-FR"/>
           </a:p>
@@ -1369,7 +1369,7 @@
           <a:p>
             <a:fld id="{07D736DE-8EAC-4233-BDD8-0A71E9306E4D}" type="datetime1">
               <a:rPr lang="fr-FR" smtClean="0"/>
-              <a:t>11/12/2016</a:t>
+              <a:t>13/12/2016</a:t>
             </a:fld>
             <a:endParaRPr lang="fr-FR"/>
           </a:p>
@@ -1598,7 +1598,7 @@
           <a:p>
             <a:fld id="{3F3EF361-BC71-40AD-851C-5917910CEE72}" type="datetime1">
               <a:rPr lang="fr-FR" smtClean="0"/>
-              <a:t>11/12/2016</a:t>
+              <a:t>13/12/2016</a:t>
             </a:fld>
             <a:endParaRPr lang="fr-FR"/>
           </a:p>
@@ -1962,7 +1962,7 @@
           <a:p>
             <a:fld id="{D40F95D9-4B6C-4F24-BA14-02A8E17C1586}" type="datetime1">
               <a:rPr lang="fr-FR" smtClean="0"/>
-              <a:t>11/12/2016</a:t>
+              <a:t>13/12/2016</a:t>
             </a:fld>
             <a:endParaRPr lang="fr-FR"/>
           </a:p>
@@ -2079,7 +2079,7 @@
           <a:p>
             <a:fld id="{99433A4D-FE3A-43E7-AE9A-985C59E6B99E}" type="datetime1">
               <a:rPr lang="fr-FR" smtClean="0"/>
-              <a:t>11/12/2016</a:t>
+              <a:t>13/12/2016</a:t>
             </a:fld>
             <a:endParaRPr lang="fr-FR"/>
           </a:p>
@@ -2174,7 +2174,7 @@
           <a:p>
             <a:fld id="{5A5EA5D9-98B8-48E3-97F1-67802972E83C}" type="datetime1">
               <a:rPr lang="fr-FR" smtClean="0"/>
-              <a:t>11/12/2016</a:t>
+              <a:t>13/12/2016</a:t>
             </a:fld>
             <a:endParaRPr lang="fr-FR"/>
           </a:p>
@@ -2449,7 +2449,7 @@
           <a:p>
             <a:fld id="{6BAC490B-EB41-47E8-939B-A86C55A99B29}" type="datetime1">
               <a:rPr lang="fr-FR" smtClean="0"/>
-              <a:t>11/12/2016</a:t>
+              <a:t>13/12/2016</a:t>
             </a:fld>
             <a:endParaRPr lang="fr-FR"/>
           </a:p>
@@ -2701,7 +2701,7 @@
           <a:p>
             <a:fld id="{F058E539-1B34-4709-A613-129214E18BB6}" type="datetime1">
               <a:rPr lang="fr-FR" smtClean="0"/>
-              <a:t>11/12/2016</a:t>
+              <a:t>13/12/2016</a:t>
             </a:fld>
             <a:endParaRPr lang="fr-FR"/>
           </a:p>
@@ -2922,7 +2922,7 @@
           <a:p>
             <a:fld id="{DB82AD0F-B180-4841-8D16-49122DBA59AC}" type="datetime1">
               <a:rPr lang="fr-FR" smtClean="0"/>
-              <a:t>11/12/2016</a:t>
+              <a:t>13/12/2016</a:t>
             </a:fld>
             <a:endParaRPr lang="fr-FR"/>
           </a:p>
@@ -3507,122 +3507,60 @@
             <a:pPr marL="0" indent="0">
               <a:buNone/>
             </a:pPr>
-            <a:endParaRPr lang="fr-FR" dirty="0"/>
-          </a:p>
-          <a:p>
-            <a:r>
-              <a:rPr lang="en-US" dirty="0" err="1"/>
-              <a:t>Fonctionnement</a:t>
-            </a:r>
-            <a:r>
-              <a:rPr lang="en-US" dirty="0"/>
-              <a:t> de </a:t>
-            </a:r>
-            <a:r>
-              <a:rPr lang="en-US" dirty="0" err="1"/>
-              <a:t>l’algorithme</a:t>
-            </a:r>
-            <a:r>
-              <a:rPr lang="en-US" dirty="0"/>
-              <a:t>  -&gt; </a:t>
-            </a:r>
-            <a:r>
-              <a:rPr lang="en-US" dirty="0" err="1"/>
-              <a:t>schéma</a:t>
-            </a:r>
-            <a:endParaRPr lang="en-US" dirty="0"/>
-          </a:p>
-          <a:p>
-            <a:r>
-              <a:rPr lang="en-US" dirty="0" err="1"/>
-              <a:t>Avantages</a:t>
-            </a:r>
-            <a:endParaRPr lang="en-US" dirty="0"/>
-          </a:p>
-          <a:p>
-            <a:pPr lvl="1"/>
-            <a:r>
-              <a:rPr lang="en-US" dirty="0" err="1"/>
-              <a:t>Trouver</a:t>
-            </a:r>
-            <a:r>
-              <a:rPr lang="en-US" dirty="0"/>
-              <a:t> </a:t>
-            </a:r>
-            <a:r>
-              <a:rPr lang="en-US" dirty="0" err="1"/>
-              <a:t>une</a:t>
-            </a:r>
-            <a:r>
-              <a:rPr lang="en-US" dirty="0"/>
-              <a:t> approximation de la bonne </a:t>
-            </a:r>
-            <a:r>
-              <a:rPr lang="en-US" dirty="0" err="1"/>
-              <a:t>réponse</a:t>
-            </a:r>
-            <a:r>
-              <a:rPr lang="en-US" dirty="0"/>
-              <a:t> </a:t>
-            </a:r>
-            <a:r>
-              <a:rPr lang="en-US" dirty="0" err="1"/>
-              <a:t>en</a:t>
-            </a:r>
-            <a:r>
-              <a:rPr lang="en-US" dirty="0"/>
-              <a:t> un temps </a:t>
-            </a:r>
-            <a:r>
-              <a:rPr lang="en-US" dirty="0" err="1"/>
-              <a:t>limité</a:t>
-            </a:r>
-            <a:endParaRPr lang="en-US" dirty="0"/>
-          </a:p>
-          <a:p>
-            <a:r>
-              <a:rPr lang="en-US" dirty="0" err="1"/>
-              <a:t>Inconvénients</a:t>
-            </a:r>
-            <a:endParaRPr lang="en-US" dirty="0"/>
-          </a:p>
-          <a:p>
-            <a:pPr lvl="1"/>
-            <a:r>
-              <a:rPr lang="en-US" dirty="0" err="1"/>
-              <a:t>Trouver</a:t>
-            </a:r>
-            <a:r>
-              <a:rPr lang="en-US" dirty="0"/>
-              <a:t> un </a:t>
-            </a:r>
-            <a:r>
-              <a:rPr lang="en-US" dirty="0" err="1"/>
-              <a:t>équilibre</a:t>
-            </a:r>
-            <a:r>
-              <a:rPr lang="en-US" dirty="0"/>
-              <a:t> entre et le </a:t>
-            </a:r>
-            <a:r>
-              <a:rPr lang="en-US" dirty="0" err="1"/>
-              <a:t>résultat</a:t>
-            </a:r>
-            <a:r>
-              <a:rPr lang="en-US" dirty="0"/>
-              <a:t> de </a:t>
-            </a:r>
-            <a:r>
-              <a:rPr lang="en-US" dirty="0" err="1"/>
-              <a:t>l’algorithme</a:t>
-            </a:r>
-            <a:endParaRPr lang="fr-FR" dirty="0"/>
-          </a:p>
-          <a:p>
-            <a:pPr marL="0" indent="0">
-              <a:buNone/>
+            <a:r>
+              <a:rPr lang="fr-FR" dirty="0"/>
+              <a:t>Fonctionnement de l’algorithme:</a:t>
+            </a:r>
+          </a:p>
+          <a:p>
+            <a:pPr marL="971550" lvl="1" indent="-514350">
+              <a:buFont typeface="+mj-lt"/>
+              <a:buAutoNum type="arabicPeriod"/>
             </a:pPr>
-            <a:endParaRPr lang="fr-FR" dirty="0"/>
+            <a:r>
+              <a:rPr lang="fr-FR" dirty="0"/>
+              <a:t>Calcul du rang</a:t>
+            </a:r>
+          </a:p>
+          <a:p>
+            <a:pPr marL="971550" lvl="1" indent="-514350">
+              <a:buFont typeface="+mj-lt"/>
+              <a:buAutoNum type="arabicPeriod"/>
+            </a:pPr>
+            <a:r>
+              <a:rPr lang="fr-FR" dirty="0"/>
+              <a:t>Mise en ordre des sommets</a:t>
+            </a:r>
+          </a:p>
+          <a:p>
+            <a:pPr marL="971550" lvl="1" indent="-514350">
+              <a:buFont typeface="+mj-lt"/>
+              <a:buAutoNum type="arabicPeriod"/>
+            </a:pPr>
+            <a:r>
+              <a:rPr lang="fr-FR" dirty="0"/>
+              <a:t>Affectation des couleurs</a:t>
+            </a:r>
+          </a:p>
+          <a:p>
+            <a:pPr marL="1428750" lvl="2" indent="-514350">
+              <a:buFont typeface="+mj-lt"/>
+              <a:buAutoNum type="arabicPeriod"/>
+            </a:pPr>
+            <a:r>
+              <a:rPr lang="fr-FR" dirty="0"/>
+              <a:t>Sommet avec le rang le plus élevé</a:t>
+            </a:r>
+          </a:p>
+          <a:p>
+            <a:pPr marL="1428750" lvl="2" indent="-514350">
+              <a:buFont typeface="+mj-lt"/>
+              <a:buAutoNum type="arabicPeriod"/>
+            </a:pPr>
+            <a:r>
+              <a:rPr lang="fr-FR" dirty="0"/>
+              <a:t>Autres sommets valides</a:t>
+            </a:r>
           </a:p>
         </p:txBody>
       </p:sp>
@@ -3650,16 +3588,1787 @@
           </a:p>
         </p:txBody>
       </p:sp>
+      <p:sp>
+        <p:nvSpPr>
+          <p:cNvPr id="5" name="Ellipse 4"/>
+          <p:cNvSpPr/>
+          <p:nvPr/>
+        </p:nvSpPr>
+        <p:spPr>
+          <a:xfrm>
+            <a:off x="8612672" y="3088645"/>
+            <a:ext cx="489879" cy="460618"/>
+          </a:xfrm>
+          <a:prstGeom prst="ellipse">
+            <a:avLst/>
+          </a:prstGeom>
+          <a:solidFill>
+            <a:schemeClr val="bg1"/>
+          </a:solidFill>
+        </p:spPr>
+        <p:style>
+          <a:lnRef idx="2">
+            <a:schemeClr val="accent1">
+              <a:shade val="50%"/>
+            </a:schemeClr>
+          </a:lnRef>
+          <a:fillRef idx="1">
+            <a:schemeClr val="accent1"/>
+          </a:fillRef>
+          <a:effectRef idx="0">
+            <a:schemeClr val="accent1"/>
+          </a:effectRef>
+          <a:fontRef idx="minor">
+            <a:schemeClr val="lt1"/>
+          </a:fontRef>
+        </p:style>
+        <p:txBody>
+          <a:bodyPr rtlCol="0" anchor="ctr"/>
+          <a:lstStyle/>
+          <a:p>
+            <a:pPr algn="ctr"/>
+            <a:endParaRPr lang="fr-FR"/>
+          </a:p>
+        </p:txBody>
+      </p:sp>
+      <p:sp>
+        <p:nvSpPr>
+          <p:cNvPr id="6" name="Ellipse 5"/>
+          <p:cNvSpPr/>
+          <p:nvPr/>
+        </p:nvSpPr>
+        <p:spPr>
+          <a:xfrm>
+            <a:off x="6871667" y="3684993"/>
+            <a:ext cx="489879" cy="460618"/>
+          </a:xfrm>
+          <a:prstGeom prst="ellipse">
+            <a:avLst/>
+          </a:prstGeom>
+          <a:solidFill>
+            <a:schemeClr val="bg1"/>
+          </a:solidFill>
+        </p:spPr>
+        <p:style>
+          <a:lnRef idx="2">
+            <a:schemeClr val="accent1">
+              <a:shade val="50%"/>
+            </a:schemeClr>
+          </a:lnRef>
+          <a:fillRef idx="1">
+            <a:schemeClr val="accent1"/>
+          </a:fillRef>
+          <a:effectRef idx="0">
+            <a:schemeClr val="accent1"/>
+          </a:effectRef>
+          <a:fontRef idx="minor">
+            <a:schemeClr val="lt1"/>
+          </a:fontRef>
+        </p:style>
+        <p:txBody>
+          <a:bodyPr rtlCol="0" anchor="ctr"/>
+          <a:lstStyle/>
+          <a:p>
+            <a:pPr algn="ctr"/>
+            <a:endParaRPr lang="fr-FR"/>
+          </a:p>
+        </p:txBody>
+      </p:sp>
+      <p:sp>
+        <p:nvSpPr>
+          <p:cNvPr id="7" name="Ellipse 6"/>
+          <p:cNvSpPr/>
+          <p:nvPr/>
+        </p:nvSpPr>
+        <p:spPr>
+          <a:xfrm>
+            <a:off x="6878295" y="4997683"/>
+            <a:ext cx="489879" cy="460618"/>
+          </a:xfrm>
+          <a:prstGeom prst="ellipse">
+            <a:avLst/>
+          </a:prstGeom>
+          <a:solidFill>
+            <a:schemeClr val="bg1"/>
+          </a:solidFill>
+        </p:spPr>
+        <p:style>
+          <a:lnRef idx="2">
+            <a:schemeClr val="accent1">
+              <a:shade val="50%"/>
+            </a:schemeClr>
+          </a:lnRef>
+          <a:fillRef idx="1">
+            <a:schemeClr val="accent1"/>
+          </a:fillRef>
+          <a:effectRef idx="0">
+            <a:schemeClr val="accent1"/>
+          </a:effectRef>
+          <a:fontRef idx="minor">
+            <a:schemeClr val="lt1"/>
+          </a:fontRef>
+        </p:style>
+        <p:txBody>
+          <a:bodyPr rtlCol="0" anchor="ctr"/>
+          <a:lstStyle/>
+          <a:p>
+            <a:pPr algn="ctr"/>
+            <a:endParaRPr lang="fr-FR"/>
+          </a:p>
+        </p:txBody>
+      </p:sp>
+      <p:sp>
+        <p:nvSpPr>
+          <p:cNvPr id="8" name="Ellipse 7"/>
+          <p:cNvSpPr/>
+          <p:nvPr/>
+        </p:nvSpPr>
+        <p:spPr>
+          <a:xfrm>
+            <a:off x="9421054" y="4167835"/>
+            <a:ext cx="489879" cy="460618"/>
+          </a:xfrm>
+          <a:prstGeom prst="ellipse">
+            <a:avLst/>
+          </a:prstGeom>
+          <a:solidFill>
+            <a:schemeClr val="bg1"/>
+          </a:solidFill>
+        </p:spPr>
+        <p:style>
+          <a:lnRef idx="2">
+            <a:schemeClr val="accent1">
+              <a:shade val="50%"/>
+            </a:schemeClr>
+          </a:lnRef>
+          <a:fillRef idx="1">
+            <a:schemeClr val="accent1"/>
+          </a:fillRef>
+          <a:effectRef idx="0">
+            <a:schemeClr val="accent1"/>
+          </a:effectRef>
+          <a:fontRef idx="minor">
+            <a:schemeClr val="lt1"/>
+          </a:fontRef>
+        </p:style>
+        <p:txBody>
+          <a:bodyPr rtlCol="0" anchor="ctr"/>
+          <a:lstStyle/>
+          <a:p>
+            <a:pPr algn="ctr"/>
+            <a:endParaRPr lang="fr-FR"/>
+          </a:p>
+        </p:txBody>
+      </p:sp>
+      <p:sp>
+        <p:nvSpPr>
+          <p:cNvPr id="9" name="Ellipse 8"/>
+          <p:cNvSpPr/>
+          <p:nvPr/>
+        </p:nvSpPr>
+        <p:spPr>
+          <a:xfrm>
+            <a:off x="9739106" y="5057318"/>
+            <a:ext cx="489879" cy="460618"/>
+          </a:xfrm>
+          <a:prstGeom prst="ellipse">
+            <a:avLst/>
+          </a:prstGeom>
+          <a:solidFill>
+            <a:schemeClr val="bg1"/>
+          </a:solidFill>
+        </p:spPr>
+        <p:style>
+          <a:lnRef idx="2">
+            <a:schemeClr val="accent1">
+              <a:shade val="50%"/>
+            </a:schemeClr>
+          </a:lnRef>
+          <a:fillRef idx="1">
+            <a:schemeClr val="accent1"/>
+          </a:fillRef>
+          <a:effectRef idx="0">
+            <a:schemeClr val="accent1"/>
+          </a:effectRef>
+          <a:fontRef idx="minor">
+            <a:schemeClr val="lt1"/>
+          </a:fontRef>
+        </p:style>
+        <p:txBody>
+          <a:bodyPr rtlCol="0" anchor="ctr"/>
+          <a:lstStyle/>
+          <a:p>
+            <a:pPr algn="ctr"/>
+            <a:endParaRPr lang="fr-FR"/>
+          </a:p>
+        </p:txBody>
+      </p:sp>
+      <p:cxnSp>
+        <p:nvCxnSpPr>
+          <p:cNvPr id="10" name="Connecteur droit 9"/>
+          <p:cNvCxnSpPr>
+            <a:stCxn id="6" idx="6"/>
+            <a:endCxn id="8" idx="2"/>
+          </p:cNvCxnSpPr>
+          <p:nvPr/>
+        </p:nvCxnSpPr>
+        <p:spPr>
+          <a:xfrm>
+            <a:off x="7361546" y="3915302"/>
+            <a:ext cx="2059508" cy="482842"/>
+          </a:xfrm>
+          <a:prstGeom prst="line">
+            <a:avLst/>
+          </a:prstGeom>
+          <a:ln w="38100">
+            <a:solidFill>
+              <a:schemeClr val="tx1"/>
+            </a:solidFill>
+          </a:ln>
+        </p:spPr>
+        <p:style>
+          <a:lnRef idx="1">
+            <a:schemeClr val="accent1"/>
+          </a:lnRef>
+          <a:fillRef idx="0">
+            <a:schemeClr val="accent1"/>
+          </a:fillRef>
+          <a:effectRef idx="0">
+            <a:schemeClr val="accent1"/>
+          </a:effectRef>
+          <a:fontRef idx="minor">
+            <a:schemeClr val="tx1"/>
+          </a:fontRef>
+        </p:style>
+      </p:cxnSp>
+      <p:cxnSp>
+        <p:nvCxnSpPr>
+          <p:cNvPr id="11" name="Connecteur droit 10"/>
+          <p:cNvCxnSpPr>
+            <a:stCxn id="8" idx="5"/>
+            <a:endCxn id="9" idx="0"/>
+          </p:cNvCxnSpPr>
+          <p:nvPr/>
+        </p:nvCxnSpPr>
+        <p:spPr>
+          <a:xfrm>
+            <a:off x="9839192" y="4560997"/>
+            <a:ext cx="144854" cy="496321"/>
+          </a:xfrm>
+          <a:prstGeom prst="line">
+            <a:avLst/>
+          </a:prstGeom>
+          <a:ln w="38100">
+            <a:solidFill>
+              <a:schemeClr val="tx1"/>
+            </a:solidFill>
+          </a:ln>
+        </p:spPr>
+        <p:style>
+          <a:lnRef idx="1">
+            <a:schemeClr val="accent1"/>
+          </a:lnRef>
+          <a:fillRef idx="0">
+            <a:schemeClr val="accent1"/>
+          </a:fillRef>
+          <a:effectRef idx="0">
+            <a:schemeClr val="accent1"/>
+          </a:effectRef>
+          <a:fontRef idx="minor">
+            <a:schemeClr val="tx1"/>
+          </a:fontRef>
+        </p:style>
+      </p:cxnSp>
+      <p:cxnSp>
+        <p:nvCxnSpPr>
+          <p:cNvPr id="12" name="Connecteur droit 11"/>
+          <p:cNvCxnSpPr>
+            <a:stCxn id="5" idx="2"/>
+            <a:endCxn id="6" idx="7"/>
+          </p:cNvCxnSpPr>
+          <p:nvPr/>
+        </p:nvCxnSpPr>
+        <p:spPr>
+          <a:xfrm flipH="1">
+            <a:off x="7289805" y="3318954"/>
+            <a:ext cx="1322867" cy="433495"/>
+          </a:xfrm>
+          <a:prstGeom prst="line">
+            <a:avLst/>
+          </a:prstGeom>
+          <a:ln w="38100">
+            <a:solidFill>
+              <a:schemeClr val="tx1"/>
+            </a:solidFill>
+          </a:ln>
+        </p:spPr>
+        <p:style>
+          <a:lnRef idx="1">
+            <a:schemeClr val="accent1"/>
+          </a:lnRef>
+          <a:fillRef idx="0">
+            <a:schemeClr val="accent1"/>
+          </a:fillRef>
+          <a:effectRef idx="0">
+            <a:schemeClr val="accent1"/>
+          </a:effectRef>
+          <a:fontRef idx="minor">
+            <a:schemeClr val="tx1"/>
+          </a:fontRef>
+        </p:style>
+      </p:cxnSp>
+      <p:cxnSp>
+        <p:nvCxnSpPr>
+          <p:cNvPr id="13" name="Connecteur droit 12"/>
+          <p:cNvCxnSpPr>
+            <a:stCxn id="6" idx="4"/>
+            <a:endCxn id="7" idx="0"/>
+          </p:cNvCxnSpPr>
+          <p:nvPr/>
+        </p:nvCxnSpPr>
+        <p:spPr>
+          <a:xfrm>
+            <a:off x="7116607" y="4145611"/>
+            <a:ext cx="6628" cy="852072"/>
+          </a:xfrm>
+          <a:prstGeom prst="line">
+            <a:avLst/>
+          </a:prstGeom>
+          <a:ln w="38100">
+            <a:solidFill>
+              <a:schemeClr val="tx1"/>
+            </a:solidFill>
+          </a:ln>
+        </p:spPr>
+        <p:style>
+          <a:lnRef idx="1">
+            <a:schemeClr val="accent1"/>
+          </a:lnRef>
+          <a:fillRef idx="0">
+            <a:schemeClr val="accent1"/>
+          </a:fillRef>
+          <a:effectRef idx="0">
+            <a:schemeClr val="accent1"/>
+          </a:effectRef>
+          <a:fontRef idx="minor">
+            <a:schemeClr val="tx1"/>
+          </a:fontRef>
+        </p:style>
+      </p:cxnSp>
+      <p:cxnSp>
+        <p:nvCxnSpPr>
+          <p:cNvPr id="14" name="Connecteur droit 13"/>
+          <p:cNvCxnSpPr>
+            <a:stCxn id="8" idx="3"/>
+            <a:endCxn id="7" idx="7"/>
+          </p:cNvCxnSpPr>
+          <p:nvPr/>
+        </p:nvCxnSpPr>
+        <p:spPr>
+          <a:xfrm flipH="1">
+            <a:off x="7296433" y="4560997"/>
+            <a:ext cx="2196362" cy="504142"/>
+          </a:xfrm>
+          <a:prstGeom prst="line">
+            <a:avLst/>
+          </a:prstGeom>
+          <a:ln w="38100">
+            <a:solidFill>
+              <a:schemeClr val="tx1"/>
+            </a:solidFill>
+          </a:ln>
+        </p:spPr>
+        <p:style>
+          <a:lnRef idx="1">
+            <a:schemeClr val="accent1"/>
+          </a:lnRef>
+          <a:fillRef idx="0">
+            <a:schemeClr val="accent1"/>
+          </a:fillRef>
+          <a:effectRef idx="0">
+            <a:schemeClr val="accent1"/>
+          </a:effectRef>
+          <a:fontRef idx="minor">
+            <a:schemeClr val="tx1"/>
+          </a:fontRef>
+        </p:style>
+      </p:cxnSp>
+      <p:cxnSp>
+        <p:nvCxnSpPr>
+          <p:cNvPr id="15" name="Connecteur droit 14"/>
+          <p:cNvCxnSpPr>
+            <a:stCxn id="7" idx="6"/>
+            <a:endCxn id="9" idx="2"/>
+          </p:cNvCxnSpPr>
+          <p:nvPr/>
+        </p:nvCxnSpPr>
+        <p:spPr>
+          <a:xfrm>
+            <a:off x="7368174" y="5227992"/>
+            <a:ext cx="2370932" cy="59635"/>
+          </a:xfrm>
+          <a:prstGeom prst="line">
+            <a:avLst/>
+          </a:prstGeom>
+          <a:ln w="38100">
+            <a:solidFill>
+              <a:schemeClr val="tx1"/>
+            </a:solidFill>
+          </a:ln>
+        </p:spPr>
+        <p:style>
+          <a:lnRef idx="1">
+            <a:schemeClr val="accent1"/>
+          </a:lnRef>
+          <a:fillRef idx="0">
+            <a:schemeClr val="accent1"/>
+          </a:fillRef>
+          <a:effectRef idx="0">
+            <a:schemeClr val="accent1"/>
+          </a:effectRef>
+          <a:fontRef idx="minor">
+            <a:schemeClr val="tx1"/>
+          </a:fontRef>
+        </p:style>
+      </p:cxnSp>
+      <p:sp>
+        <p:nvSpPr>
+          <p:cNvPr id="21" name="ZoneTexte 20"/>
+          <p:cNvSpPr txBox="1"/>
+          <p:nvPr/>
+        </p:nvSpPr>
+        <p:spPr>
+          <a:xfrm>
+            <a:off x="8728523" y="2677298"/>
+            <a:ext cx="311440" cy="369332"/>
+          </a:xfrm>
+          <a:prstGeom prst="rect">
+            <a:avLst/>
+          </a:prstGeom>
+          <a:noFill/>
+        </p:spPr>
+        <p:txBody>
+          <a:bodyPr wrap="square" rtlCol="0">
+            <a:spAutoFit/>
+          </a:bodyPr>
+          <a:lstStyle/>
+          <a:p>
+            <a:r>
+              <a:rPr lang="fr-FR" dirty="0"/>
+              <a:t>1</a:t>
+            </a:r>
+          </a:p>
+        </p:txBody>
+      </p:sp>
+      <p:sp>
+        <p:nvSpPr>
+          <p:cNvPr id="22" name="ZoneTexte 21"/>
+          <p:cNvSpPr txBox="1"/>
+          <p:nvPr/>
+        </p:nvSpPr>
+        <p:spPr>
+          <a:xfrm>
+            <a:off x="7010214" y="3266096"/>
+            <a:ext cx="311440" cy="369332"/>
+          </a:xfrm>
+          <a:prstGeom prst="rect">
+            <a:avLst/>
+          </a:prstGeom>
+          <a:noFill/>
+        </p:spPr>
+        <p:txBody>
+          <a:bodyPr wrap="square" rtlCol="0">
+            <a:spAutoFit/>
+          </a:bodyPr>
+          <a:lstStyle/>
+          <a:p>
+            <a:r>
+              <a:rPr lang="fr-FR" dirty="0"/>
+              <a:t>3</a:t>
+            </a:r>
+          </a:p>
+        </p:txBody>
+      </p:sp>
+      <p:sp>
+        <p:nvSpPr>
+          <p:cNvPr id="23" name="ZoneTexte 22"/>
+          <p:cNvSpPr txBox="1"/>
+          <p:nvPr/>
+        </p:nvSpPr>
+        <p:spPr>
+          <a:xfrm>
+            <a:off x="9581221" y="3749989"/>
+            <a:ext cx="311440" cy="369332"/>
+          </a:xfrm>
+          <a:prstGeom prst="rect">
+            <a:avLst/>
+          </a:prstGeom>
+          <a:noFill/>
+        </p:spPr>
+        <p:txBody>
+          <a:bodyPr wrap="square" rtlCol="0">
+            <a:spAutoFit/>
+          </a:bodyPr>
+          <a:lstStyle/>
+          <a:p>
+            <a:r>
+              <a:rPr lang="fr-FR" dirty="0"/>
+              <a:t>3</a:t>
+            </a:r>
+          </a:p>
+        </p:txBody>
+      </p:sp>
+      <p:sp>
+        <p:nvSpPr>
+          <p:cNvPr id="24" name="ZoneTexte 23"/>
+          <p:cNvSpPr txBox="1"/>
+          <p:nvPr/>
+        </p:nvSpPr>
+        <p:spPr>
+          <a:xfrm>
+            <a:off x="9854957" y="5616809"/>
+            <a:ext cx="311440" cy="369332"/>
+          </a:xfrm>
+          <a:prstGeom prst="rect">
+            <a:avLst/>
+          </a:prstGeom>
+          <a:noFill/>
+        </p:spPr>
+        <p:txBody>
+          <a:bodyPr wrap="square" rtlCol="0">
+            <a:spAutoFit/>
+          </a:bodyPr>
+          <a:lstStyle/>
+          <a:p>
+            <a:r>
+              <a:rPr lang="fr-FR" dirty="0"/>
+              <a:t>2</a:t>
+            </a:r>
+          </a:p>
+        </p:txBody>
+      </p:sp>
+      <p:sp>
+        <p:nvSpPr>
+          <p:cNvPr id="25" name="ZoneTexte 24"/>
+          <p:cNvSpPr txBox="1"/>
+          <p:nvPr/>
+        </p:nvSpPr>
+        <p:spPr>
+          <a:xfrm>
+            <a:off x="6987518" y="5533949"/>
+            <a:ext cx="311440" cy="369332"/>
+          </a:xfrm>
+          <a:prstGeom prst="rect">
+            <a:avLst/>
+          </a:prstGeom>
+          <a:noFill/>
+        </p:spPr>
+        <p:txBody>
+          <a:bodyPr wrap="square" rtlCol="0">
+            <a:spAutoFit/>
+          </a:bodyPr>
+          <a:lstStyle/>
+          <a:p>
+            <a:r>
+              <a:rPr lang="fr-FR" dirty="0"/>
+              <a:t>3</a:t>
+            </a:r>
+          </a:p>
+        </p:txBody>
+      </p:sp>
+      <p:sp>
+        <p:nvSpPr>
+          <p:cNvPr id="26" name="ZoneTexte 25"/>
+          <p:cNvSpPr txBox="1"/>
+          <p:nvPr/>
+        </p:nvSpPr>
+        <p:spPr>
+          <a:xfrm>
+            <a:off x="7016842" y="3762867"/>
+            <a:ext cx="311440" cy="369332"/>
+          </a:xfrm>
+          <a:prstGeom prst="rect">
+            <a:avLst/>
+          </a:prstGeom>
+          <a:noFill/>
+        </p:spPr>
+        <p:txBody>
+          <a:bodyPr wrap="square" rtlCol="0">
+            <a:spAutoFit/>
+          </a:bodyPr>
+          <a:lstStyle/>
+          <a:p>
+            <a:r>
+              <a:rPr lang="fr-FR" dirty="0"/>
+              <a:t>1</a:t>
+            </a:r>
+          </a:p>
+        </p:txBody>
+      </p:sp>
+      <p:sp>
+        <p:nvSpPr>
+          <p:cNvPr id="27" name="ZoneTexte 26"/>
+          <p:cNvSpPr txBox="1"/>
+          <p:nvPr/>
+        </p:nvSpPr>
+        <p:spPr>
+          <a:xfrm>
+            <a:off x="9584256" y="4238907"/>
+            <a:ext cx="311440" cy="369332"/>
+          </a:xfrm>
+          <a:prstGeom prst="rect">
+            <a:avLst/>
+          </a:prstGeom>
+          <a:noFill/>
+        </p:spPr>
+        <p:txBody>
+          <a:bodyPr wrap="square" rtlCol="0">
+            <a:spAutoFit/>
+          </a:bodyPr>
+          <a:lstStyle/>
+          <a:p>
+            <a:r>
+              <a:rPr lang="fr-FR" dirty="0"/>
+              <a:t>2</a:t>
+            </a:r>
+          </a:p>
+        </p:txBody>
+      </p:sp>
+      <p:sp>
+        <p:nvSpPr>
+          <p:cNvPr id="28" name="ZoneTexte 27"/>
+          <p:cNvSpPr txBox="1"/>
+          <p:nvPr/>
+        </p:nvSpPr>
+        <p:spPr>
+          <a:xfrm>
+            <a:off x="7016842" y="5056893"/>
+            <a:ext cx="311440" cy="369332"/>
+          </a:xfrm>
+          <a:prstGeom prst="rect">
+            <a:avLst/>
+          </a:prstGeom>
+          <a:noFill/>
+        </p:spPr>
+        <p:txBody>
+          <a:bodyPr wrap="square" rtlCol="0">
+            <a:spAutoFit/>
+          </a:bodyPr>
+          <a:lstStyle/>
+          <a:p>
+            <a:r>
+              <a:rPr lang="fr-FR" dirty="0"/>
+              <a:t>3</a:t>
+            </a:r>
+          </a:p>
+        </p:txBody>
+      </p:sp>
+      <p:sp>
+        <p:nvSpPr>
+          <p:cNvPr id="29" name="ZoneTexte 28"/>
+          <p:cNvSpPr txBox="1"/>
+          <p:nvPr/>
+        </p:nvSpPr>
+        <p:spPr>
+          <a:xfrm>
+            <a:off x="9939046" y="5128911"/>
+            <a:ext cx="311440" cy="369332"/>
+          </a:xfrm>
+          <a:prstGeom prst="rect">
+            <a:avLst/>
+          </a:prstGeom>
+          <a:noFill/>
+        </p:spPr>
+        <p:txBody>
+          <a:bodyPr wrap="square" rtlCol="0">
+            <a:spAutoFit/>
+          </a:bodyPr>
+          <a:lstStyle/>
+          <a:p>
+            <a:r>
+              <a:rPr lang="fr-FR" dirty="0"/>
+              <a:t>4</a:t>
+            </a:r>
+          </a:p>
+        </p:txBody>
+      </p:sp>
+      <p:sp>
+        <p:nvSpPr>
+          <p:cNvPr id="30" name="ZoneTexte 29"/>
+          <p:cNvSpPr txBox="1"/>
+          <p:nvPr/>
+        </p:nvSpPr>
+        <p:spPr>
+          <a:xfrm>
+            <a:off x="8798570" y="3126148"/>
+            <a:ext cx="311440" cy="369332"/>
+          </a:xfrm>
+          <a:prstGeom prst="rect">
+            <a:avLst/>
+          </a:prstGeom>
+          <a:noFill/>
+        </p:spPr>
+        <p:txBody>
+          <a:bodyPr wrap="square" rtlCol="0">
+            <a:spAutoFit/>
+          </a:bodyPr>
+          <a:lstStyle/>
+          <a:p>
+            <a:r>
+              <a:rPr lang="fr-FR" dirty="0"/>
+              <a:t>5</a:t>
+            </a:r>
+          </a:p>
+        </p:txBody>
+      </p:sp>
+      <p:sp>
+        <p:nvSpPr>
+          <p:cNvPr id="32" name="Ellipse 31"/>
+          <p:cNvSpPr/>
+          <p:nvPr/>
+        </p:nvSpPr>
+        <p:spPr>
+          <a:xfrm>
+            <a:off x="6873739" y="3684961"/>
+            <a:ext cx="489879" cy="460618"/>
+          </a:xfrm>
+          <a:prstGeom prst="ellipse">
+            <a:avLst/>
+          </a:prstGeom>
+          <a:solidFill>
+            <a:schemeClr val="accent2"/>
+          </a:solidFill>
+        </p:spPr>
+        <p:style>
+          <a:lnRef idx="2">
+            <a:schemeClr val="accent1">
+              <a:shade val="50%"/>
+            </a:schemeClr>
+          </a:lnRef>
+          <a:fillRef idx="1">
+            <a:schemeClr val="accent1"/>
+          </a:fillRef>
+          <a:effectRef idx="0">
+            <a:schemeClr val="accent1"/>
+          </a:effectRef>
+          <a:fontRef idx="minor">
+            <a:schemeClr val="lt1"/>
+          </a:fontRef>
+        </p:style>
+        <p:txBody>
+          <a:bodyPr rtlCol="0" anchor="ctr"/>
+          <a:lstStyle/>
+          <a:p>
+            <a:pPr algn="ctr"/>
+            <a:endParaRPr lang="fr-FR"/>
+          </a:p>
+        </p:txBody>
+      </p:sp>
+      <p:sp>
+        <p:nvSpPr>
+          <p:cNvPr id="33" name="Ellipse 32"/>
+          <p:cNvSpPr/>
+          <p:nvPr/>
+        </p:nvSpPr>
+        <p:spPr>
+          <a:xfrm>
+            <a:off x="9738749" y="5057070"/>
+            <a:ext cx="489879" cy="460618"/>
+          </a:xfrm>
+          <a:prstGeom prst="ellipse">
+            <a:avLst/>
+          </a:prstGeom>
+          <a:solidFill>
+            <a:schemeClr val="accent2"/>
+          </a:solidFill>
+        </p:spPr>
+        <p:style>
+          <a:lnRef idx="2">
+            <a:schemeClr val="accent1">
+              <a:shade val="50%"/>
+            </a:schemeClr>
+          </a:lnRef>
+          <a:fillRef idx="1">
+            <a:schemeClr val="accent1"/>
+          </a:fillRef>
+          <a:effectRef idx="0">
+            <a:schemeClr val="accent1"/>
+          </a:effectRef>
+          <a:fontRef idx="minor">
+            <a:schemeClr val="lt1"/>
+          </a:fontRef>
+        </p:style>
+        <p:txBody>
+          <a:bodyPr rtlCol="0" anchor="ctr"/>
+          <a:lstStyle/>
+          <a:p>
+            <a:pPr algn="ctr"/>
+            <a:endParaRPr lang="fr-FR"/>
+          </a:p>
+        </p:txBody>
+      </p:sp>
+      <p:sp>
+        <p:nvSpPr>
+          <p:cNvPr id="34" name="Ellipse 33"/>
+          <p:cNvSpPr/>
+          <p:nvPr/>
+        </p:nvSpPr>
+        <p:spPr>
+          <a:xfrm>
+            <a:off x="9421054" y="4162796"/>
+            <a:ext cx="489879" cy="460618"/>
+          </a:xfrm>
+          <a:prstGeom prst="ellipse">
+            <a:avLst/>
+          </a:prstGeom>
+          <a:solidFill>
+            <a:schemeClr val="accent1"/>
+          </a:solidFill>
+        </p:spPr>
+        <p:style>
+          <a:lnRef idx="2">
+            <a:schemeClr val="accent1">
+              <a:shade val="50%"/>
+            </a:schemeClr>
+          </a:lnRef>
+          <a:fillRef idx="1">
+            <a:schemeClr val="accent1"/>
+          </a:fillRef>
+          <a:effectRef idx="0">
+            <a:schemeClr val="accent1"/>
+          </a:effectRef>
+          <a:fontRef idx="minor">
+            <a:schemeClr val="lt1"/>
+          </a:fontRef>
+        </p:style>
+        <p:txBody>
+          <a:bodyPr rtlCol="0" anchor="ctr"/>
+          <a:lstStyle/>
+          <a:p>
+            <a:pPr algn="ctr"/>
+            <a:endParaRPr lang="fr-FR"/>
+          </a:p>
+        </p:txBody>
+      </p:sp>
+      <p:sp>
+        <p:nvSpPr>
+          <p:cNvPr id="35" name="Ellipse 34"/>
+          <p:cNvSpPr/>
+          <p:nvPr/>
+        </p:nvSpPr>
+        <p:spPr>
+          <a:xfrm>
+            <a:off x="8610600" y="3088645"/>
+            <a:ext cx="489879" cy="460618"/>
+          </a:xfrm>
+          <a:prstGeom prst="ellipse">
+            <a:avLst/>
+          </a:prstGeom>
+          <a:solidFill>
+            <a:schemeClr val="accent1"/>
+          </a:solidFill>
+        </p:spPr>
+        <p:style>
+          <a:lnRef idx="2">
+            <a:schemeClr val="accent1">
+              <a:shade val="50%"/>
+            </a:schemeClr>
+          </a:lnRef>
+          <a:fillRef idx="1">
+            <a:schemeClr val="accent1"/>
+          </a:fillRef>
+          <a:effectRef idx="0">
+            <a:schemeClr val="accent1"/>
+          </a:effectRef>
+          <a:fontRef idx="minor">
+            <a:schemeClr val="lt1"/>
+          </a:fontRef>
+        </p:style>
+        <p:txBody>
+          <a:bodyPr rtlCol="0" anchor="ctr"/>
+          <a:lstStyle/>
+          <a:p>
+            <a:pPr algn="ctr"/>
+            <a:endParaRPr lang="fr-FR"/>
+          </a:p>
+        </p:txBody>
+      </p:sp>
+      <p:sp>
+        <p:nvSpPr>
+          <p:cNvPr id="36" name="Ellipse 35"/>
+          <p:cNvSpPr/>
+          <p:nvPr/>
+        </p:nvSpPr>
+        <p:spPr>
+          <a:xfrm>
+            <a:off x="6871667" y="4997949"/>
+            <a:ext cx="489879" cy="460618"/>
+          </a:xfrm>
+          <a:prstGeom prst="ellipse">
+            <a:avLst/>
+          </a:prstGeom>
+          <a:solidFill>
+            <a:schemeClr val="accent6"/>
+          </a:solidFill>
+        </p:spPr>
+        <p:style>
+          <a:lnRef idx="2">
+            <a:schemeClr val="accent1">
+              <a:shade val="50%"/>
+            </a:schemeClr>
+          </a:lnRef>
+          <a:fillRef idx="1">
+            <a:schemeClr val="accent1"/>
+          </a:fillRef>
+          <a:effectRef idx="0">
+            <a:schemeClr val="accent1"/>
+          </a:effectRef>
+          <a:fontRef idx="minor">
+            <a:schemeClr val="lt1"/>
+          </a:fontRef>
+        </p:style>
+        <p:txBody>
+          <a:bodyPr rtlCol="0" anchor="ctr"/>
+          <a:lstStyle/>
+          <a:p>
+            <a:pPr algn="ctr"/>
+            <a:endParaRPr lang="fr-FR"/>
+          </a:p>
+        </p:txBody>
+      </p:sp>
     </p:spTree>
     <p:extLst>
       <p:ext uri="{BB962C8B-B14F-4D97-AF65-F5344CB8AC3E}">
-        <p14:creationId xmlns:p14="http://schemas.microsoft.com/office/powerpoint/2010/main" val="2311396477"/>
+        <p14:creationId xmlns:p14="http://schemas.microsoft.com/office/powerpoint/2010/main" val="3113962469"/>
       </p:ext>
     </p:extLst>
   </p:cSld>
   <p:clrMapOvr>
     <a:masterClrMapping/>
   </p:clrMapOvr>
+  <p:timing>
+    <p:tnLst>
+      <p:par>
+        <p:cTn id="1" dur="indefinite" restart="never" nodeType="tmRoot">
+          <p:childTnLst>
+            <p:seq concurrent="1" nextAc="seek">
+              <p:cTn id="2" dur="indefinite" nodeType="mainSeq">
+                <p:childTnLst>
+                  <p:par>
+                    <p:cTn id="3" fill="hold">
+                      <p:stCondLst>
+                        <p:cond delay="indefinite"/>
+                      </p:stCondLst>
+                      <p:childTnLst>
+                        <p:par>
+                          <p:cTn id="4" fill="hold">
+                            <p:stCondLst>
+                              <p:cond delay="0"/>
+                            </p:stCondLst>
+                            <p:childTnLst>
+                              <p:par>
+                                <p:cTn id="5" presetID="1" presetClass="entr" presetSubtype="0" fill="hold" nodeType="clickEffect">
+                                  <p:stCondLst>
+                                    <p:cond delay="0"/>
+                                  </p:stCondLst>
+                                  <p:childTnLst>
+                                    <p:set>
+                                      <p:cBhvr>
+                                        <p:cTn id="6" dur="1" fill="hold">
+                                          <p:stCondLst>
+                                            <p:cond delay="0"/>
+                                          </p:stCondLst>
+                                        </p:cTn>
+                                        <p:tgtEl>
+                                          <p:spTgt spid="3">
+                                            <p:txEl>
+                                              <p:pRg st="1" end="1"/>
+                                            </p:txEl>
+                                          </p:spTgt>
+                                        </p:tgtEl>
+                                        <p:attrNameLst>
+                                          <p:attrName>style.visibility</p:attrName>
+                                        </p:attrNameLst>
+                                      </p:cBhvr>
+                                      <p:to>
+                                        <p:strVal val="visible"/>
+                                      </p:to>
+                                    </p:set>
+                                  </p:childTnLst>
+                                </p:cTn>
+                              </p:par>
+                            </p:childTnLst>
+                          </p:cTn>
+                        </p:par>
+                      </p:childTnLst>
+                    </p:cTn>
+                  </p:par>
+                  <p:par>
+                    <p:cTn id="7" fill="hold">
+                      <p:stCondLst>
+                        <p:cond delay="indefinite"/>
+                      </p:stCondLst>
+                      <p:childTnLst>
+                        <p:par>
+                          <p:cTn id="8" fill="hold">
+                            <p:stCondLst>
+                              <p:cond delay="0"/>
+                            </p:stCondLst>
+                            <p:childTnLst>
+                              <p:par>
+                                <p:cTn id="9" presetID="1" presetClass="entr" presetSubtype="0" fill="hold" grpId="0" nodeType="clickEffect">
+                                  <p:stCondLst>
+                                    <p:cond delay="0"/>
+                                  </p:stCondLst>
+                                  <p:childTnLst>
+                                    <p:set>
+                                      <p:cBhvr>
+                                        <p:cTn id="10" dur="1" fill="hold">
+                                          <p:stCondLst>
+                                            <p:cond delay="0"/>
+                                          </p:stCondLst>
+                                        </p:cTn>
+                                        <p:tgtEl>
+                                          <p:spTgt spid="21"/>
+                                        </p:tgtEl>
+                                        <p:attrNameLst>
+                                          <p:attrName>style.visibility</p:attrName>
+                                        </p:attrNameLst>
+                                      </p:cBhvr>
+                                      <p:to>
+                                        <p:strVal val="visible"/>
+                                      </p:to>
+                                    </p:set>
+                                  </p:childTnLst>
+                                </p:cTn>
+                              </p:par>
+                              <p:par>
+                                <p:cTn id="11" presetID="1" presetClass="entr" presetSubtype="0" fill="hold" grpId="0" nodeType="withEffect">
+                                  <p:stCondLst>
+                                    <p:cond delay="0"/>
+                                  </p:stCondLst>
+                                  <p:childTnLst>
+                                    <p:set>
+                                      <p:cBhvr>
+                                        <p:cTn id="12" dur="1" fill="hold">
+                                          <p:stCondLst>
+                                            <p:cond delay="0"/>
+                                          </p:stCondLst>
+                                        </p:cTn>
+                                        <p:tgtEl>
+                                          <p:spTgt spid="22"/>
+                                        </p:tgtEl>
+                                        <p:attrNameLst>
+                                          <p:attrName>style.visibility</p:attrName>
+                                        </p:attrNameLst>
+                                      </p:cBhvr>
+                                      <p:to>
+                                        <p:strVal val="visible"/>
+                                      </p:to>
+                                    </p:set>
+                                  </p:childTnLst>
+                                </p:cTn>
+                              </p:par>
+                              <p:par>
+                                <p:cTn id="13" presetID="1" presetClass="entr" presetSubtype="0" fill="hold" grpId="0" nodeType="withEffect">
+                                  <p:stCondLst>
+                                    <p:cond delay="0"/>
+                                  </p:stCondLst>
+                                  <p:childTnLst>
+                                    <p:set>
+                                      <p:cBhvr>
+                                        <p:cTn id="14" dur="1" fill="hold">
+                                          <p:stCondLst>
+                                            <p:cond delay="0"/>
+                                          </p:stCondLst>
+                                        </p:cTn>
+                                        <p:tgtEl>
+                                          <p:spTgt spid="25"/>
+                                        </p:tgtEl>
+                                        <p:attrNameLst>
+                                          <p:attrName>style.visibility</p:attrName>
+                                        </p:attrNameLst>
+                                      </p:cBhvr>
+                                      <p:to>
+                                        <p:strVal val="visible"/>
+                                      </p:to>
+                                    </p:set>
+                                  </p:childTnLst>
+                                </p:cTn>
+                              </p:par>
+                              <p:par>
+                                <p:cTn id="15" presetID="1" presetClass="entr" presetSubtype="0" fill="hold" grpId="0" nodeType="withEffect">
+                                  <p:stCondLst>
+                                    <p:cond delay="0"/>
+                                  </p:stCondLst>
+                                  <p:childTnLst>
+                                    <p:set>
+                                      <p:cBhvr>
+                                        <p:cTn id="16" dur="1" fill="hold">
+                                          <p:stCondLst>
+                                            <p:cond delay="0"/>
+                                          </p:stCondLst>
+                                        </p:cTn>
+                                        <p:tgtEl>
+                                          <p:spTgt spid="24"/>
+                                        </p:tgtEl>
+                                        <p:attrNameLst>
+                                          <p:attrName>style.visibility</p:attrName>
+                                        </p:attrNameLst>
+                                      </p:cBhvr>
+                                      <p:to>
+                                        <p:strVal val="visible"/>
+                                      </p:to>
+                                    </p:set>
+                                  </p:childTnLst>
+                                </p:cTn>
+                              </p:par>
+                              <p:par>
+                                <p:cTn id="17" presetID="1" presetClass="entr" presetSubtype="0" fill="hold" grpId="0" nodeType="withEffect">
+                                  <p:stCondLst>
+                                    <p:cond delay="0"/>
+                                  </p:stCondLst>
+                                  <p:childTnLst>
+                                    <p:set>
+                                      <p:cBhvr>
+                                        <p:cTn id="18" dur="1" fill="hold">
+                                          <p:stCondLst>
+                                            <p:cond delay="0"/>
+                                          </p:stCondLst>
+                                        </p:cTn>
+                                        <p:tgtEl>
+                                          <p:spTgt spid="23"/>
+                                        </p:tgtEl>
+                                        <p:attrNameLst>
+                                          <p:attrName>style.visibility</p:attrName>
+                                        </p:attrNameLst>
+                                      </p:cBhvr>
+                                      <p:to>
+                                        <p:strVal val="visible"/>
+                                      </p:to>
+                                    </p:set>
+                                  </p:childTnLst>
+                                </p:cTn>
+                              </p:par>
+                            </p:childTnLst>
+                          </p:cTn>
+                        </p:par>
+                      </p:childTnLst>
+                    </p:cTn>
+                  </p:par>
+                  <p:par>
+                    <p:cTn id="19" fill="hold">
+                      <p:stCondLst>
+                        <p:cond delay="indefinite"/>
+                      </p:stCondLst>
+                      <p:childTnLst>
+                        <p:par>
+                          <p:cTn id="20" fill="hold">
+                            <p:stCondLst>
+                              <p:cond delay="0"/>
+                            </p:stCondLst>
+                            <p:childTnLst>
+                              <p:par>
+                                <p:cTn id="21" presetID="1" presetClass="entr" presetSubtype="0" fill="hold" nodeType="clickEffect">
+                                  <p:stCondLst>
+                                    <p:cond delay="0"/>
+                                  </p:stCondLst>
+                                  <p:childTnLst>
+                                    <p:set>
+                                      <p:cBhvr>
+                                        <p:cTn id="22" dur="1" fill="hold">
+                                          <p:stCondLst>
+                                            <p:cond delay="0"/>
+                                          </p:stCondLst>
+                                        </p:cTn>
+                                        <p:tgtEl>
+                                          <p:spTgt spid="3">
+                                            <p:txEl>
+                                              <p:pRg st="2" end="2"/>
+                                            </p:txEl>
+                                          </p:spTgt>
+                                        </p:tgtEl>
+                                        <p:attrNameLst>
+                                          <p:attrName>style.visibility</p:attrName>
+                                        </p:attrNameLst>
+                                      </p:cBhvr>
+                                      <p:to>
+                                        <p:strVal val="visible"/>
+                                      </p:to>
+                                    </p:set>
+                                  </p:childTnLst>
+                                </p:cTn>
+                              </p:par>
+                            </p:childTnLst>
+                          </p:cTn>
+                        </p:par>
+                      </p:childTnLst>
+                    </p:cTn>
+                  </p:par>
+                  <p:par>
+                    <p:cTn id="23" fill="hold">
+                      <p:stCondLst>
+                        <p:cond delay="indefinite"/>
+                      </p:stCondLst>
+                      <p:childTnLst>
+                        <p:par>
+                          <p:cTn id="24" fill="hold">
+                            <p:stCondLst>
+                              <p:cond delay="0"/>
+                            </p:stCondLst>
+                            <p:childTnLst>
+                              <p:par>
+                                <p:cTn id="25" presetID="1" presetClass="entr" presetSubtype="0" fill="hold" grpId="0" nodeType="clickEffect">
+                                  <p:stCondLst>
+                                    <p:cond delay="0"/>
+                                  </p:stCondLst>
+                                  <p:childTnLst>
+                                    <p:set>
+                                      <p:cBhvr>
+                                        <p:cTn id="26" dur="1" fill="hold">
+                                          <p:stCondLst>
+                                            <p:cond delay="0"/>
+                                          </p:stCondLst>
+                                        </p:cTn>
+                                        <p:tgtEl>
+                                          <p:spTgt spid="26"/>
+                                        </p:tgtEl>
+                                        <p:attrNameLst>
+                                          <p:attrName>style.visibility</p:attrName>
+                                        </p:attrNameLst>
+                                      </p:cBhvr>
+                                      <p:to>
+                                        <p:strVal val="visible"/>
+                                      </p:to>
+                                    </p:set>
+                                  </p:childTnLst>
+                                </p:cTn>
+                              </p:par>
+                              <p:par>
+                                <p:cTn id="27" presetID="1" presetClass="entr" presetSubtype="0" fill="hold" grpId="0" nodeType="withEffect">
+                                  <p:stCondLst>
+                                    <p:cond delay="0"/>
+                                  </p:stCondLst>
+                                  <p:childTnLst>
+                                    <p:set>
+                                      <p:cBhvr>
+                                        <p:cTn id="28" dur="1" fill="hold">
+                                          <p:stCondLst>
+                                            <p:cond delay="0"/>
+                                          </p:stCondLst>
+                                        </p:cTn>
+                                        <p:tgtEl>
+                                          <p:spTgt spid="30"/>
+                                        </p:tgtEl>
+                                        <p:attrNameLst>
+                                          <p:attrName>style.visibility</p:attrName>
+                                        </p:attrNameLst>
+                                      </p:cBhvr>
+                                      <p:to>
+                                        <p:strVal val="visible"/>
+                                      </p:to>
+                                    </p:set>
+                                  </p:childTnLst>
+                                </p:cTn>
+                              </p:par>
+                              <p:par>
+                                <p:cTn id="29" presetID="1" presetClass="entr" presetSubtype="0" fill="hold" grpId="0" nodeType="withEffect">
+                                  <p:stCondLst>
+                                    <p:cond delay="0"/>
+                                  </p:stCondLst>
+                                  <p:childTnLst>
+                                    <p:set>
+                                      <p:cBhvr>
+                                        <p:cTn id="30" dur="1" fill="hold">
+                                          <p:stCondLst>
+                                            <p:cond delay="0"/>
+                                          </p:stCondLst>
+                                        </p:cTn>
+                                        <p:tgtEl>
+                                          <p:spTgt spid="28"/>
+                                        </p:tgtEl>
+                                        <p:attrNameLst>
+                                          <p:attrName>style.visibility</p:attrName>
+                                        </p:attrNameLst>
+                                      </p:cBhvr>
+                                      <p:to>
+                                        <p:strVal val="visible"/>
+                                      </p:to>
+                                    </p:set>
+                                  </p:childTnLst>
+                                </p:cTn>
+                              </p:par>
+                              <p:par>
+                                <p:cTn id="31" presetID="1" presetClass="entr" presetSubtype="0" fill="hold" grpId="0" nodeType="withEffect">
+                                  <p:stCondLst>
+                                    <p:cond delay="0"/>
+                                  </p:stCondLst>
+                                  <p:childTnLst>
+                                    <p:set>
+                                      <p:cBhvr>
+                                        <p:cTn id="32" dur="1" fill="hold">
+                                          <p:stCondLst>
+                                            <p:cond delay="0"/>
+                                          </p:stCondLst>
+                                        </p:cTn>
+                                        <p:tgtEl>
+                                          <p:spTgt spid="27"/>
+                                        </p:tgtEl>
+                                        <p:attrNameLst>
+                                          <p:attrName>style.visibility</p:attrName>
+                                        </p:attrNameLst>
+                                      </p:cBhvr>
+                                      <p:to>
+                                        <p:strVal val="visible"/>
+                                      </p:to>
+                                    </p:set>
+                                  </p:childTnLst>
+                                </p:cTn>
+                              </p:par>
+                              <p:par>
+                                <p:cTn id="33" presetID="1" presetClass="entr" presetSubtype="0" fill="hold" grpId="0" nodeType="withEffect">
+                                  <p:stCondLst>
+                                    <p:cond delay="0"/>
+                                  </p:stCondLst>
+                                  <p:childTnLst>
+                                    <p:set>
+                                      <p:cBhvr>
+                                        <p:cTn id="34" dur="1" fill="hold">
+                                          <p:stCondLst>
+                                            <p:cond delay="0"/>
+                                          </p:stCondLst>
+                                        </p:cTn>
+                                        <p:tgtEl>
+                                          <p:spTgt spid="29"/>
+                                        </p:tgtEl>
+                                        <p:attrNameLst>
+                                          <p:attrName>style.visibility</p:attrName>
+                                        </p:attrNameLst>
+                                      </p:cBhvr>
+                                      <p:to>
+                                        <p:strVal val="visible"/>
+                                      </p:to>
+                                    </p:set>
+                                  </p:childTnLst>
+                                </p:cTn>
+                              </p:par>
+                            </p:childTnLst>
+                          </p:cTn>
+                        </p:par>
+                      </p:childTnLst>
+                    </p:cTn>
+                  </p:par>
+                  <p:par>
+                    <p:cTn id="35" fill="hold">
+                      <p:stCondLst>
+                        <p:cond delay="indefinite"/>
+                      </p:stCondLst>
+                      <p:childTnLst>
+                        <p:par>
+                          <p:cTn id="36" fill="hold">
+                            <p:stCondLst>
+                              <p:cond delay="0"/>
+                            </p:stCondLst>
+                            <p:childTnLst>
+                              <p:par>
+                                <p:cTn id="37" presetID="1" presetClass="entr" presetSubtype="0" fill="hold" nodeType="clickEffect">
+                                  <p:stCondLst>
+                                    <p:cond delay="0"/>
+                                  </p:stCondLst>
+                                  <p:childTnLst>
+                                    <p:set>
+                                      <p:cBhvr>
+                                        <p:cTn id="38" dur="1" fill="hold">
+                                          <p:stCondLst>
+                                            <p:cond delay="0"/>
+                                          </p:stCondLst>
+                                        </p:cTn>
+                                        <p:tgtEl>
+                                          <p:spTgt spid="3">
+                                            <p:txEl>
+                                              <p:pRg st="3" end="3"/>
+                                            </p:txEl>
+                                          </p:spTgt>
+                                        </p:tgtEl>
+                                        <p:attrNameLst>
+                                          <p:attrName>style.visibility</p:attrName>
+                                        </p:attrNameLst>
+                                      </p:cBhvr>
+                                      <p:to>
+                                        <p:strVal val="visible"/>
+                                      </p:to>
+                                    </p:set>
+                                  </p:childTnLst>
+                                </p:cTn>
+                              </p:par>
+                            </p:childTnLst>
+                          </p:cTn>
+                        </p:par>
+                      </p:childTnLst>
+                    </p:cTn>
+                  </p:par>
+                  <p:par>
+                    <p:cTn id="39" fill="hold">
+                      <p:stCondLst>
+                        <p:cond delay="indefinite"/>
+                      </p:stCondLst>
+                      <p:childTnLst>
+                        <p:par>
+                          <p:cTn id="40" fill="hold">
+                            <p:stCondLst>
+                              <p:cond delay="0"/>
+                            </p:stCondLst>
+                            <p:childTnLst>
+                              <p:par>
+                                <p:cTn id="41" presetID="1" presetClass="entr" presetSubtype="0" fill="hold" nodeType="clickEffect">
+                                  <p:stCondLst>
+                                    <p:cond delay="0"/>
+                                  </p:stCondLst>
+                                  <p:childTnLst>
+                                    <p:set>
+                                      <p:cBhvr>
+                                        <p:cTn id="42" dur="1" fill="hold">
+                                          <p:stCondLst>
+                                            <p:cond delay="0"/>
+                                          </p:stCondLst>
+                                        </p:cTn>
+                                        <p:tgtEl>
+                                          <p:spTgt spid="3">
+                                            <p:txEl>
+                                              <p:pRg st="4" end="4"/>
+                                            </p:txEl>
+                                          </p:spTgt>
+                                        </p:tgtEl>
+                                        <p:attrNameLst>
+                                          <p:attrName>style.visibility</p:attrName>
+                                        </p:attrNameLst>
+                                      </p:cBhvr>
+                                      <p:to>
+                                        <p:strVal val="visible"/>
+                                      </p:to>
+                                    </p:set>
+                                  </p:childTnLst>
+                                </p:cTn>
+                              </p:par>
+                            </p:childTnLst>
+                          </p:cTn>
+                        </p:par>
+                      </p:childTnLst>
+                    </p:cTn>
+                  </p:par>
+                  <p:par>
+                    <p:cTn id="43" fill="hold">
+                      <p:stCondLst>
+                        <p:cond delay="indefinite"/>
+                      </p:stCondLst>
+                      <p:childTnLst>
+                        <p:par>
+                          <p:cTn id="44" fill="hold">
+                            <p:stCondLst>
+                              <p:cond delay="0"/>
+                            </p:stCondLst>
+                            <p:childTnLst>
+                              <p:par>
+                                <p:cTn id="45" presetID="1" presetClass="entr" presetSubtype="0" fill="hold" grpId="0" nodeType="clickEffect">
+                                  <p:stCondLst>
+                                    <p:cond delay="0"/>
+                                  </p:stCondLst>
+                                  <p:childTnLst>
+                                    <p:set>
+                                      <p:cBhvr>
+                                        <p:cTn id="46" dur="1" fill="hold">
+                                          <p:stCondLst>
+                                            <p:cond delay="0"/>
+                                          </p:stCondLst>
+                                        </p:cTn>
+                                        <p:tgtEl>
+                                          <p:spTgt spid="32"/>
+                                        </p:tgtEl>
+                                        <p:attrNameLst>
+                                          <p:attrName>style.visibility</p:attrName>
+                                        </p:attrNameLst>
+                                      </p:cBhvr>
+                                      <p:to>
+                                        <p:strVal val="visible"/>
+                                      </p:to>
+                                    </p:set>
+                                  </p:childTnLst>
+                                </p:cTn>
+                              </p:par>
+                            </p:childTnLst>
+                          </p:cTn>
+                        </p:par>
+                      </p:childTnLst>
+                    </p:cTn>
+                  </p:par>
+                  <p:par>
+                    <p:cTn id="47" fill="hold">
+                      <p:stCondLst>
+                        <p:cond delay="indefinite"/>
+                      </p:stCondLst>
+                      <p:childTnLst>
+                        <p:par>
+                          <p:cTn id="48" fill="hold">
+                            <p:stCondLst>
+                              <p:cond delay="0"/>
+                            </p:stCondLst>
+                            <p:childTnLst>
+                              <p:par>
+                                <p:cTn id="49" presetID="1" presetClass="entr" presetSubtype="0" fill="hold" nodeType="clickEffect">
+                                  <p:stCondLst>
+                                    <p:cond delay="0"/>
+                                  </p:stCondLst>
+                                  <p:childTnLst>
+                                    <p:set>
+                                      <p:cBhvr>
+                                        <p:cTn id="50" dur="1" fill="hold">
+                                          <p:stCondLst>
+                                            <p:cond delay="0"/>
+                                          </p:stCondLst>
+                                        </p:cTn>
+                                        <p:tgtEl>
+                                          <p:spTgt spid="3">
+                                            <p:txEl>
+                                              <p:pRg st="5" end="5"/>
+                                            </p:txEl>
+                                          </p:spTgt>
+                                        </p:tgtEl>
+                                        <p:attrNameLst>
+                                          <p:attrName>style.visibility</p:attrName>
+                                        </p:attrNameLst>
+                                      </p:cBhvr>
+                                      <p:to>
+                                        <p:strVal val="visible"/>
+                                      </p:to>
+                                    </p:set>
+                                  </p:childTnLst>
+                                </p:cTn>
+                              </p:par>
+                            </p:childTnLst>
+                          </p:cTn>
+                        </p:par>
+                      </p:childTnLst>
+                    </p:cTn>
+                  </p:par>
+                  <p:par>
+                    <p:cTn id="51" fill="hold">
+                      <p:stCondLst>
+                        <p:cond delay="indefinite"/>
+                      </p:stCondLst>
+                      <p:childTnLst>
+                        <p:par>
+                          <p:cTn id="52" fill="hold">
+                            <p:stCondLst>
+                              <p:cond delay="0"/>
+                            </p:stCondLst>
+                            <p:childTnLst>
+                              <p:par>
+                                <p:cTn id="53" presetID="1" presetClass="entr" presetSubtype="0" fill="hold" grpId="0" nodeType="clickEffect">
+                                  <p:stCondLst>
+                                    <p:cond delay="0"/>
+                                  </p:stCondLst>
+                                  <p:childTnLst>
+                                    <p:set>
+                                      <p:cBhvr>
+                                        <p:cTn id="54" dur="1" fill="hold">
+                                          <p:stCondLst>
+                                            <p:cond delay="0"/>
+                                          </p:stCondLst>
+                                        </p:cTn>
+                                        <p:tgtEl>
+                                          <p:spTgt spid="33"/>
+                                        </p:tgtEl>
+                                        <p:attrNameLst>
+                                          <p:attrName>style.visibility</p:attrName>
+                                        </p:attrNameLst>
+                                      </p:cBhvr>
+                                      <p:to>
+                                        <p:strVal val="visible"/>
+                                      </p:to>
+                                    </p:set>
+                                  </p:childTnLst>
+                                </p:cTn>
+                              </p:par>
+                            </p:childTnLst>
+                          </p:cTn>
+                        </p:par>
+                      </p:childTnLst>
+                    </p:cTn>
+                  </p:par>
+                  <p:par>
+                    <p:cTn id="55" fill="hold">
+                      <p:stCondLst>
+                        <p:cond delay="indefinite"/>
+                      </p:stCondLst>
+                      <p:childTnLst>
+                        <p:par>
+                          <p:cTn id="56" fill="hold">
+                            <p:stCondLst>
+                              <p:cond delay="0"/>
+                            </p:stCondLst>
+                            <p:childTnLst>
+                              <p:par>
+                                <p:cTn id="57" presetID="1" presetClass="entr" presetSubtype="0" fill="hold" grpId="0" nodeType="clickEffect">
+                                  <p:stCondLst>
+                                    <p:cond delay="0"/>
+                                  </p:stCondLst>
+                                  <p:childTnLst>
+                                    <p:set>
+                                      <p:cBhvr>
+                                        <p:cTn id="58" dur="1" fill="hold">
+                                          <p:stCondLst>
+                                            <p:cond delay="0"/>
+                                          </p:stCondLst>
+                                        </p:cTn>
+                                        <p:tgtEl>
+                                          <p:spTgt spid="34"/>
+                                        </p:tgtEl>
+                                        <p:attrNameLst>
+                                          <p:attrName>style.visibility</p:attrName>
+                                        </p:attrNameLst>
+                                      </p:cBhvr>
+                                      <p:to>
+                                        <p:strVal val="visible"/>
+                                      </p:to>
+                                    </p:set>
+                                  </p:childTnLst>
+                                </p:cTn>
+                              </p:par>
+                            </p:childTnLst>
+                          </p:cTn>
+                        </p:par>
+                      </p:childTnLst>
+                    </p:cTn>
+                  </p:par>
+                  <p:par>
+                    <p:cTn id="59" fill="hold">
+                      <p:stCondLst>
+                        <p:cond delay="indefinite"/>
+                      </p:stCondLst>
+                      <p:childTnLst>
+                        <p:par>
+                          <p:cTn id="60" fill="hold">
+                            <p:stCondLst>
+                              <p:cond delay="0"/>
+                            </p:stCondLst>
+                            <p:childTnLst>
+                              <p:par>
+                                <p:cTn id="61" presetID="1" presetClass="entr" presetSubtype="0" fill="hold" grpId="0" nodeType="clickEffect">
+                                  <p:stCondLst>
+                                    <p:cond delay="0"/>
+                                  </p:stCondLst>
+                                  <p:childTnLst>
+                                    <p:set>
+                                      <p:cBhvr>
+                                        <p:cTn id="62" dur="1" fill="hold">
+                                          <p:stCondLst>
+                                            <p:cond delay="0"/>
+                                          </p:stCondLst>
+                                        </p:cTn>
+                                        <p:tgtEl>
+                                          <p:spTgt spid="35"/>
+                                        </p:tgtEl>
+                                        <p:attrNameLst>
+                                          <p:attrName>style.visibility</p:attrName>
+                                        </p:attrNameLst>
+                                      </p:cBhvr>
+                                      <p:to>
+                                        <p:strVal val="visible"/>
+                                      </p:to>
+                                    </p:set>
+                                  </p:childTnLst>
+                                </p:cTn>
+                              </p:par>
+                            </p:childTnLst>
+                          </p:cTn>
+                        </p:par>
+                      </p:childTnLst>
+                    </p:cTn>
+                  </p:par>
+                  <p:par>
+                    <p:cTn id="63" fill="hold">
+                      <p:stCondLst>
+                        <p:cond delay="indefinite"/>
+                      </p:stCondLst>
+                      <p:childTnLst>
+                        <p:par>
+                          <p:cTn id="64" fill="hold">
+                            <p:stCondLst>
+                              <p:cond delay="0"/>
+                            </p:stCondLst>
+                            <p:childTnLst>
+                              <p:par>
+                                <p:cTn id="65" presetID="1" presetClass="entr" presetSubtype="0" fill="hold" grpId="0" nodeType="clickEffect">
+                                  <p:stCondLst>
+                                    <p:cond delay="0"/>
+                                  </p:stCondLst>
+                                  <p:childTnLst>
+                                    <p:set>
+                                      <p:cBhvr>
+                                        <p:cTn id="66" dur="1" fill="hold">
+                                          <p:stCondLst>
+                                            <p:cond delay="0"/>
+                                          </p:stCondLst>
+                                        </p:cTn>
+                                        <p:tgtEl>
+                                          <p:spTgt spid="36"/>
+                                        </p:tgtEl>
+                                        <p:attrNameLst>
+                                          <p:attrName>style.visibility</p:attrName>
+                                        </p:attrNameLst>
+                                      </p:cBhvr>
+                                      <p:to>
+                                        <p:strVal val="visible"/>
+                                      </p:to>
+                                    </p:set>
+                                  </p:childTnLst>
+                                </p:cTn>
+                              </p:par>
+                            </p:childTnLst>
+                          </p:cTn>
+                        </p:par>
+                      </p:childTnLst>
+                    </p:cTn>
+                  </p:par>
+                </p:childTnLst>
+              </p:cTn>
+              <p:prevCondLst>
+                <p:cond evt="onPrev" delay="0">
+                  <p:tgtEl>
+                    <p:sldTgt/>
+                  </p:tgtEl>
+                </p:cond>
+              </p:prevCondLst>
+              <p:nextCondLst>
+                <p:cond evt="onNext" delay="0">
+                  <p:tgtEl>
+                    <p:sldTgt/>
+                  </p:tgtEl>
+                </p:cond>
+              </p:nextCondLst>
+            </p:seq>
+          </p:childTnLst>
+        </p:cTn>
+      </p:par>
+    </p:tnLst>
+    <p:bldLst>
+      <p:bldP spid="21" grpId="0"/>
+      <p:bldP spid="22" grpId="0"/>
+      <p:bldP spid="23" grpId="0"/>
+      <p:bldP spid="24" grpId="0"/>
+      <p:bldP spid="25" grpId="0"/>
+      <p:bldP spid="26" grpId="0"/>
+      <p:bldP spid="27" grpId="0"/>
+      <p:bldP spid="28" grpId="0"/>
+      <p:bldP spid="29" grpId="0"/>
+      <p:bldP spid="30" grpId="0"/>
+      <p:bldP spid="32" grpId="0" animBg="1"/>
+      <p:bldP spid="33" grpId="0" animBg="1"/>
+      <p:bldP spid="34" grpId="0" animBg="1"/>
+      <p:bldP spid="35" grpId="0" animBg="1"/>
+      <p:bldP spid="36" grpId="0" animBg="1"/>
+    </p:bldLst>
+  </p:timing>
 </p:sld>
 </file>
 
@@ -3697,7 +5406,7 @@
           <a:p>
             <a:r>
               <a:rPr lang="en-US" dirty="0"/>
-              <a:t>COMPARAISON DES DEUX ALGORITHMES</a:t>
+              <a:t>WELSH &amp; POWELL</a:t>
             </a:r>
             <a:endParaRPr lang="fr-FR" dirty="0"/>
           </a:p>
@@ -3718,150 +5427,16 @@
           <a:bodyPr/>
           <a:lstStyle/>
           <a:p>
-            <a:r>
-              <a:rPr lang="en-US" dirty="0"/>
-              <a:t>Welsh &amp; Powell</a:t>
-            </a:r>
-          </a:p>
-          <a:p>
-            <a:pPr lvl="1"/>
-            <a:r>
-              <a:rPr lang="en-US" dirty="0"/>
-              <a:t>Temps de </a:t>
-            </a:r>
-            <a:r>
-              <a:rPr lang="en-US" dirty="0" err="1"/>
-              <a:t>calcul</a:t>
-            </a:r>
-            <a:r>
-              <a:rPr lang="en-US" dirty="0"/>
-              <a:t> court</a:t>
-            </a:r>
-          </a:p>
-          <a:p>
-            <a:pPr lvl="1"/>
-            <a:r>
-              <a:rPr lang="en-US" dirty="0" err="1"/>
-              <a:t>Nombre</a:t>
-            </a:r>
-            <a:r>
-              <a:rPr lang="en-US" dirty="0"/>
-              <a:t> de </a:t>
-            </a:r>
-            <a:r>
-              <a:rPr lang="en-US" dirty="0" err="1"/>
-              <a:t>couleurs</a:t>
-            </a:r>
-            <a:r>
-              <a:rPr lang="en-US" dirty="0"/>
-              <a:t> </a:t>
-            </a:r>
-            <a:r>
-              <a:rPr lang="en-US" dirty="0" err="1"/>
-              <a:t>proche</a:t>
-            </a:r>
-            <a:r>
-              <a:rPr lang="en-US" dirty="0"/>
-              <a:t> du </a:t>
-            </a:r>
-            <a:r>
-              <a:rPr lang="en-US" dirty="0" err="1"/>
-              <a:t>nombre</a:t>
-            </a:r>
-            <a:r>
-              <a:rPr lang="en-US" dirty="0"/>
-              <a:t> </a:t>
-            </a:r>
-            <a:r>
-              <a:rPr lang="en-US" dirty="0" err="1"/>
-              <a:t>chromatique</a:t>
-            </a:r>
-            <a:endParaRPr lang="en-US" dirty="0"/>
-          </a:p>
-          <a:p>
-            <a:r>
-              <a:rPr lang="en-US" dirty="0" err="1"/>
-              <a:t>Recuit</a:t>
-            </a:r>
-            <a:r>
-              <a:rPr lang="en-US" dirty="0"/>
-              <a:t> </a:t>
-            </a:r>
-            <a:r>
-              <a:rPr lang="en-US" dirty="0" err="1"/>
-              <a:t>simulé</a:t>
-            </a:r>
-            <a:endParaRPr lang="en-US" dirty="0"/>
-          </a:p>
-          <a:p>
-            <a:pPr lvl="1"/>
-            <a:r>
-              <a:rPr lang="en-US" dirty="0"/>
-              <a:t>Temps de </a:t>
-            </a:r>
-            <a:r>
-              <a:rPr lang="en-US" dirty="0" err="1"/>
-              <a:t>calcul</a:t>
-            </a:r>
-            <a:r>
-              <a:rPr lang="en-US" dirty="0"/>
-              <a:t> variable</a:t>
-            </a:r>
-          </a:p>
-          <a:p>
-            <a:pPr lvl="1"/>
-            <a:r>
-              <a:rPr lang="en-US" dirty="0" err="1"/>
-              <a:t>Nombre</a:t>
-            </a:r>
-            <a:r>
-              <a:rPr lang="en-US" dirty="0"/>
-              <a:t> de </a:t>
-            </a:r>
-            <a:r>
-              <a:rPr lang="en-US" dirty="0" err="1"/>
-              <a:t>couleurs</a:t>
-            </a:r>
-            <a:r>
-              <a:rPr lang="en-US" dirty="0"/>
-              <a:t> </a:t>
-            </a:r>
-            <a:r>
-              <a:rPr lang="en-US" dirty="0" err="1"/>
-              <a:t>parfois</a:t>
-            </a:r>
-            <a:r>
-              <a:rPr lang="en-US" dirty="0"/>
-              <a:t> </a:t>
-            </a:r>
-            <a:r>
-              <a:rPr lang="en-US" dirty="0" err="1"/>
-              <a:t>éloigné</a:t>
-            </a:r>
-            <a:r>
-              <a:rPr lang="en-US" dirty="0"/>
-              <a:t> du </a:t>
-            </a:r>
-            <a:r>
-              <a:rPr lang="en-US" dirty="0" err="1"/>
-              <a:t>nombre</a:t>
-            </a:r>
-            <a:r>
-              <a:rPr lang="en-US" dirty="0"/>
-              <a:t> </a:t>
-            </a:r>
-            <a:r>
-              <a:rPr lang="en-US" dirty="0" err="1"/>
-              <a:t>chromatique</a:t>
-            </a:r>
-            <a:endParaRPr lang="en-US" dirty="0"/>
-          </a:p>
-          <a:p>
-            <a:pPr lvl="1"/>
-            <a:r>
-              <a:rPr lang="fr-FR" dirty="0"/>
-              <a:t>Beaucoup de paramètres à régler</a:t>
-            </a:r>
+            <a:pPr marL="0" indent="0">
+              <a:buNone/>
+            </a:pPr>
+            <a:endParaRPr lang="fr-FR" dirty="0"/>
+          </a:p>
+          <a:p>
+            <a:pPr marL="0" indent="0">
+              <a:buNone/>
+            </a:pPr>
+            <a:endParaRPr lang="fr-FR" dirty="0"/>
           </a:p>
         </p:txBody>
       </p:sp>
@@ -3889,10 +5464,636 @@
           </a:p>
         </p:txBody>
       </p:sp>
+      <p:sp>
+        <p:nvSpPr>
+          <p:cNvPr id="5" name="Espace réservé du contenu 2"/>
+          <p:cNvSpPr txBox="1">
+            <a:spLocks/>
+          </p:cNvSpPr>
+          <p:nvPr/>
+        </p:nvSpPr>
+        <p:spPr>
+          <a:xfrm>
+            <a:off x="990600" y="1978025"/>
+            <a:ext cx="10515600" cy="4351338"/>
+          </a:xfrm>
+          <a:prstGeom prst="rect">
+            <a:avLst/>
+          </a:prstGeom>
+        </p:spPr>
+        <p:txBody>
+          <a:bodyPr vert="horz" lIns="91440" tIns="45720" rIns="91440" bIns="45720" rtlCol="0">
+            <a:normAutofit/>
+          </a:bodyPr>
+          <a:lstStyle>
+            <a:lvl1pPr marL="228600" indent="-228600" algn="l" defTabSz="914400" rtl="0" eaLnBrk="1" latinLnBrk="0" hangingPunct="1">
+              <a:lnSpc>
+                <a:spcPct val="90%"/>
+              </a:lnSpc>
+              <a:spcBef>
+                <a:spcPts val="1000"/>
+              </a:spcBef>
+              <a:buFont typeface="Arial" panose="020B0604020202020204" pitchFamily="34" charset="0"/>
+              <a:buChar char="•"/>
+              <a:defRPr sz="2800" kern="1200">
+                <a:solidFill>
+                  <a:schemeClr val="tx1"/>
+                </a:solidFill>
+                <a:latin typeface="+mn-lt"/>
+                <a:ea typeface="+mn-ea"/>
+                <a:cs typeface="+mn-cs"/>
+              </a:defRPr>
+            </a:lvl1pPr>
+            <a:lvl2pPr marL="685800" indent="-228600" algn="l" defTabSz="914400" rtl="0" eaLnBrk="1" latinLnBrk="0" hangingPunct="1">
+              <a:lnSpc>
+                <a:spcPct val="90%"/>
+              </a:lnSpc>
+              <a:spcBef>
+                <a:spcPts val="500"/>
+              </a:spcBef>
+              <a:buFont typeface="Arial" panose="020B0604020202020204" pitchFamily="34" charset="0"/>
+              <a:buChar char="•"/>
+              <a:defRPr sz="2400" kern="1200">
+                <a:solidFill>
+                  <a:schemeClr val="tx1"/>
+                </a:solidFill>
+                <a:latin typeface="+mn-lt"/>
+                <a:ea typeface="+mn-ea"/>
+                <a:cs typeface="+mn-cs"/>
+              </a:defRPr>
+            </a:lvl2pPr>
+            <a:lvl3pPr marL="1143000" indent="-228600" algn="l" defTabSz="914400" rtl="0" eaLnBrk="1" latinLnBrk="0" hangingPunct="1">
+              <a:lnSpc>
+                <a:spcPct val="90%"/>
+              </a:lnSpc>
+              <a:spcBef>
+                <a:spcPts val="500"/>
+              </a:spcBef>
+              <a:buFont typeface="Arial" panose="020B0604020202020204" pitchFamily="34" charset="0"/>
+              <a:buChar char="•"/>
+              <a:defRPr sz="2000" kern="1200">
+                <a:solidFill>
+                  <a:schemeClr val="tx1"/>
+                </a:solidFill>
+                <a:latin typeface="+mn-lt"/>
+                <a:ea typeface="+mn-ea"/>
+                <a:cs typeface="+mn-cs"/>
+              </a:defRPr>
+            </a:lvl3pPr>
+            <a:lvl4pPr marL="1600200" indent="-228600" algn="l" defTabSz="914400" rtl="0" eaLnBrk="1" latinLnBrk="0" hangingPunct="1">
+              <a:lnSpc>
+                <a:spcPct val="90%"/>
+              </a:lnSpc>
+              <a:spcBef>
+                <a:spcPts val="500"/>
+              </a:spcBef>
+              <a:buFont typeface="Arial" panose="020B0604020202020204" pitchFamily="34" charset="0"/>
+              <a:buChar char="•"/>
+              <a:defRPr sz="1800" kern="1200">
+                <a:solidFill>
+                  <a:schemeClr val="tx1"/>
+                </a:solidFill>
+                <a:latin typeface="+mn-lt"/>
+                <a:ea typeface="+mn-ea"/>
+                <a:cs typeface="+mn-cs"/>
+              </a:defRPr>
+            </a:lvl4pPr>
+            <a:lvl5pPr marL="2057400" indent="-228600" algn="l" defTabSz="914400" rtl="0" eaLnBrk="1" latinLnBrk="0" hangingPunct="1">
+              <a:lnSpc>
+                <a:spcPct val="90%"/>
+              </a:lnSpc>
+              <a:spcBef>
+                <a:spcPts val="500"/>
+              </a:spcBef>
+              <a:buFont typeface="Arial" panose="020B0604020202020204" pitchFamily="34" charset="0"/>
+              <a:buChar char="•"/>
+              <a:defRPr sz="1800" kern="1200">
+                <a:solidFill>
+                  <a:schemeClr val="tx1"/>
+                </a:solidFill>
+                <a:latin typeface="+mn-lt"/>
+                <a:ea typeface="+mn-ea"/>
+                <a:cs typeface="+mn-cs"/>
+              </a:defRPr>
+            </a:lvl5pPr>
+            <a:lvl6pPr marL="2514600" indent="-228600" algn="l" defTabSz="914400" rtl="0" eaLnBrk="1" latinLnBrk="0" hangingPunct="1">
+              <a:lnSpc>
+                <a:spcPct val="90%"/>
+              </a:lnSpc>
+              <a:spcBef>
+                <a:spcPts val="500"/>
+              </a:spcBef>
+              <a:buFont typeface="Arial" panose="020B0604020202020204" pitchFamily="34" charset="0"/>
+              <a:buChar char="•"/>
+              <a:defRPr sz="1800" kern="1200">
+                <a:solidFill>
+                  <a:schemeClr val="tx1"/>
+                </a:solidFill>
+                <a:latin typeface="+mn-lt"/>
+                <a:ea typeface="+mn-ea"/>
+                <a:cs typeface="+mn-cs"/>
+              </a:defRPr>
+            </a:lvl6pPr>
+            <a:lvl7pPr marL="2971800" indent="-228600" algn="l" defTabSz="914400" rtl="0" eaLnBrk="1" latinLnBrk="0" hangingPunct="1">
+              <a:lnSpc>
+                <a:spcPct val="90%"/>
+              </a:lnSpc>
+              <a:spcBef>
+                <a:spcPts val="500"/>
+              </a:spcBef>
+              <a:buFont typeface="Arial" panose="020B0604020202020204" pitchFamily="34" charset="0"/>
+              <a:buChar char="•"/>
+              <a:defRPr sz="1800" kern="1200">
+                <a:solidFill>
+                  <a:schemeClr val="tx1"/>
+                </a:solidFill>
+                <a:latin typeface="+mn-lt"/>
+                <a:ea typeface="+mn-ea"/>
+                <a:cs typeface="+mn-cs"/>
+              </a:defRPr>
+            </a:lvl7pPr>
+            <a:lvl8pPr marL="3429000" indent="-228600" algn="l" defTabSz="914400" rtl="0" eaLnBrk="1" latinLnBrk="0" hangingPunct="1">
+              <a:lnSpc>
+                <a:spcPct val="90%"/>
+              </a:lnSpc>
+              <a:spcBef>
+                <a:spcPts val="500"/>
+              </a:spcBef>
+              <a:buFont typeface="Arial" panose="020B0604020202020204" pitchFamily="34" charset="0"/>
+              <a:buChar char="•"/>
+              <a:defRPr sz="1800" kern="1200">
+                <a:solidFill>
+                  <a:schemeClr val="tx1"/>
+                </a:solidFill>
+                <a:latin typeface="+mn-lt"/>
+                <a:ea typeface="+mn-ea"/>
+                <a:cs typeface="+mn-cs"/>
+              </a:defRPr>
+            </a:lvl8pPr>
+            <a:lvl9pPr marL="3886200" indent="-228600" algn="l" defTabSz="914400" rtl="0" eaLnBrk="1" latinLnBrk="0" hangingPunct="1">
+              <a:lnSpc>
+                <a:spcPct val="90%"/>
+              </a:lnSpc>
+              <a:spcBef>
+                <a:spcPts val="500"/>
+              </a:spcBef>
+              <a:buFont typeface="Arial" panose="020B0604020202020204" pitchFamily="34" charset="0"/>
+              <a:buChar char="•"/>
+              <a:defRPr sz="1800" kern="1200">
+                <a:solidFill>
+                  <a:schemeClr val="tx1"/>
+                </a:solidFill>
+                <a:latin typeface="+mn-lt"/>
+                <a:ea typeface="+mn-ea"/>
+                <a:cs typeface="+mn-cs"/>
+              </a:defRPr>
+            </a:lvl9pPr>
+          </a:lstStyle>
+          <a:p>
+            <a:pPr marL="0" indent="0">
+              <a:buFont typeface="Arial" panose="020B0604020202020204" pitchFamily="34" charset="0"/>
+              <a:buNone/>
+            </a:pPr>
+            <a:r>
+              <a:rPr lang="fr-FR" dirty="0"/>
+              <a:t>Cas où </a:t>
+            </a:r>
+            <a:r>
+              <a:rPr lang="fr-FR" dirty="0" err="1"/>
+              <a:t>Welsh</a:t>
+            </a:r>
+            <a:r>
+              <a:rPr lang="fr-FR" dirty="0"/>
+              <a:t> &amp; Powell n’est pas efficace:</a:t>
+            </a:r>
+          </a:p>
+          <a:p>
+            <a:pPr marL="0" indent="0">
+              <a:buFont typeface="Arial" panose="020B0604020202020204" pitchFamily="34" charset="0"/>
+              <a:buNone/>
+            </a:pPr>
+            <a:r>
+              <a:rPr lang="fr-FR" dirty="0"/>
+              <a:t>	Les graphes en couronnes</a:t>
+            </a:r>
+          </a:p>
+        </p:txBody>
+      </p:sp>
+      <p:pic>
+        <p:nvPicPr>
+          <p:cNvPr id="1026" name="Picture 2" descr="Image illustrative de l'article Graphe couronne"/>
+          <p:cNvPicPr>
+            <a:picLocks noChangeAspect="1" noChangeArrowheads="1"/>
+          </p:cNvPicPr>
+          <p:nvPr/>
+        </p:nvPicPr>
+        <p:blipFill rotWithShape="1">
+          <a:blip r:embed="rId2">
+            <a:extLst>
+              <a:ext uri="{28A0092B-C50C-407E-A947-70E740481C1C}">
+                <a14:useLocalDpi xmlns:a14="http://schemas.microsoft.com/office/drawing/2010/main" val="0"/>
+              </a:ext>
+            </a:extLst>
+          </a:blip>
+          <a:srcRect r="70.002%"/>
+          <a:stretch/>
+        </p:blipFill>
+        <p:spPr bwMode="auto">
+          <a:xfrm>
+            <a:off x="1252857" y="3547336"/>
+            <a:ext cx="2317280" cy="2133601"/>
+          </a:xfrm>
+          <a:prstGeom prst="rect">
+            <a:avLst/>
+          </a:prstGeom>
+          <a:noFill/>
+          <a:extLst>
+            <a:ext uri="{909E8E84-426E-40DD-AFC4-6F175D3DCCD1}">
+              <a14:hiddenFill xmlns:a14="http://schemas.microsoft.com/office/drawing/2010/main">
+                <a:solidFill>
+                  <a:srgbClr val="FFFFFF"/>
+                </a:solidFill>
+              </a14:hiddenFill>
+            </a:ext>
+          </a:extLst>
+        </p:spPr>
+      </p:pic>
+      <p:pic>
+        <p:nvPicPr>
+          <p:cNvPr id="6" name="Image 5"/>
+          <p:cNvPicPr>
+            <a:picLocks noChangeAspect="1"/>
+          </p:cNvPicPr>
+          <p:nvPr/>
+        </p:nvPicPr>
+        <p:blipFill>
+          <a:blip r:embed="rId3"/>
+          <a:stretch>
+            <a:fillRect/>
+          </a:stretch>
+        </p:blipFill>
+        <p:spPr>
+          <a:xfrm>
+            <a:off x="6635114" y="3547336"/>
+            <a:ext cx="2316481" cy="2133601"/>
+          </a:xfrm>
+          <a:prstGeom prst="rect">
+            <a:avLst/>
+          </a:prstGeom>
+        </p:spPr>
+      </p:pic>
+      <p:sp>
+        <p:nvSpPr>
+          <p:cNvPr id="8" name="ZoneTexte 7"/>
+          <p:cNvSpPr txBox="1"/>
+          <p:nvPr/>
+        </p:nvSpPr>
+        <p:spPr>
+          <a:xfrm>
+            <a:off x="1709530" y="3291840"/>
+            <a:ext cx="301686" cy="369332"/>
+          </a:xfrm>
+          <a:prstGeom prst="rect">
+            <a:avLst/>
+          </a:prstGeom>
+          <a:noFill/>
+        </p:spPr>
+        <p:txBody>
+          <a:bodyPr wrap="none" rtlCol="0">
+            <a:spAutoFit/>
+          </a:bodyPr>
+          <a:lstStyle/>
+          <a:p>
+            <a:r>
+              <a:rPr lang="fr-FR" dirty="0"/>
+              <a:t>1</a:t>
+            </a:r>
+          </a:p>
+        </p:txBody>
+      </p:sp>
+      <p:sp>
+        <p:nvSpPr>
+          <p:cNvPr id="9" name="ZoneTexte 8"/>
+          <p:cNvSpPr txBox="1"/>
+          <p:nvPr/>
+        </p:nvSpPr>
+        <p:spPr>
+          <a:xfrm>
+            <a:off x="3395207" y="4244804"/>
+            <a:ext cx="45719" cy="369332"/>
+          </a:xfrm>
+          <a:prstGeom prst="rect">
+            <a:avLst/>
+          </a:prstGeom>
+          <a:noFill/>
+        </p:spPr>
+        <p:txBody>
+          <a:bodyPr wrap="square" rtlCol="0">
+            <a:spAutoFit/>
+          </a:bodyPr>
+          <a:lstStyle/>
+          <a:p>
+            <a:r>
+              <a:rPr lang="fr-FR" dirty="0"/>
+              <a:t>2</a:t>
+            </a:r>
+          </a:p>
+        </p:txBody>
+      </p:sp>
+      <p:sp>
+        <p:nvSpPr>
+          <p:cNvPr id="10" name="ZoneTexte 9"/>
+          <p:cNvSpPr txBox="1"/>
+          <p:nvPr/>
+        </p:nvSpPr>
+        <p:spPr>
+          <a:xfrm>
+            <a:off x="1637969" y="5414838"/>
+            <a:ext cx="45719" cy="369332"/>
+          </a:xfrm>
+          <a:prstGeom prst="rect">
+            <a:avLst/>
+          </a:prstGeom>
+          <a:noFill/>
+        </p:spPr>
+        <p:txBody>
+          <a:bodyPr wrap="square" rtlCol="0">
+            <a:spAutoFit/>
+          </a:bodyPr>
+          <a:lstStyle/>
+          <a:p>
+            <a:r>
+              <a:rPr lang="fr-FR" dirty="0"/>
+              <a:t>3</a:t>
+            </a:r>
+          </a:p>
+        </p:txBody>
+      </p:sp>
+      <p:sp>
+        <p:nvSpPr>
+          <p:cNvPr id="11" name="ZoneTexte 10"/>
+          <p:cNvSpPr txBox="1"/>
+          <p:nvPr/>
+        </p:nvSpPr>
+        <p:spPr>
+          <a:xfrm>
+            <a:off x="2934031" y="3400808"/>
+            <a:ext cx="45719" cy="369332"/>
+          </a:xfrm>
+          <a:prstGeom prst="rect">
+            <a:avLst/>
+          </a:prstGeom>
+          <a:noFill/>
+        </p:spPr>
+        <p:txBody>
+          <a:bodyPr wrap="square" rtlCol="0">
+            <a:spAutoFit/>
+          </a:bodyPr>
+          <a:lstStyle/>
+          <a:p>
+            <a:r>
+              <a:rPr lang="fr-FR" dirty="0"/>
+              <a:t>4</a:t>
+            </a:r>
+          </a:p>
+        </p:txBody>
+      </p:sp>
+      <p:sp>
+        <p:nvSpPr>
+          <p:cNvPr id="12" name="ZoneTexte 11"/>
+          <p:cNvSpPr txBox="1"/>
+          <p:nvPr/>
+        </p:nvSpPr>
+        <p:spPr>
+          <a:xfrm>
+            <a:off x="1108079" y="4244804"/>
+            <a:ext cx="45719" cy="369332"/>
+          </a:xfrm>
+          <a:prstGeom prst="rect">
+            <a:avLst/>
+          </a:prstGeom>
+          <a:noFill/>
+        </p:spPr>
+        <p:txBody>
+          <a:bodyPr wrap="square" rtlCol="0">
+            <a:spAutoFit/>
+          </a:bodyPr>
+          <a:lstStyle/>
+          <a:p>
+            <a:r>
+              <a:rPr lang="fr-FR" dirty="0"/>
+              <a:t>5</a:t>
+            </a:r>
+          </a:p>
+        </p:txBody>
+      </p:sp>
+      <p:sp>
+        <p:nvSpPr>
+          <p:cNvPr id="13" name="ZoneTexte 12"/>
+          <p:cNvSpPr txBox="1"/>
+          <p:nvPr/>
+        </p:nvSpPr>
+        <p:spPr>
+          <a:xfrm>
+            <a:off x="2979750" y="5478449"/>
+            <a:ext cx="45719" cy="369332"/>
+          </a:xfrm>
+          <a:prstGeom prst="rect">
+            <a:avLst/>
+          </a:prstGeom>
+          <a:noFill/>
+        </p:spPr>
+        <p:txBody>
+          <a:bodyPr wrap="square" rtlCol="0">
+            <a:spAutoFit/>
+          </a:bodyPr>
+          <a:lstStyle/>
+          <a:p>
+            <a:r>
+              <a:rPr lang="fr-FR" dirty="0"/>
+              <a:t>6</a:t>
+            </a:r>
+          </a:p>
+        </p:txBody>
+      </p:sp>
+      <p:sp>
+        <p:nvSpPr>
+          <p:cNvPr id="14" name="ZoneTexte 13"/>
+          <p:cNvSpPr txBox="1"/>
+          <p:nvPr/>
+        </p:nvSpPr>
+        <p:spPr>
+          <a:xfrm>
+            <a:off x="7084612" y="3335683"/>
+            <a:ext cx="301686" cy="369332"/>
+          </a:xfrm>
+          <a:prstGeom prst="rect">
+            <a:avLst/>
+          </a:prstGeom>
+          <a:noFill/>
+        </p:spPr>
+        <p:txBody>
+          <a:bodyPr wrap="none" rtlCol="0">
+            <a:spAutoFit/>
+          </a:bodyPr>
+          <a:lstStyle/>
+          <a:p>
+            <a:r>
+              <a:rPr lang="fr-FR" dirty="0"/>
+              <a:t>1</a:t>
+            </a:r>
+          </a:p>
+        </p:txBody>
+      </p:sp>
+      <p:sp>
+        <p:nvSpPr>
+          <p:cNvPr id="15" name="ZoneTexte 14"/>
+          <p:cNvSpPr txBox="1"/>
+          <p:nvPr/>
+        </p:nvSpPr>
+        <p:spPr>
+          <a:xfrm>
+            <a:off x="8364772" y="5408673"/>
+            <a:ext cx="45719" cy="369332"/>
+          </a:xfrm>
+          <a:prstGeom prst="rect">
+            <a:avLst/>
+          </a:prstGeom>
+          <a:noFill/>
+        </p:spPr>
+        <p:txBody>
+          <a:bodyPr wrap="square" rtlCol="0">
+            <a:spAutoFit/>
+          </a:bodyPr>
+          <a:lstStyle/>
+          <a:p>
+            <a:r>
+              <a:rPr lang="fr-FR" dirty="0"/>
+              <a:t>2</a:t>
+            </a:r>
+          </a:p>
+        </p:txBody>
+      </p:sp>
+      <p:sp>
+        <p:nvSpPr>
+          <p:cNvPr id="16" name="ZoneTexte 15"/>
+          <p:cNvSpPr txBox="1"/>
+          <p:nvPr/>
+        </p:nvSpPr>
+        <p:spPr>
+          <a:xfrm>
+            <a:off x="8317064" y="3400808"/>
+            <a:ext cx="47708" cy="369332"/>
+          </a:xfrm>
+          <a:prstGeom prst="rect">
+            <a:avLst/>
+          </a:prstGeom>
+          <a:noFill/>
+        </p:spPr>
+        <p:txBody>
+          <a:bodyPr wrap="square" rtlCol="0">
+            <a:spAutoFit/>
+          </a:bodyPr>
+          <a:lstStyle/>
+          <a:p>
+            <a:r>
+              <a:rPr lang="fr-FR" dirty="0"/>
+              <a:t>3</a:t>
+            </a:r>
+          </a:p>
+        </p:txBody>
+      </p:sp>
+      <p:sp>
+        <p:nvSpPr>
+          <p:cNvPr id="17" name="ZoneTexte 16"/>
+          <p:cNvSpPr txBox="1"/>
+          <p:nvPr/>
+        </p:nvSpPr>
+        <p:spPr>
+          <a:xfrm>
+            <a:off x="6472362" y="4244804"/>
+            <a:ext cx="45719" cy="369332"/>
+          </a:xfrm>
+          <a:prstGeom prst="rect">
+            <a:avLst/>
+          </a:prstGeom>
+          <a:noFill/>
+        </p:spPr>
+        <p:txBody>
+          <a:bodyPr wrap="square" rtlCol="0">
+            <a:spAutoFit/>
+          </a:bodyPr>
+          <a:lstStyle/>
+          <a:p>
+            <a:r>
+              <a:rPr lang="fr-FR" dirty="0"/>
+              <a:t>4</a:t>
+            </a:r>
+          </a:p>
+        </p:txBody>
+      </p:sp>
+      <p:sp>
+        <p:nvSpPr>
+          <p:cNvPr id="18" name="ZoneTexte 17"/>
+          <p:cNvSpPr txBox="1"/>
+          <p:nvPr/>
+        </p:nvSpPr>
+        <p:spPr>
+          <a:xfrm>
+            <a:off x="8873656" y="4357315"/>
+            <a:ext cx="45719" cy="369332"/>
+          </a:xfrm>
+          <a:prstGeom prst="rect">
+            <a:avLst/>
+          </a:prstGeom>
+          <a:noFill/>
+        </p:spPr>
+        <p:txBody>
+          <a:bodyPr wrap="square" rtlCol="0">
+            <a:spAutoFit/>
+          </a:bodyPr>
+          <a:lstStyle/>
+          <a:p>
+            <a:r>
+              <a:rPr lang="fr-FR" dirty="0"/>
+              <a:t>5</a:t>
+            </a:r>
+          </a:p>
+        </p:txBody>
+      </p:sp>
+      <p:sp>
+        <p:nvSpPr>
+          <p:cNvPr id="19" name="ZoneTexte 18"/>
+          <p:cNvSpPr txBox="1"/>
+          <p:nvPr/>
+        </p:nvSpPr>
+        <p:spPr>
+          <a:xfrm>
+            <a:off x="6949440" y="5362954"/>
+            <a:ext cx="45719" cy="369332"/>
+          </a:xfrm>
+          <a:prstGeom prst="rect">
+            <a:avLst/>
+          </a:prstGeom>
+          <a:noFill/>
+        </p:spPr>
+        <p:txBody>
+          <a:bodyPr wrap="square" rtlCol="0">
+            <a:spAutoFit/>
+          </a:bodyPr>
+          <a:lstStyle/>
+          <a:p>
+            <a:r>
+              <a:rPr lang="fr-FR" dirty="0"/>
+              <a:t>6</a:t>
+            </a:r>
+          </a:p>
+        </p:txBody>
+      </p:sp>
     </p:spTree>
     <p:extLst>
       <p:ext uri="{BB962C8B-B14F-4D97-AF65-F5344CB8AC3E}">
-        <p14:creationId xmlns:p14="http://schemas.microsoft.com/office/powerpoint/2010/main" val="390439127"/>
+        <p14:creationId xmlns:p14="http://schemas.microsoft.com/office/powerpoint/2010/main" val="575803159"/>
       </p:ext>
     </p:extLst>
   </p:cSld>
@@ -3936,43 +6137,177 @@
           <a:p>
             <a:r>
               <a:rPr lang="en-US" dirty="0"/>
-              <a:t>STRUCTURE DU PROGRAMME ET INTERFACE</a:t>
-            </a:r>
-          </a:p>
-        </p:txBody>
-      </p:sp>
-      <p:pic>
-        <p:nvPicPr>
-          <p:cNvPr id="6" name="Espace réservé du contenu 5"/>
-          <p:cNvPicPr>
-            <a:picLocks noGrp="1" noChangeAspect="1"/>
-          </p:cNvPicPr>
+              <a:t>COMPARAISON DES DEUX ALGORITHMES</a:t>
+            </a:r>
+            <a:endParaRPr lang="fr-FR" dirty="0"/>
+          </a:p>
+        </p:txBody>
+      </p:sp>
+      <p:sp>
+        <p:nvSpPr>
+          <p:cNvPr id="3" name="Espace réservé du contenu 2"/>
+          <p:cNvSpPr>
+            <a:spLocks noGrp="1"/>
+          </p:cNvSpPr>
           <p:nvPr>
             <p:ph idx="1"/>
           </p:nvPr>
-        </p:nvPicPr>
-        <p:blipFill>
-          <a:blip r:embed="rId2">
-            <a:extLst>
-              <a:ext uri="{28A0092B-C50C-407E-A947-70E740481C1C}">
-                <a14:useLocalDpi xmlns:a14="http://schemas.microsoft.com/office/drawing/2010/main" val="0"/>
-              </a:ext>
-            </a:extLst>
-          </a:blip>
-          <a:stretch>
-            <a:fillRect/>
-          </a:stretch>
-        </p:blipFill>
-        <p:spPr>
-          <a:xfrm>
-            <a:off x="1012874" y="1252251"/>
-            <a:ext cx="10170941" cy="5206235"/>
-          </a:xfrm>
-        </p:spPr>
-      </p:pic>
-      <p:sp>
-        <p:nvSpPr>
-          <p:cNvPr id="5" name="Espace réservé du numéro de diapositive 4"/>
+        </p:nvSpPr>
+        <p:spPr/>
+        <p:txBody>
+          <a:bodyPr/>
+          <a:lstStyle/>
+          <a:p>
+            <a:r>
+              <a:rPr lang="en-US" dirty="0"/>
+              <a:t>Welsh &amp; Powell</a:t>
+            </a:r>
+          </a:p>
+          <a:p>
+            <a:pPr lvl="1"/>
+            <a:r>
+              <a:rPr lang="en-US" dirty="0"/>
+              <a:t>Temps de </a:t>
+            </a:r>
+            <a:r>
+              <a:rPr lang="en-US" dirty="0" err="1"/>
+              <a:t>calcul</a:t>
+            </a:r>
+            <a:r>
+              <a:rPr lang="en-US" dirty="0"/>
+              <a:t> court</a:t>
+            </a:r>
+          </a:p>
+          <a:p>
+            <a:pPr lvl="1"/>
+            <a:r>
+              <a:rPr lang="en-US" dirty="0" err="1"/>
+              <a:t>Nombre</a:t>
+            </a:r>
+            <a:r>
+              <a:rPr lang="en-US" dirty="0"/>
+              <a:t> de </a:t>
+            </a:r>
+            <a:r>
+              <a:rPr lang="en-US" dirty="0" err="1"/>
+              <a:t>couleurs</a:t>
+            </a:r>
+            <a:r>
+              <a:rPr lang="en-US" dirty="0"/>
+              <a:t> </a:t>
+            </a:r>
+            <a:r>
+              <a:rPr lang="en-US" dirty="0" err="1"/>
+              <a:t>proche</a:t>
+            </a:r>
+            <a:r>
+              <a:rPr lang="en-US" dirty="0"/>
+              <a:t> du </a:t>
+            </a:r>
+            <a:r>
+              <a:rPr lang="en-US" dirty="0" err="1"/>
+              <a:t>nombre</a:t>
+            </a:r>
+            <a:r>
+              <a:rPr lang="en-US" dirty="0"/>
+              <a:t> </a:t>
+            </a:r>
+            <a:r>
+              <a:rPr lang="en-US" dirty="0" err="1"/>
+              <a:t>chromatique</a:t>
+            </a:r>
+            <a:endParaRPr lang="en-US" dirty="0"/>
+          </a:p>
+          <a:p>
+            <a:r>
+              <a:rPr lang="en-US" dirty="0" err="1"/>
+              <a:t>Recuit</a:t>
+            </a:r>
+            <a:r>
+              <a:rPr lang="en-US" dirty="0"/>
+              <a:t> </a:t>
+            </a:r>
+            <a:r>
+              <a:rPr lang="en-US" dirty="0" err="1"/>
+              <a:t>simulé</a:t>
+            </a:r>
+            <a:endParaRPr lang="en-US" dirty="0"/>
+          </a:p>
+          <a:p>
+            <a:pPr lvl="1"/>
+            <a:r>
+              <a:rPr lang="en-US" dirty="0"/>
+              <a:t>Temps de </a:t>
+            </a:r>
+            <a:r>
+              <a:rPr lang="en-US" dirty="0" err="1"/>
+              <a:t>calcul</a:t>
+            </a:r>
+            <a:r>
+              <a:rPr lang="en-US" dirty="0"/>
+              <a:t> variable</a:t>
+            </a:r>
+          </a:p>
+          <a:p>
+            <a:pPr lvl="1"/>
+            <a:r>
+              <a:rPr lang="en-US" dirty="0" err="1"/>
+              <a:t>Nombre</a:t>
+            </a:r>
+            <a:r>
+              <a:rPr lang="en-US" dirty="0"/>
+              <a:t> de </a:t>
+            </a:r>
+            <a:r>
+              <a:rPr lang="en-US" dirty="0" err="1"/>
+              <a:t>couleurs</a:t>
+            </a:r>
+            <a:r>
+              <a:rPr lang="en-US" dirty="0"/>
+              <a:t> </a:t>
+            </a:r>
+            <a:r>
+              <a:rPr lang="en-US" dirty="0" err="1"/>
+              <a:t>parfois</a:t>
+            </a:r>
+            <a:r>
+              <a:rPr lang="en-US" dirty="0"/>
+              <a:t> </a:t>
+            </a:r>
+            <a:r>
+              <a:rPr lang="en-US" dirty="0" err="1"/>
+              <a:t>éloigné</a:t>
+            </a:r>
+            <a:r>
+              <a:rPr lang="en-US" dirty="0"/>
+              <a:t> du </a:t>
+            </a:r>
+            <a:r>
+              <a:rPr lang="en-US" dirty="0" err="1"/>
+              <a:t>nombre</a:t>
+            </a:r>
+            <a:r>
+              <a:rPr lang="en-US" dirty="0"/>
+              <a:t> </a:t>
+            </a:r>
+            <a:r>
+              <a:rPr lang="en-US" dirty="0" err="1"/>
+              <a:t>chromatique</a:t>
+            </a:r>
+            <a:endParaRPr lang="en-US" dirty="0"/>
+          </a:p>
+          <a:p>
+            <a:pPr lvl="1"/>
+            <a:r>
+              <a:rPr lang="fr-FR" dirty="0"/>
+              <a:t>Beaucoup de paramètres à régler</a:t>
+            </a:r>
+          </a:p>
+        </p:txBody>
+      </p:sp>
+      <p:sp>
+        <p:nvSpPr>
+          <p:cNvPr id="4" name="Espace réservé du numéro de diapositive 3"/>
           <p:cNvSpPr>
             <a:spLocks noGrp="1"/>
           </p:cNvSpPr>
@@ -3994,39 +6329,10 @@
           </a:p>
         </p:txBody>
       </p:sp>
-      <p:sp>
-        <p:nvSpPr>
-          <p:cNvPr id="7" name="ZoneTexte 6"/>
-          <p:cNvSpPr txBox="1"/>
-          <p:nvPr/>
-        </p:nvSpPr>
-        <p:spPr>
-          <a:xfrm>
-            <a:off x="1298712" y="2054594"/>
-            <a:ext cx="3445566" cy="523220"/>
-          </a:xfrm>
-          <a:prstGeom prst="rect">
-            <a:avLst/>
-          </a:prstGeom>
-          <a:noFill/>
-        </p:spPr>
-        <p:txBody>
-          <a:bodyPr wrap="square" rtlCol="0">
-            <a:spAutoFit/>
-          </a:bodyPr>
-          <a:lstStyle/>
-          <a:p>
-            <a:r>
-              <a:rPr lang="fr-FR" sz="2800" dirty="0"/>
-              <a:t>Diagramme de classe</a:t>
-            </a:r>
-          </a:p>
-        </p:txBody>
-      </p:sp>
     </p:spTree>
     <p:extLst>
       <p:ext uri="{BB962C8B-B14F-4D97-AF65-F5344CB8AC3E}">
-        <p14:creationId xmlns:p14="http://schemas.microsoft.com/office/powerpoint/2010/main" val="1115897566"/>
+        <p14:creationId xmlns:p14="http://schemas.microsoft.com/office/powerpoint/2010/main" val="390439127"/>
       </p:ext>
     </p:extLst>
   </p:cSld>
@@ -4077,6 +6383,140 @@
       </p:sp>
       <p:sp>
         <p:nvSpPr>
+          <p:cNvPr id="5" name="Espace réservé du numéro de diapositive 4"/>
+          <p:cNvSpPr>
+            <a:spLocks noGrp="1"/>
+          </p:cNvSpPr>
+          <p:nvPr>
+            <p:ph type="sldNum" sz="quarter" idx="12"/>
+          </p:nvPr>
+        </p:nvSpPr>
+        <p:spPr/>
+        <p:txBody>
+          <a:bodyPr/>
+          <a:lstStyle/>
+          <a:p>
+            <a:fld id="{8F3E9BA4-B10B-4221-834F-1BD1265045F1}" type="slidenum">
+              <a:rPr lang="fr-FR" smtClean="0"/>
+              <a:pPr/>
+              <a:t>13</a:t>
+            </a:fld>
+            <a:endParaRPr lang="fr-FR" dirty="0"/>
+          </a:p>
+        </p:txBody>
+      </p:sp>
+      <p:pic>
+        <p:nvPicPr>
+          <p:cNvPr id="4" name="Espace réservé du contenu 3"/>
+          <p:cNvPicPr>
+            <a:picLocks noGrp="1" noChangeAspect="1"/>
+          </p:cNvPicPr>
+          <p:nvPr>
+            <p:ph idx="1"/>
+          </p:nvPr>
+        </p:nvPicPr>
+        <p:blipFill>
+          <a:blip r:embed="rId2">
+            <a:extLst>
+              <a:ext uri="{28A0092B-C50C-407E-A947-70E740481C1C}">
+                <a14:useLocalDpi xmlns:a14="http://schemas.microsoft.com/office/drawing/2010/main" val="0"/>
+              </a:ext>
+            </a:extLst>
+          </a:blip>
+          <a:stretch>
+            <a:fillRect/>
+          </a:stretch>
+        </p:blipFill>
+        <p:spPr>
+          <a:xfrm>
+            <a:off x="550506" y="1348650"/>
+            <a:ext cx="10433366" cy="5349738"/>
+          </a:xfrm>
+        </p:spPr>
+      </p:pic>
+      <p:sp>
+        <p:nvSpPr>
+          <p:cNvPr id="7" name="ZoneTexte 6"/>
+          <p:cNvSpPr txBox="1"/>
+          <p:nvPr/>
+        </p:nvSpPr>
+        <p:spPr>
+          <a:xfrm>
+            <a:off x="1298712" y="2054594"/>
+            <a:ext cx="3445566" cy="523220"/>
+          </a:xfrm>
+          <a:prstGeom prst="rect">
+            <a:avLst/>
+          </a:prstGeom>
+          <a:noFill/>
+        </p:spPr>
+        <p:txBody>
+          <a:bodyPr wrap="square" rtlCol="0">
+            <a:spAutoFit/>
+          </a:bodyPr>
+          <a:lstStyle/>
+          <a:p>
+            <a:r>
+              <a:rPr lang="fr-FR" sz="2800" dirty="0"/>
+              <a:t>Diagramme de classe</a:t>
+            </a:r>
+          </a:p>
+        </p:txBody>
+      </p:sp>
+    </p:spTree>
+    <p:extLst>
+      <p:ext uri="{BB962C8B-B14F-4D97-AF65-F5344CB8AC3E}">
+        <p14:creationId xmlns:p14="http://schemas.microsoft.com/office/powerpoint/2010/main" val="1115897566"/>
+      </p:ext>
+    </p:extLst>
+  </p:cSld>
+  <p:clrMapOvr>
+    <a:masterClrMapping/>
+  </p:clrMapOvr>
+</p:sld>
+</file>
+
+<file path=ppt/slides/slide14.xml><?xml version="1.0" encoding="utf-8"?>
+<p:sld xmlns:a="http://purl.oclc.org/ooxml/drawingml/main" xmlns:r="http://purl.oclc.org/ooxml/officeDocument/relationships" xmlns:p="http://purl.oclc.org/ooxml/presentationml/main">
+  <p:cSld>
+    <p:spTree>
+      <p:nvGrpSpPr>
+        <p:cNvPr id="1" name=""/>
+        <p:cNvGrpSpPr/>
+        <p:nvPr/>
+      </p:nvGrpSpPr>
+      <p:grpSpPr>
+        <a:xfrm>
+          <a:off x="0" y="0"/>
+          <a:ext cx="0" cy="0"/>
+          <a:chOff x="0" y="0"/>
+          <a:chExt cx="0" cy="0"/>
+        </a:xfrm>
+      </p:grpSpPr>
+      <p:sp>
+        <p:nvSpPr>
+          <p:cNvPr id="2" name="Titre 1"/>
+          <p:cNvSpPr>
+            <a:spLocks noGrp="1"/>
+          </p:cNvSpPr>
+          <p:nvPr>
+            <p:ph type="title"/>
+          </p:nvPr>
+        </p:nvSpPr>
+        <p:spPr/>
+        <p:txBody>
+          <a:bodyPr/>
+          <a:lstStyle/>
+          <a:p>
+            <a:r>
+              <a:rPr lang="en-US" dirty="0"/>
+              <a:t>STRUCTURE DU PROGRAMME ET INTERFACE</a:t>
+            </a:r>
+          </a:p>
+        </p:txBody>
+      </p:sp>
+      <p:sp>
+        <p:nvSpPr>
           <p:cNvPr id="3" name="Espace réservé du contenu 2"/>
           <p:cNvSpPr>
             <a:spLocks noGrp="1"/>
@@ -4188,7 +6628,7 @@
             <a:fld id="{8F3E9BA4-B10B-4221-834F-1BD1265045F1}" type="slidenum">
               <a:rPr lang="fr-FR" smtClean="0"/>
               <a:pPr/>
-              <a:t>13</a:t>
+              <a:t>14</a:t>
             </a:fld>
             <a:endParaRPr lang="fr-FR" dirty="0"/>
           </a:p>
@@ -4227,106 +6667,7 @@
     </p:spTree>
     <p:extLst>
       <p:ext uri="{BB962C8B-B14F-4D97-AF65-F5344CB8AC3E}">
-        <p14:creationId xmlns:p14="http://schemas.microsoft.com/office/powerpoint/2010/main" val="3829665674"/>
-      </p:ext>
-    </p:extLst>
-  </p:cSld>
-  <p:clrMapOvr>
-    <a:masterClrMapping/>
-  </p:clrMapOvr>
-</p:sld>
-</file>
-
-<file path=ppt/slides/slide14.xml><?xml version="1.0" encoding="utf-8"?>
-<p:sld xmlns:a="http://purl.oclc.org/ooxml/drawingml/main" xmlns:r="http://purl.oclc.org/ooxml/officeDocument/relationships" xmlns:p="http://purl.oclc.org/ooxml/presentationml/main">
-  <p:cSld>
-    <p:spTree>
-      <p:nvGrpSpPr>
-        <p:cNvPr id="1" name=""/>
-        <p:cNvGrpSpPr/>
-        <p:nvPr/>
-      </p:nvGrpSpPr>
-      <p:grpSpPr>
-        <a:xfrm>
-          <a:off x="0" y="0"/>
-          <a:ext cx="0" cy="0"/>
-          <a:chOff x="0" y="0"/>
-          <a:chExt cx="0" cy="0"/>
-        </a:xfrm>
-      </p:grpSpPr>
-      <p:sp>
-        <p:nvSpPr>
-          <p:cNvPr id="2" name="Titre 1"/>
-          <p:cNvSpPr>
-            <a:spLocks noGrp="1"/>
-          </p:cNvSpPr>
-          <p:nvPr>
-            <p:ph type="title"/>
-          </p:nvPr>
-        </p:nvSpPr>
-        <p:spPr/>
-        <p:txBody>
-          <a:bodyPr/>
-          <a:lstStyle/>
-          <a:p>
-            <a:r>
-              <a:rPr lang="en-US" dirty="0"/>
-              <a:t>DEMONSTRATION</a:t>
-            </a:r>
-            <a:endParaRPr lang="fr-FR" dirty="0"/>
-          </a:p>
-        </p:txBody>
-      </p:sp>
-      <p:sp>
-        <p:nvSpPr>
-          <p:cNvPr id="3" name="Espace réservé du contenu 2"/>
-          <p:cNvSpPr>
-            <a:spLocks noGrp="1"/>
-          </p:cNvSpPr>
-          <p:nvPr>
-            <p:ph idx="1"/>
-          </p:nvPr>
-        </p:nvSpPr>
-        <p:spPr/>
-        <p:txBody>
-          <a:bodyPr/>
-          <a:lstStyle/>
-          <a:p>
-            <a:pPr marL="0" indent="0">
-              <a:buNone/>
-            </a:pPr>
-            <a:endParaRPr lang="fr-FR" dirty="0"/>
-          </a:p>
-        </p:txBody>
-      </p:sp>
-      <p:sp>
-        <p:nvSpPr>
-          <p:cNvPr id="4" name="Espace réservé du numéro de diapositive 3"/>
-          <p:cNvSpPr>
-            <a:spLocks noGrp="1"/>
-          </p:cNvSpPr>
-          <p:nvPr>
-            <p:ph type="sldNum" sz="quarter" idx="12"/>
-          </p:nvPr>
-        </p:nvSpPr>
-        <p:spPr/>
-        <p:txBody>
-          <a:bodyPr/>
-          <a:lstStyle/>
-          <a:p>
-            <a:fld id="{8F3E9BA4-B10B-4221-834F-1BD1265045F1}" type="slidenum">
-              <a:rPr lang="fr-FR" smtClean="0"/>
-              <a:pPr/>
-              <a:t>14</a:t>
-            </a:fld>
-            <a:endParaRPr lang="fr-FR" dirty="0"/>
-          </a:p>
-        </p:txBody>
-      </p:sp>
-    </p:spTree>
-    <p:extLst>
-      <p:ext uri="{BB962C8B-B14F-4D97-AF65-F5344CB8AC3E}">
-        <p14:creationId xmlns:p14="http://schemas.microsoft.com/office/powerpoint/2010/main" val="466114696"/>
+        <p14:creationId xmlns:p14="http://schemas.microsoft.com/office/powerpoint/2010/main" val="2875864908"/>
       </p:ext>
     </p:extLst>
   </p:cSld>
@@ -5101,7 +7442,7 @@
           <p:nvPr/>
         </p:nvPicPr>
         <p:blipFill>
-          <a:blip r:embed="rId2">
+          <a:blip r:embed="rId2" cstate="print">
             <a:extLst>
               <a:ext uri="{28A0092B-C50C-407E-A947-70E740481C1C}">
                 <a14:useLocalDpi xmlns:a14="http://schemas.microsoft.com/office/drawing/2010/main" val="0"/>
@@ -5131,7 +7472,7 @@
           <p:nvPr/>
         </p:nvPicPr>
         <p:blipFill>
-          <a:blip r:embed="rId3">
+          <a:blip r:embed="rId3" cstate="print">
             <a:extLst>
               <a:ext uri="{28A0092B-C50C-407E-A947-70E740481C1C}">
                 <a14:useLocalDpi xmlns:a14="http://schemas.microsoft.com/office/drawing/2010/main" val="0"/>
@@ -8289,7 +10630,7 @@
             <a:pPr lvl="1"/>
             <a:r>
               <a:rPr lang="fr-FR" dirty="0"/>
-              <a:t>Tous les sommets on une couleur différente</a:t>
+              <a:t>Tous les sommets ont une couleur différente</a:t>
             </a:r>
           </a:p>
           <a:p>
@@ -9400,7 +11741,7 @@
     <mc:Choice Requires="p14">
       <p:transition p14:dur="10"/>
     </mc:Choice>
-    <mc:Fallback xmlns="" xmlns:a="http://schemas.openxmlformats.org/drawingml/2006/main" xmlns:r="http://schemas.openxmlformats.org/officeDocument/2006/relationships" xmlns:p="http://schemas.openxmlformats.org/presentationml/2006/main">
+    <mc:Fallback xmlns:p="http://schemas.openxmlformats.org/presentationml/2006/main" xmlns:r="http://schemas.openxmlformats.org/officeDocument/2006/relationships" xmlns:a="http://schemas.openxmlformats.org/drawingml/2006/main" xmlns="">
       <p:transition/>
     </mc:Fallback>
   </mc:AlternateContent>
@@ -10005,22 +12346,27 @@
             <a:pPr lvl="1"/>
             <a:r>
               <a:rPr lang="fr-FR" dirty="0"/>
-              <a:t>Température maximale</a:t>
+              <a:t>Température maximale (T)</a:t>
             </a:r>
           </a:p>
           <a:p>
             <a:pPr lvl="1"/>
             <a:r>
               <a:rPr lang="fr-FR" dirty="0"/>
-              <a:t>Nombre de fois maximum que l’on adapte les voisins</a:t>
+              <a:t>Nombre de fois maximum que l’on adapte les voisins (C)</a:t>
             </a:r>
           </a:p>
           <a:p>
             <a:pPr lvl="1"/>
             <a:r>
               <a:rPr lang="fr-FR" dirty="0"/>
-              <a:t>Nombre d’itérations maximum avant de reprendre le graphe avec la plus petite énergie</a:t>
-            </a:r>
+              <a:t>Nombre d’itérations maximum avant de reprendre le graphe avec la plus </a:t>
+            </a:r>
+            <a:r>
+              <a:rPr lang="fr-FR"/>
+              <a:t>petite énergie (I)</a:t>
+            </a:r>
+            <a:endParaRPr lang="fr-FR" dirty="0"/>
           </a:p>
         </p:txBody>
       </p:sp>

</xml_diff>